<commit_message>
add results to presentation
</commit_message>
<xml_diff>
--- a/presentation/230214_IEWT.pptx
+++ b/presentation/230214_IEWT.pptx
@@ -141,6 +141,13 @@
     <p:extLst>
       <p:ext uri="{19B8F6BF-5375-455C-9EA6-DF929625EA0E}">
         <p15:presenceInfo xmlns:p15="http://schemas.microsoft.com/office/powerpoint/2012/main" userId="Sebastian Zwickl (TUW-EEG)" providerId="None"/>
+      </p:ext>
+    </p:extLst>
+  </p:cmAuthor>
+  <p:cmAuthor id="2" name="zwickl-nb" initials="z" lastIdx="1" clrIdx="1">
+    <p:extLst>
+      <p:ext uri="{19B8F6BF-5375-455C-9EA6-DF929625EA0E}">
+        <p15:presenceInfo xmlns:p15="http://schemas.microsoft.com/office/powerpoint/2012/main" userId="497f9bbb497d6863" providerId="Windows Live"/>
       </p:ext>
     </p:extLst>
   </p:cmAuthor>
@@ -10743,7 +10750,6 @@
               <a:rPr lang="en-US" dirty="0"/>
               <a:t>Exploring the Role of Europe in the global LNG Market Equilibrium until 2040</a:t>
             </a:r>
-            <a:endParaRPr lang="en-US" dirty="0"/>
           </a:p>
         </p:txBody>
       </p:sp>
@@ -11389,13 +11395,7 @@
               <a:rPr lang="de-AT" u="sng" kern="0" dirty="0" smtClean="0">
                 <a:latin typeface="Calibri Light"/>
               </a:rPr>
-              <a:t>Sebastian </a:t>
-            </a:r>
-            <a:r>
-              <a:rPr lang="de-AT" u="sng" kern="0" dirty="0" smtClean="0">
-                <a:latin typeface="Calibri Light"/>
-              </a:rPr>
-              <a:t>Zwickl-Bernhard</a:t>
+              <a:t>Sebastian Zwickl-Bernhard</a:t>
             </a:r>
             <a:r>
               <a:rPr lang="de-AT" kern="0" baseline="30000" dirty="0" smtClean="0">
@@ -11419,13 +11419,7 @@
               <a:rPr lang="de-AT" kern="0" dirty="0" smtClean="0">
                 <a:latin typeface="Calibri Light"/>
               </a:rPr>
-              <a:t>, </a:t>
-            </a:r>
-            <a:r>
-              <a:rPr lang="de-AT" kern="0" dirty="0" smtClean="0">
-                <a:latin typeface="Calibri Light"/>
-              </a:rPr>
-              <a:t>Hans Auer</a:t>
+              <a:t>, Hans Auer</a:t>
             </a:r>
             <a:r>
               <a:rPr lang="de-AT" kern="0" baseline="30000" dirty="0" smtClean="0">
@@ -11433,9 +11427,6 @@
               </a:rPr>
               <a:t>1,2</a:t>
             </a:r>
-            <a:endParaRPr lang="de-AT" kern="0" baseline="30000" dirty="0" smtClean="0">
-              <a:latin typeface="Calibri Light"/>
-            </a:endParaRPr>
           </a:p>
           <a:p>
             <a:pPr lvl="0" algn="l"/>
@@ -11563,12 +11554,30 @@
             <p:ph sz="half" idx="1"/>
           </p:nvPr>
         </p:nvSpPr>
-        <p:spPr/>
+        <p:spPr>
+          <a:xfrm>
+            <a:off x="362712" y="1225514"/>
+            <a:ext cx="10591185" cy="422312"/>
+          </a:xfrm>
+        </p:spPr>
         <p:txBody>
           <a:bodyPr/>
           <a:lstStyle/>
           <a:p>
-            <a:endParaRPr lang="en-US"/>
+            <a:pPr marL="0" indent="0">
+              <a:buNone/>
+            </a:pPr>
+            <a:r>
+              <a:rPr lang="en-US" dirty="0" smtClean="0">
+                <a:sym typeface="Wingdings" panose="05000000000000000000" pitchFamily="2" charset="2"/>
+              </a:rPr>
+              <a:t> </a:t>
+            </a:r>
+            <a:r>
+              <a:rPr lang="en-US" dirty="0" smtClean="0"/>
+              <a:t>Quantification of the change in exporter’s liquefaction capacities on the total cost</a:t>
+            </a:r>
+            <a:endParaRPr lang="en-US" dirty="0"/>
           </a:p>
         </p:txBody>
       </p:sp>
@@ -11587,31 +11596,1087 @@
           <a:bodyPr/>
           <a:lstStyle/>
           <a:p>
-            <a:endParaRPr lang="en-US" dirty="0"/>
-          </a:p>
-        </p:txBody>
-      </p:sp>
-      <p:sp>
-        <p:nvSpPr>
-          <p:cNvPr id="9" name="Fußzeilenplatzhalter 8"/>
-          <p:cNvSpPr>
-            <a:spLocks noGrp="1"/>
-          </p:cNvSpPr>
-          <p:nvPr>
-            <p:ph type="ftr" sz="quarter" idx="3"/>
-          </p:nvPr>
-        </p:nvSpPr>
-        <p:spPr/>
-        <p:txBody>
-          <a:bodyPr/>
+            <a:r>
+              <a:rPr lang="en-US" dirty="0" smtClean="0"/>
+              <a:t>Value of increasing liquefaction capacities of exporters </a:t>
+            </a:r>
+            <a:r>
+              <a:rPr lang="en-US" sz="2000" dirty="0"/>
+              <a:t>(2019)</a:t>
+            </a:r>
+            <a:endParaRPr lang="en-US" sz="2000" dirty="0"/>
+          </a:p>
+        </p:txBody>
+      </p:sp>
+      <mc:AlternateContent xmlns:mc="http://schemas.openxmlformats.org/markup-compatibility/2006">
+        <mc:Choice xmlns:a14="http://schemas.microsoft.com/office/drawing/2010/main" Requires="a14">
+          <p:sp>
+            <p:nvSpPr>
+              <p:cNvPr id="9" name="Fußzeilenplatzhalter 8"/>
+              <p:cNvSpPr>
+                <a:spLocks noGrp="1"/>
+              </p:cNvSpPr>
+              <p:nvPr>
+                <p:ph type="ftr" sz="quarter" idx="3"/>
+              </p:nvPr>
+            </p:nvSpPr>
+            <p:spPr>
+              <a:xfrm>
+                <a:off x="2712485" y="6445055"/>
+                <a:ext cx="9296375" cy="246221"/>
+              </a:xfrm>
+            </p:spPr>
+            <p:txBody>
+              <a:bodyPr>
+                <a:normAutofit lnSpcReduction="10000"/>
+              </a:bodyPr>
+              <a:lstStyle/>
+              <a:p>
+                <a:r>
+                  <a:rPr lang="en-US" dirty="0" smtClean="0"/>
+                  <a:t>Values obtained as the dual variable of the capacity restriction constraint </a:t>
+                </a:r>
+                <a14:m>
+                  <m:oMath xmlns:m="http://schemas.openxmlformats.org/officeDocument/2006/math">
+                    <m:nary>
+                      <m:naryPr>
+                        <m:chr m:val="∑"/>
+                        <m:supHide m:val="on"/>
+                        <m:ctrlPr>
+                          <a:rPr lang="en-US" i="1">
+                            <a:solidFill>
+                              <a:schemeClr val="bg1">
+                                <a:lumMod val="50000"/>
+                              </a:schemeClr>
+                            </a:solidFill>
+                            <a:latin typeface="Cambria Math" panose="02040503050406030204" pitchFamily="18" charset="0"/>
+                          </a:rPr>
+                        </m:ctrlPr>
+                      </m:naryPr>
+                      <m:sub>
+                        <m:r>
+                          <m:rPr>
+                            <m:brk m:alnAt="7"/>
+                          </m:rPr>
+                          <a:rPr lang="de-AT" i="1">
+                            <a:solidFill>
+                              <a:schemeClr val="bg1">
+                                <a:lumMod val="50000"/>
+                              </a:schemeClr>
+                            </a:solidFill>
+                            <a:latin typeface="Cambria Math" panose="02040503050406030204" pitchFamily="18" charset="0"/>
+                          </a:rPr>
+                          <m:t>𝑖</m:t>
+                        </m:r>
+                      </m:sub>
+                      <m:sup/>
+                      <m:e>
+                        <m:sSub>
+                          <m:sSubPr>
+                            <m:ctrlPr>
+                              <a:rPr lang="en-US" i="1">
+                                <a:solidFill>
+                                  <a:schemeClr val="bg1">
+                                    <a:lumMod val="50000"/>
+                                  </a:schemeClr>
+                                </a:solidFill>
+                                <a:latin typeface="Cambria Math" panose="02040503050406030204" pitchFamily="18" charset="0"/>
+                              </a:rPr>
+                            </m:ctrlPr>
+                          </m:sSubPr>
+                          <m:e>
+                            <m:r>
+                              <a:rPr lang="de-AT" i="1">
+                                <a:solidFill>
+                                  <a:schemeClr val="bg1">
+                                    <a:lumMod val="50000"/>
+                                  </a:schemeClr>
+                                </a:solidFill>
+                                <a:latin typeface="Cambria Math" panose="02040503050406030204" pitchFamily="18" charset="0"/>
+                              </a:rPr>
+                              <m:t>𝑞</m:t>
+                            </m:r>
+                          </m:e>
+                          <m:sub>
+                            <m:r>
+                              <a:rPr lang="de-AT" i="1">
+                                <a:solidFill>
+                                  <a:schemeClr val="bg1">
+                                    <a:lumMod val="50000"/>
+                                  </a:schemeClr>
+                                </a:solidFill>
+                                <a:latin typeface="Cambria Math" panose="02040503050406030204" pitchFamily="18" charset="0"/>
+                              </a:rPr>
+                              <m:t>𝑒</m:t>
+                            </m:r>
+                            <m:r>
+                              <a:rPr lang="de-AT" i="1">
+                                <a:solidFill>
+                                  <a:schemeClr val="bg1">
+                                    <a:lumMod val="50000"/>
+                                  </a:schemeClr>
+                                </a:solidFill>
+                                <a:latin typeface="Cambria Math" panose="02040503050406030204" pitchFamily="18" charset="0"/>
+                              </a:rPr>
+                              <m:t>,</m:t>
+                            </m:r>
+                            <m:r>
+                              <a:rPr lang="de-AT" i="1">
+                                <a:solidFill>
+                                  <a:schemeClr val="bg1">
+                                    <a:lumMod val="50000"/>
+                                  </a:schemeClr>
+                                </a:solidFill>
+                                <a:latin typeface="Cambria Math" panose="02040503050406030204" pitchFamily="18" charset="0"/>
+                              </a:rPr>
+                              <m:t>𝑖</m:t>
+                            </m:r>
+                          </m:sub>
+                        </m:sSub>
+                        <m:r>
+                          <a:rPr lang="en-US" i="1">
+                            <a:solidFill>
+                              <a:schemeClr val="bg1">
+                                <a:lumMod val="50000"/>
+                              </a:schemeClr>
+                            </a:solidFill>
+                            <a:latin typeface="Cambria Math" panose="02040503050406030204" pitchFamily="18" charset="0"/>
+                            <a:ea typeface="Cambria Math" panose="02040503050406030204" pitchFamily="18" charset="0"/>
+                          </a:rPr>
+                          <m:t>≤</m:t>
+                        </m:r>
+                        <m:sSub>
+                          <m:sSubPr>
+                            <m:ctrlPr>
+                              <a:rPr lang="en-US" i="1">
+                                <a:solidFill>
+                                  <a:schemeClr val="bg1">
+                                    <a:lumMod val="50000"/>
+                                  </a:schemeClr>
+                                </a:solidFill>
+                                <a:latin typeface="Cambria Math" panose="02040503050406030204" pitchFamily="18" charset="0"/>
+                                <a:ea typeface="Cambria Math" panose="02040503050406030204" pitchFamily="18" charset="0"/>
+                              </a:rPr>
+                            </m:ctrlPr>
+                          </m:sSubPr>
+                          <m:e>
+                            <m:r>
+                              <a:rPr lang="de-AT" i="1">
+                                <a:solidFill>
+                                  <a:schemeClr val="bg1">
+                                    <a:lumMod val="50000"/>
+                                  </a:schemeClr>
+                                </a:solidFill>
+                                <a:latin typeface="Cambria Math" panose="02040503050406030204" pitchFamily="18" charset="0"/>
+                                <a:ea typeface="Cambria Math" panose="02040503050406030204" pitchFamily="18" charset="0"/>
+                              </a:rPr>
+                              <m:t>𝐸𝑥𝑝𝑜𝑟𝑡</m:t>
+                            </m:r>
+                            <m:r>
+                              <a:rPr lang="de-AT" i="1">
+                                <a:solidFill>
+                                  <a:schemeClr val="bg1">
+                                    <a:lumMod val="50000"/>
+                                  </a:schemeClr>
+                                </a:solidFill>
+                                <a:latin typeface="Cambria Math" panose="02040503050406030204" pitchFamily="18" charset="0"/>
+                                <a:ea typeface="Cambria Math" panose="02040503050406030204" pitchFamily="18" charset="0"/>
+                              </a:rPr>
+                              <m:t> </m:t>
+                            </m:r>
+                            <m:r>
+                              <a:rPr lang="de-AT" i="1">
+                                <a:solidFill>
+                                  <a:schemeClr val="bg1">
+                                    <a:lumMod val="50000"/>
+                                  </a:schemeClr>
+                                </a:solidFill>
+                                <a:latin typeface="Cambria Math" panose="02040503050406030204" pitchFamily="18" charset="0"/>
+                                <a:ea typeface="Cambria Math" panose="02040503050406030204" pitchFamily="18" charset="0"/>
+                              </a:rPr>
+                              <m:t>𝐶𝑎𝑝𝑎𝑐𝑖𝑡𝑦</m:t>
+                            </m:r>
+                          </m:e>
+                          <m:sub>
+                            <m:r>
+                              <a:rPr lang="de-AT" i="1">
+                                <a:solidFill>
+                                  <a:schemeClr val="bg1">
+                                    <a:lumMod val="50000"/>
+                                  </a:schemeClr>
+                                </a:solidFill>
+                                <a:latin typeface="Cambria Math" panose="02040503050406030204" pitchFamily="18" charset="0"/>
+                                <a:ea typeface="Cambria Math" panose="02040503050406030204" pitchFamily="18" charset="0"/>
+                              </a:rPr>
+                              <m:t>𝑒</m:t>
+                            </m:r>
+                          </m:sub>
+                        </m:sSub>
+                      </m:e>
+                    </m:nary>
+                  </m:oMath>
+                </a14:m>
+                <a:r>
+                  <a:rPr lang="en-US" dirty="0" smtClean="0">
+                    <a:solidFill>
+                      <a:schemeClr val="bg1">
+                        <a:lumMod val="50000"/>
+                      </a:schemeClr>
+                    </a:solidFill>
+                  </a:rPr>
+                  <a:t>.</a:t>
+                </a:r>
+                <a:endParaRPr lang="en-US" dirty="0">
+                  <a:solidFill>
+                    <a:schemeClr val="bg1">
+                      <a:lumMod val="50000"/>
+                    </a:schemeClr>
+                  </a:solidFill>
+                </a:endParaRPr>
+              </a:p>
+            </p:txBody>
+          </p:sp>
+        </mc:Choice>
+        <mc:Fallback>
+          <p:sp>
+            <p:nvSpPr>
+              <p:cNvPr id="9" name="Fußzeilenplatzhalter 8"/>
+              <p:cNvSpPr>
+                <a:spLocks noGrp="1" noRot="1" noChangeAspect="1" noMove="1" noResize="1" noEditPoints="1" noAdjustHandles="1" noChangeArrowheads="1" noChangeShapeType="1" noTextEdit="1"/>
+              </p:cNvSpPr>
+              <p:nvPr>
+                <p:ph type="ftr" sz="quarter" idx="3"/>
+              </p:nvPr>
+            </p:nvSpPr>
+            <p:spPr>
+              <a:xfrm>
+                <a:off x="2712485" y="6445055"/>
+                <a:ext cx="9296375" cy="246221"/>
+              </a:xfrm>
+              <a:blipFill>
+                <a:blip r:embed="rId3"/>
+                <a:stretch>
+                  <a:fillRect t="-85366" b="-141463"/>
+                </a:stretch>
+              </a:blipFill>
+            </p:spPr>
+            <p:txBody>
+              <a:bodyPr/>
+              <a:lstStyle/>
+              <a:p>
+                <a:r>
+                  <a:rPr lang="en-US">
+                    <a:noFill/>
+                  </a:rPr>
+                  <a:t> </a:t>
+                </a:r>
+              </a:p>
+            </p:txBody>
+          </p:sp>
+        </mc:Fallback>
+      </mc:AlternateContent>
+      <p:pic>
+        <p:nvPicPr>
+          <p:cNvPr id="3" name="Grafik 2"/>
+          <p:cNvPicPr>
+            <a:picLocks noChangeAspect="1"/>
+          </p:cNvPicPr>
+          <p:nvPr/>
+        </p:nvPicPr>
+        <p:blipFill rotWithShape="1">
+          <a:blip r:embed="rId4"/>
+          <a:srcRect r="23220" b="8145"/>
+          <a:stretch/>
+        </p:blipFill>
+        <p:spPr>
+          <a:xfrm>
+            <a:off x="4799246" y="1589670"/>
+            <a:ext cx="6313448" cy="4118415"/>
+          </a:xfrm>
+          <a:prstGeom prst="rect">
+            <a:avLst/>
+          </a:prstGeom>
+        </p:spPr>
+      </p:pic>
+      <p:pic>
+        <p:nvPicPr>
+          <p:cNvPr id="7" name="Grafik 6"/>
+          <p:cNvPicPr>
+            <a:picLocks noChangeAspect="1"/>
+          </p:cNvPicPr>
+          <p:nvPr/>
+        </p:nvPicPr>
+        <p:blipFill rotWithShape="1">
+          <a:blip r:embed="rId4"/>
+          <a:srcRect l="79528" t="16643" r="2627" b="25148"/>
+          <a:stretch/>
+        </p:blipFill>
+        <p:spPr>
+          <a:xfrm>
+            <a:off x="10516998" y="4049585"/>
+            <a:ext cx="1053712" cy="1874207"/>
+          </a:xfrm>
+          <a:prstGeom prst="rect">
+            <a:avLst/>
+          </a:prstGeom>
+        </p:spPr>
+      </p:pic>
+      <p:sp>
+        <p:nvSpPr>
+          <p:cNvPr id="8" name="Inhaltsplatzhalter 4"/>
+          <p:cNvSpPr txBox="1">
+            <a:spLocks/>
+          </p:cNvSpPr>
+          <p:nvPr/>
+        </p:nvSpPr>
+        <p:spPr>
+          <a:xfrm>
+            <a:off x="363963" y="2043385"/>
+            <a:ext cx="4341387" cy="3814184"/>
+          </a:xfrm>
+          <a:prstGeom prst="rect">
+            <a:avLst/>
+          </a:prstGeom>
+        </p:spPr>
+        <p:txBody>
+          <a:bodyPr vert="horz" lIns="91440" tIns="45720" rIns="91440" bIns="45720" rtlCol="0">
+            <a:normAutofit/>
+          </a:bodyPr>
+          <a:lstStyle>
+            <a:lvl1pPr marL="342900" indent="-342900" algn="l" defTabSz="914400" rtl="0" eaLnBrk="1" latinLnBrk="0" hangingPunct="1">
+              <a:lnSpc>
+                <a:spcPct val="100000"/>
+              </a:lnSpc>
+              <a:spcBef>
+                <a:spcPts val="1800"/>
+              </a:spcBef>
+              <a:spcAft>
+                <a:spcPts val="0"/>
+              </a:spcAft>
+              <a:buFont typeface="Wingdings" panose="05000000000000000000" pitchFamily="2" charset="2"/>
+              <a:buChar char="§"/>
+              <a:defRPr sz="2000" kern="1200">
+                <a:solidFill>
+                  <a:schemeClr val="tx1"/>
+                </a:solidFill>
+                <a:latin typeface="Segoe UI Light" panose="020B0502040204020203" pitchFamily="34" charset="0"/>
+                <a:ea typeface="Tahoma" panose="020B0604030504040204" pitchFamily="34" charset="0"/>
+                <a:cs typeface="Segoe UI Light" panose="020B0502040204020203" pitchFamily="34" charset="0"/>
+              </a:defRPr>
+            </a:lvl1pPr>
+            <a:lvl2pPr marL="685800" indent="-228600" algn="l" defTabSz="914400" rtl="0" eaLnBrk="1" latinLnBrk="0" hangingPunct="1">
+              <a:lnSpc>
+                <a:spcPct val="100000"/>
+              </a:lnSpc>
+              <a:spcBef>
+                <a:spcPts val="500"/>
+              </a:spcBef>
+              <a:spcAft>
+                <a:spcPts val="0"/>
+              </a:spcAft>
+              <a:buFont typeface="Courier New" panose="02070309020205020404" pitchFamily="49" charset="0"/>
+              <a:buChar char="o"/>
+              <a:defRPr sz="2000" b="0" kern="1200" baseline="0">
+                <a:solidFill>
+                  <a:schemeClr val="tx1"/>
+                </a:solidFill>
+                <a:latin typeface="Segoe UI Light" panose="020B0502040204020203" pitchFamily="34" charset="0"/>
+                <a:ea typeface="Tahoma" panose="020B0604030504040204" pitchFamily="34" charset="0"/>
+                <a:cs typeface="Segoe UI Light" panose="020B0502040204020203" pitchFamily="34" charset="0"/>
+              </a:defRPr>
+            </a:lvl2pPr>
+            <a:lvl3pPr marL="1143000" indent="-228600" algn="l" defTabSz="914400" rtl="0" eaLnBrk="1" latinLnBrk="0" hangingPunct="1">
+              <a:lnSpc>
+                <a:spcPct val="90000"/>
+              </a:lnSpc>
+              <a:spcBef>
+                <a:spcPts val="500"/>
+              </a:spcBef>
+              <a:buFont typeface="Wingdings" pitchFamily="2" charset="2"/>
+              <a:buChar char="§"/>
+              <a:defRPr sz="1800" kern="1200">
+                <a:solidFill>
+                  <a:schemeClr val="tx1"/>
+                </a:solidFill>
+                <a:latin typeface="Tahoma" panose="020B0604030504040204" pitchFamily="34" charset="0"/>
+                <a:ea typeface="Tahoma" panose="020B0604030504040204" pitchFamily="34" charset="0"/>
+                <a:cs typeface="Tahoma" panose="020B0604030504040204" pitchFamily="34" charset="0"/>
+              </a:defRPr>
+            </a:lvl3pPr>
+            <a:lvl4pPr marL="1600200" indent="-228600" algn="l" defTabSz="914400" rtl="0" eaLnBrk="1" latinLnBrk="0" hangingPunct="1">
+              <a:lnSpc>
+                <a:spcPct val="90000"/>
+              </a:lnSpc>
+              <a:spcBef>
+                <a:spcPts val="500"/>
+              </a:spcBef>
+              <a:buFont typeface="Arial" panose="020B0604020202020204" pitchFamily="34" charset="0"/>
+              <a:buChar char="•"/>
+              <a:defRPr sz="1600" kern="1200">
+                <a:solidFill>
+                  <a:schemeClr val="tx1"/>
+                </a:solidFill>
+                <a:latin typeface="Tahoma" panose="020B0604030504040204" pitchFamily="34" charset="0"/>
+                <a:ea typeface="Tahoma" panose="020B0604030504040204" pitchFamily="34" charset="0"/>
+                <a:cs typeface="Tahoma" panose="020B0604030504040204" pitchFamily="34" charset="0"/>
+              </a:defRPr>
+            </a:lvl4pPr>
+            <a:lvl5pPr marL="2057400" indent="-228600" algn="l" defTabSz="914400" rtl="0" eaLnBrk="1" latinLnBrk="0" hangingPunct="1">
+              <a:lnSpc>
+                <a:spcPct val="90000"/>
+              </a:lnSpc>
+              <a:spcBef>
+                <a:spcPts val="500"/>
+              </a:spcBef>
+              <a:buFont typeface="Courier New" panose="02070309020205020404" pitchFamily="49" charset="0"/>
+              <a:buChar char="o"/>
+              <a:defRPr sz="1400" kern="1200">
+                <a:solidFill>
+                  <a:schemeClr val="tx1"/>
+                </a:solidFill>
+                <a:latin typeface="Tahoma" panose="020B0604030504040204" pitchFamily="34" charset="0"/>
+                <a:ea typeface="Tahoma" panose="020B0604030504040204" pitchFamily="34" charset="0"/>
+                <a:cs typeface="Tahoma" panose="020B0604030504040204" pitchFamily="34" charset="0"/>
+              </a:defRPr>
+            </a:lvl5pPr>
+            <a:lvl6pPr marL="2514600" indent="-228600" algn="l" defTabSz="914400" rtl="0" eaLnBrk="1" latinLnBrk="0" hangingPunct="1">
+              <a:lnSpc>
+                <a:spcPct val="90000"/>
+              </a:lnSpc>
+              <a:spcBef>
+                <a:spcPts val="500"/>
+              </a:spcBef>
+              <a:buFont typeface="Arial" panose="020B0604020202020204" pitchFamily="34" charset="0"/>
+              <a:buChar char="•"/>
+              <a:defRPr sz="1800" kern="1200">
+                <a:solidFill>
+                  <a:schemeClr val="tx1"/>
+                </a:solidFill>
+                <a:latin typeface="+mn-lt"/>
+                <a:ea typeface="+mn-ea"/>
+                <a:cs typeface="+mn-cs"/>
+              </a:defRPr>
+            </a:lvl6pPr>
+            <a:lvl7pPr marL="2971800" indent="-228600" algn="l" defTabSz="914400" rtl="0" eaLnBrk="1" latinLnBrk="0" hangingPunct="1">
+              <a:lnSpc>
+                <a:spcPct val="90000"/>
+              </a:lnSpc>
+              <a:spcBef>
+                <a:spcPts val="500"/>
+              </a:spcBef>
+              <a:buFont typeface="Arial" panose="020B0604020202020204" pitchFamily="34" charset="0"/>
+              <a:buChar char="•"/>
+              <a:defRPr sz="1800" kern="1200">
+                <a:solidFill>
+                  <a:schemeClr val="tx1"/>
+                </a:solidFill>
+                <a:latin typeface="+mn-lt"/>
+                <a:ea typeface="+mn-ea"/>
+                <a:cs typeface="+mn-cs"/>
+              </a:defRPr>
+            </a:lvl7pPr>
+            <a:lvl8pPr marL="3429000" indent="-228600" algn="l" defTabSz="914400" rtl="0" eaLnBrk="1" latinLnBrk="0" hangingPunct="1">
+              <a:lnSpc>
+                <a:spcPct val="90000"/>
+              </a:lnSpc>
+              <a:spcBef>
+                <a:spcPts val="500"/>
+              </a:spcBef>
+              <a:buFont typeface="Arial" panose="020B0604020202020204" pitchFamily="34" charset="0"/>
+              <a:buChar char="•"/>
+              <a:defRPr sz="1800" kern="1200">
+                <a:solidFill>
+                  <a:schemeClr val="tx1"/>
+                </a:solidFill>
+                <a:latin typeface="+mn-lt"/>
+                <a:ea typeface="+mn-ea"/>
+                <a:cs typeface="+mn-cs"/>
+              </a:defRPr>
+            </a:lvl8pPr>
+            <a:lvl9pPr marL="3886200" indent="-228600" algn="l" defTabSz="914400" rtl="0" eaLnBrk="1" latinLnBrk="0" hangingPunct="1">
+              <a:lnSpc>
+                <a:spcPct val="90000"/>
+              </a:lnSpc>
+              <a:spcBef>
+                <a:spcPts val="500"/>
+              </a:spcBef>
+              <a:buFont typeface="Arial" panose="020B0604020202020204" pitchFamily="34" charset="0"/>
+              <a:buChar char="•"/>
+              <a:defRPr sz="1800" kern="1200">
+                <a:solidFill>
+                  <a:schemeClr val="tx1"/>
+                </a:solidFill>
+                <a:latin typeface="+mn-lt"/>
+                <a:ea typeface="+mn-ea"/>
+                <a:cs typeface="+mn-cs"/>
+              </a:defRPr>
+            </a:lvl9pPr>
+          </a:lstStyle>
+          <a:p>
+            <a:r>
+              <a:rPr lang="en-US" dirty="0" smtClean="0"/>
+              <a:t>1. Group: Nodes with no or </a:t>
+            </a:r>
+            <a:r>
+              <a:rPr lang="en-US" b="1" dirty="0" smtClean="0"/>
+              <a:t>minimal</a:t>
+            </a:r>
+            <a:r>
+              <a:rPr lang="en-US" dirty="0" smtClean="0"/>
+              <a:t> potential for reducing cost</a:t>
+            </a:r>
+            <a:br>
+              <a:rPr lang="en-US" dirty="0" smtClean="0"/>
+            </a:br>
+            <a:r>
+              <a:rPr lang="en-US" dirty="0" smtClean="0">
+                <a:solidFill>
+                  <a:schemeClr val="bg1">
+                    <a:lumMod val="50000"/>
+                  </a:schemeClr>
+                </a:solidFill>
+              </a:rPr>
+              <a:t>(e.g., Australia and USA)</a:t>
+            </a:r>
+          </a:p>
+          <a:p>
+            <a:r>
+              <a:rPr lang="en-US" dirty="0" smtClean="0"/>
+              <a:t>2. Group: Nodes with </a:t>
+            </a:r>
+            <a:r>
+              <a:rPr lang="en-US" b="1" dirty="0" smtClean="0"/>
+              <a:t>moderate</a:t>
+            </a:r>
+            <a:r>
+              <a:rPr lang="en-US" dirty="0" smtClean="0"/>
+              <a:t> potential for reducing cost</a:t>
+            </a:r>
+            <a:br>
+              <a:rPr lang="en-US" dirty="0" smtClean="0"/>
+            </a:br>
+            <a:r>
+              <a:rPr lang="en-US" dirty="0" smtClean="0">
+                <a:solidFill>
+                  <a:schemeClr val="bg1">
+                    <a:lumMod val="50000"/>
+                  </a:schemeClr>
+                </a:solidFill>
+              </a:rPr>
+              <a:t>(e.g., Indonesia, Malaysia, and European countries)</a:t>
+            </a:r>
+          </a:p>
+          <a:p>
+            <a:r>
+              <a:rPr lang="en-US" dirty="0" smtClean="0"/>
+              <a:t>3. Group: Nodes with </a:t>
+            </a:r>
+            <a:r>
+              <a:rPr lang="en-US" b="1" dirty="0" smtClean="0"/>
+              <a:t>strong</a:t>
+            </a:r>
+            <a:r>
+              <a:rPr lang="en-US" dirty="0" smtClean="0"/>
+              <a:t> potential for reducing cost</a:t>
+            </a:r>
+            <a:br>
+              <a:rPr lang="en-US" dirty="0" smtClean="0"/>
+            </a:br>
+            <a:r>
+              <a:rPr lang="en-US" dirty="0" smtClean="0">
+                <a:solidFill>
+                  <a:schemeClr val="bg1">
+                    <a:lumMod val="50000"/>
+                  </a:schemeClr>
+                </a:solidFill>
+              </a:rPr>
+              <a:t>(e.g., Qatar, Algeria)</a:t>
+            </a:r>
+            <a:endParaRPr lang="en-US" dirty="0">
+              <a:solidFill>
+                <a:schemeClr val="bg1">
+                  <a:lumMod val="50000"/>
+                </a:schemeClr>
+              </a:solidFill>
+            </a:endParaRPr>
+          </a:p>
+        </p:txBody>
+      </p:sp>
+      <p:cxnSp>
+        <p:nvCxnSpPr>
+          <p:cNvPr id="10" name="Gerader Verbinder 9"/>
+          <p:cNvCxnSpPr/>
+          <p:nvPr/>
+        </p:nvCxnSpPr>
+        <p:spPr>
+          <a:xfrm>
+            <a:off x="9239250" y="2572861"/>
+            <a:ext cx="1228725" cy="937102"/>
+          </a:xfrm>
+          <a:prstGeom prst="line">
+            <a:avLst/>
+          </a:prstGeom>
+          <a:ln w="190500">
+            <a:solidFill>
+              <a:schemeClr val="bg1"/>
+            </a:solidFill>
+          </a:ln>
+        </p:spPr>
+        <p:style>
+          <a:lnRef idx="1">
+            <a:schemeClr val="accent1"/>
+          </a:lnRef>
+          <a:fillRef idx="0">
+            <a:schemeClr val="accent1"/>
+          </a:fillRef>
+          <a:effectRef idx="0">
+            <a:schemeClr val="accent1"/>
+          </a:effectRef>
+          <a:fontRef idx="minor">
+            <a:schemeClr val="tx1"/>
+          </a:fontRef>
+        </p:style>
+      </p:cxnSp>
+      <p:cxnSp>
+        <p:nvCxnSpPr>
+          <p:cNvPr id="12" name="Gerader Verbinder 11"/>
+          <p:cNvCxnSpPr/>
+          <p:nvPr/>
+        </p:nvCxnSpPr>
+        <p:spPr>
+          <a:xfrm>
+            <a:off x="9201149" y="3969527"/>
+            <a:ext cx="1228725" cy="937102"/>
+          </a:xfrm>
+          <a:prstGeom prst="line">
+            <a:avLst/>
+          </a:prstGeom>
+          <a:ln w="190500">
+            <a:solidFill>
+              <a:schemeClr val="bg1"/>
+            </a:solidFill>
+          </a:ln>
+        </p:spPr>
+        <p:style>
+          <a:lnRef idx="1">
+            <a:schemeClr val="accent1"/>
+          </a:lnRef>
+          <a:fillRef idx="0">
+            <a:schemeClr val="accent1"/>
+          </a:fillRef>
+          <a:effectRef idx="0">
+            <a:schemeClr val="accent1"/>
+          </a:effectRef>
+          <a:fontRef idx="minor">
+            <a:schemeClr val="tx1"/>
+          </a:fontRef>
+        </p:style>
+      </p:cxnSp>
+      <p:sp>
+        <p:nvSpPr>
+          <p:cNvPr id="13" name="Line Callout 2 (Accent Bar) 4">
+            <a:extLst>
+              <a:ext uri="{FF2B5EF4-FFF2-40B4-BE49-F238E27FC236}">
+                <a16:creationId xmlns:a16="http://schemas.microsoft.com/office/drawing/2014/main" id="{218B7C8E-0342-4CB2-8F37-63ECAB33323C}"/>
+              </a:ext>
+            </a:extLst>
+          </p:cNvPr>
+          <p:cNvSpPr/>
+          <p:nvPr/>
+        </p:nvSpPr>
+        <p:spPr bwMode="gray">
+          <a:xfrm flipH="1">
+            <a:off x="9796455" y="1359888"/>
+            <a:ext cx="2109793" cy="753409"/>
+          </a:xfrm>
+          <a:prstGeom prst="accentCallout2">
+            <a:avLst>
+              <a:gd name="adj1" fmla="val 43021"/>
+              <a:gd name="adj2" fmla="val 103931"/>
+              <a:gd name="adj3" fmla="val 175383"/>
+              <a:gd name="adj4" fmla="val 131624"/>
+              <a:gd name="adj5" fmla="val 175236"/>
+              <a:gd name="adj6" fmla="val 203030"/>
+            </a:avLst>
+          </a:prstGeom>
+          <a:solidFill>
+            <a:schemeClr val="bg1">
+              <a:lumMod val="95000"/>
+            </a:schemeClr>
+          </a:solidFill>
+          <a:ln w="19050">
+            <a:solidFill>
+              <a:schemeClr val="tx1">
+                <a:lumMod val="95000"/>
+                <a:lumOff val="5000"/>
+              </a:schemeClr>
+            </a:solidFill>
+            <a:headEnd type="oval" w="med" len="med"/>
+            <a:tailEnd type="oval" w="med" len="med"/>
+          </a:ln>
+        </p:spPr>
+        <p:style>
+          <a:lnRef idx="2">
+            <a:schemeClr val="accent2">
+              <a:shade val="50000"/>
+            </a:schemeClr>
+          </a:lnRef>
+          <a:fillRef idx="1">
+            <a:schemeClr val="accent2"/>
+          </a:fillRef>
+          <a:effectRef idx="0">
+            <a:schemeClr val="accent2"/>
+          </a:effectRef>
+          <a:fontRef idx="minor">
+            <a:schemeClr val="lt1"/>
+          </a:fontRef>
+        </p:style>
+        <p:txBody>
+          <a:bodyPr lIns="108000" tIns="72000" rIns="108000" bIns="72000" rtlCol="0" anchor="t" anchorCtr="0"/>
           <a:lstStyle/>
           <a:p>
+            <a:pPr/>
+            <a:r>
+              <a:rPr lang="en-US" sz="1050" dirty="0">
+                <a:solidFill>
+                  <a:schemeClr val="tx1"/>
+                </a:solidFill>
+                <a:latin typeface="Segoe UI Light" panose="020B0502040204020203" pitchFamily="34" charset="0"/>
+                <a:cs typeface="Segoe UI Light" panose="020B0502040204020203" pitchFamily="34" charset="0"/>
+              </a:rPr>
+              <a:t>Intention to use </a:t>
+            </a:r>
+            <a:r>
+              <a:rPr lang="en-US" sz="1050" b="1" dirty="0">
+                <a:solidFill>
+                  <a:schemeClr val="tx1"/>
+                </a:solidFill>
+                <a:latin typeface="Segoe UI Light" panose="020B0502040204020203" pitchFamily="34" charset="0"/>
+                <a:cs typeface="Segoe UI Light" panose="020B0502040204020203" pitchFamily="34" charset="0"/>
+              </a:rPr>
+              <a:t>long-term contracts</a:t>
+            </a:r>
+            <a:r>
+              <a:rPr lang="en-US" sz="1050" dirty="0">
+                <a:solidFill>
+                  <a:schemeClr val="tx1"/>
+                </a:solidFill>
+                <a:latin typeface="Segoe UI Light" panose="020B0502040204020203" pitchFamily="34" charset="0"/>
+                <a:cs typeface="Segoe UI Light" panose="020B0502040204020203" pitchFamily="34" charset="0"/>
+              </a:rPr>
+              <a:t> to protect Group 1 exporters from </a:t>
+            </a:r>
+            <a:r>
+              <a:rPr lang="en-US" sz="1050" dirty="0" smtClean="0">
+                <a:solidFill>
+                  <a:schemeClr val="tx1"/>
+                </a:solidFill>
+                <a:latin typeface="Segoe UI Light" panose="020B0502040204020203" pitchFamily="34" charset="0"/>
+                <a:cs typeface="Segoe UI Light" panose="020B0502040204020203" pitchFamily="34" charset="0"/>
+              </a:rPr>
+              <a:t>unfavorable </a:t>
+            </a:r>
+            <a:r>
+              <a:rPr lang="en-US" sz="1050" dirty="0">
+                <a:solidFill>
+                  <a:schemeClr val="tx1"/>
+                </a:solidFill>
+                <a:latin typeface="Segoe UI Light" panose="020B0502040204020203" pitchFamily="34" charset="0"/>
+                <a:cs typeface="Segoe UI Light" panose="020B0502040204020203" pitchFamily="34" charset="0"/>
+              </a:rPr>
+              <a:t>developments in the LNG market</a:t>
+            </a:r>
+            <a:endParaRPr lang="en-US" sz="1050" dirty="0">
+              <a:solidFill>
+                <a:schemeClr val="tx1"/>
+              </a:solidFill>
+              <a:latin typeface="Segoe UI Light" panose="020B0502040204020203" pitchFamily="34" charset="0"/>
+              <a:cs typeface="Segoe UI Light" panose="020B0502040204020203" pitchFamily="34" charset="0"/>
+            </a:endParaRPr>
+          </a:p>
+        </p:txBody>
+      </p:sp>
+      <p:sp>
+        <p:nvSpPr>
+          <p:cNvPr id="15" name="Line Callout 2 (Accent Bar) 4">
+            <a:extLst>
+              <a:ext uri="{FF2B5EF4-FFF2-40B4-BE49-F238E27FC236}">
+                <a16:creationId xmlns:a16="http://schemas.microsoft.com/office/drawing/2014/main" id="{218B7C8E-0342-4CB2-8F37-63ECAB33323C}"/>
+              </a:ext>
+            </a:extLst>
+          </p:cNvPr>
+          <p:cNvSpPr/>
+          <p:nvPr/>
+        </p:nvSpPr>
+        <p:spPr bwMode="gray">
+          <a:xfrm flipH="1">
+            <a:off x="3924300" y="5923792"/>
+            <a:ext cx="1923682" cy="638677"/>
+          </a:xfrm>
+          <a:prstGeom prst="accentCallout2">
+            <a:avLst>
+              <a:gd name="adj1" fmla="val 40265"/>
+              <a:gd name="adj2" fmla="val -3518"/>
+              <a:gd name="adj3" fmla="val 40108"/>
+              <a:gd name="adj4" fmla="val -180790"/>
+              <a:gd name="adj5" fmla="val -267972"/>
+              <a:gd name="adj6" fmla="val -236159"/>
+            </a:avLst>
+          </a:prstGeom>
+          <a:solidFill>
+            <a:schemeClr val="bg1">
+              <a:lumMod val="95000"/>
+            </a:schemeClr>
+          </a:solidFill>
+          <a:ln w="19050">
+            <a:solidFill>
+              <a:schemeClr val="tx1">
+                <a:lumMod val="95000"/>
+                <a:lumOff val="5000"/>
+              </a:schemeClr>
+            </a:solidFill>
+            <a:headEnd type="oval" w="med" len="med"/>
+            <a:tailEnd type="oval" w="med" len="med"/>
+          </a:ln>
+        </p:spPr>
+        <p:style>
+          <a:lnRef idx="2">
+            <a:schemeClr val="accent2">
+              <a:shade val="50000"/>
+            </a:schemeClr>
+          </a:lnRef>
+          <a:fillRef idx="1">
+            <a:schemeClr val="accent2"/>
+          </a:fillRef>
+          <a:effectRef idx="0">
+            <a:schemeClr val="accent2"/>
+          </a:effectRef>
+          <a:fontRef idx="minor">
+            <a:schemeClr val="lt1"/>
+          </a:fontRef>
+        </p:style>
+        <p:txBody>
+          <a:bodyPr lIns="108000" tIns="72000" rIns="108000" bIns="72000" rtlCol="0" anchor="t" anchorCtr="0"/>
+          <a:lstStyle/>
+          <a:p>
+            <a:pPr/>
+            <a:r>
+              <a:rPr lang="en-US" sz="1050" dirty="0" smtClean="0">
+                <a:solidFill>
+                  <a:schemeClr val="tx1"/>
+                </a:solidFill>
+                <a:latin typeface="Segoe UI Light" panose="020B0502040204020203" pitchFamily="34" charset="0"/>
+                <a:cs typeface="Segoe UI Light" panose="020B0502040204020203" pitchFamily="34" charset="0"/>
+              </a:rPr>
+              <a:t>Characteristic </a:t>
+            </a:r>
+            <a:r>
+              <a:rPr lang="en-US" sz="1050" b="1" dirty="0" smtClean="0">
+                <a:solidFill>
+                  <a:schemeClr val="tx1"/>
+                </a:solidFill>
+                <a:latin typeface="Segoe UI Light" panose="020B0502040204020203" pitchFamily="34" charset="0"/>
+                <a:cs typeface="Segoe UI Light" panose="020B0502040204020203" pitchFamily="34" charset="0"/>
+              </a:rPr>
+              <a:t>seasonality</a:t>
+            </a:r>
+            <a:r>
+              <a:rPr lang="en-US" sz="1050" dirty="0" smtClean="0">
+                <a:solidFill>
+                  <a:schemeClr val="tx1"/>
+                </a:solidFill>
+                <a:latin typeface="Segoe UI Light" panose="020B0502040204020203" pitchFamily="34" charset="0"/>
+                <a:cs typeface="Segoe UI Light" panose="020B0502040204020203" pitchFamily="34" charset="0"/>
+              </a:rPr>
+              <a:t> of gas market and </a:t>
+            </a:r>
+            <a:r>
+              <a:rPr lang="en-US" sz="1050" b="1" dirty="0" smtClean="0">
+                <a:solidFill>
+                  <a:schemeClr val="tx1"/>
+                </a:solidFill>
+                <a:latin typeface="Segoe UI Light" panose="020B0502040204020203" pitchFamily="34" charset="0"/>
+                <a:cs typeface="Segoe UI Light" panose="020B0502040204020203" pitchFamily="34" charset="0"/>
+              </a:rPr>
+              <a:t>limited</a:t>
+            </a:r>
+            <a:r>
+              <a:rPr lang="en-US" sz="1050" dirty="0" smtClean="0">
+                <a:solidFill>
+                  <a:schemeClr val="tx1"/>
+                </a:solidFill>
+                <a:latin typeface="Segoe UI Light" panose="020B0502040204020203" pitchFamily="34" charset="0"/>
+                <a:cs typeface="Segoe UI Light" panose="020B0502040204020203" pitchFamily="34" charset="0"/>
+              </a:rPr>
+              <a:t> LNG </a:t>
+            </a:r>
+            <a:r>
+              <a:rPr lang="en-US" sz="1050" b="1" dirty="0" smtClean="0">
+                <a:solidFill>
+                  <a:schemeClr val="tx1"/>
+                </a:solidFill>
+                <a:latin typeface="Segoe UI Light" panose="020B0502040204020203" pitchFamily="34" charset="0"/>
+                <a:cs typeface="Segoe UI Light" panose="020B0502040204020203" pitchFamily="34" charset="0"/>
+              </a:rPr>
+              <a:t>storage</a:t>
+            </a:r>
+            <a:r>
+              <a:rPr lang="en-US" sz="1050" dirty="0" smtClean="0">
+                <a:solidFill>
+                  <a:schemeClr val="tx1"/>
+                </a:solidFill>
+                <a:latin typeface="Segoe UI Light" panose="020B0502040204020203" pitchFamily="34" charset="0"/>
+                <a:cs typeface="Segoe UI Light" panose="020B0502040204020203" pitchFamily="34" charset="0"/>
+              </a:rPr>
+              <a:t> capacities (e.g., China)</a:t>
+            </a:r>
+            <a:endParaRPr lang="en-US" sz="1050" dirty="0">
+              <a:solidFill>
+                <a:schemeClr val="tx1"/>
+              </a:solidFill>
+              <a:latin typeface="Segoe UI Light" panose="020B0502040204020203" pitchFamily="34" charset="0"/>
+              <a:cs typeface="Segoe UI Light" panose="020B0502040204020203" pitchFamily="34" charset="0"/>
+            </a:endParaRPr>
+          </a:p>
+        </p:txBody>
+      </p:sp>
+      <p:sp>
+        <p:nvSpPr>
+          <p:cNvPr id="16" name="Fußzeilenplatzhalter 8"/>
+          <p:cNvSpPr txBox="1">
+            <a:spLocks/>
+          </p:cNvSpPr>
+          <p:nvPr/>
+        </p:nvSpPr>
+        <p:spPr>
+          <a:xfrm>
+            <a:off x="7360672" y="5686380"/>
+            <a:ext cx="2211940" cy="246221"/>
+          </a:xfrm>
+          <a:prstGeom prst="rect">
+            <a:avLst/>
+          </a:prstGeom>
+        </p:spPr>
+        <p:txBody>
+          <a:bodyPr vert="horz" lIns="91440" tIns="45720" rIns="91440" bIns="45720" rtlCol="0" anchor="b" anchorCtr="0">
+            <a:noAutofit/>
+          </a:bodyPr>
+          <a:lstStyle>
+            <a:defPPr>
+              <a:defRPr lang="en-US"/>
+            </a:defPPr>
+            <a:lvl1pPr marL="0" algn="r" defTabSz="914400" rtl="0" eaLnBrk="1" latinLnBrk="0" hangingPunct="1">
+              <a:defRPr sz="1000" kern="1200">
+                <a:solidFill>
+                  <a:schemeClr val="tx1">
+                    <a:tint val="75000"/>
+                  </a:schemeClr>
+                </a:solidFill>
+                <a:latin typeface="Tahoma" panose="020B0604030504040204" pitchFamily="34" charset="0"/>
+                <a:ea typeface="Tahoma" panose="020B0604030504040204" pitchFamily="34" charset="0"/>
+                <a:cs typeface="Tahoma" panose="020B0604030504040204" pitchFamily="34" charset="0"/>
+              </a:defRPr>
+            </a:lvl1pPr>
+            <a:lvl2pPr marL="457200" algn="l" defTabSz="914400" rtl="0" eaLnBrk="1" latinLnBrk="0" hangingPunct="1">
+              <a:defRPr sz="1800" kern="1200">
+                <a:solidFill>
+                  <a:schemeClr val="tx1"/>
+                </a:solidFill>
+                <a:latin typeface="+mn-lt"/>
+                <a:ea typeface="+mn-ea"/>
+                <a:cs typeface="+mn-cs"/>
+              </a:defRPr>
+            </a:lvl2pPr>
+            <a:lvl3pPr marL="914400" algn="l" defTabSz="914400" rtl="0" eaLnBrk="1" latinLnBrk="0" hangingPunct="1">
+              <a:defRPr sz="1800" kern="1200">
+                <a:solidFill>
+                  <a:schemeClr val="tx1"/>
+                </a:solidFill>
+                <a:latin typeface="+mn-lt"/>
+                <a:ea typeface="+mn-ea"/>
+                <a:cs typeface="+mn-cs"/>
+              </a:defRPr>
+            </a:lvl3pPr>
+            <a:lvl4pPr marL="1371600" algn="l" defTabSz="914400" rtl="0" eaLnBrk="1" latinLnBrk="0" hangingPunct="1">
+              <a:defRPr sz="1800" kern="1200">
+                <a:solidFill>
+                  <a:schemeClr val="tx1"/>
+                </a:solidFill>
+                <a:latin typeface="+mn-lt"/>
+                <a:ea typeface="+mn-ea"/>
+                <a:cs typeface="+mn-cs"/>
+              </a:defRPr>
+            </a:lvl4pPr>
+            <a:lvl5pPr marL="1828800" algn="l" defTabSz="914400" rtl="0" eaLnBrk="1" latinLnBrk="0" hangingPunct="1">
+              <a:defRPr sz="1800" kern="1200">
+                <a:solidFill>
+                  <a:schemeClr val="tx1"/>
+                </a:solidFill>
+                <a:latin typeface="+mn-lt"/>
+                <a:ea typeface="+mn-ea"/>
+                <a:cs typeface="+mn-cs"/>
+              </a:defRPr>
+            </a:lvl5pPr>
+            <a:lvl6pPr marL="2286000" algn="l" defTabSz="914400" rtl="0" eaLnBrk="1" latinLnBrk="0" hangingPunct="1">
+              <a:defRPr sz="1800" kern="1200">
+                <a:solidFill>
+                  <a:schemeClr val="tx1"/>
+                </a:solidFill>
+                <a:latin typeface="+mn-lt"/>
+                <a:ea typeface="+mn-ea"/>
+                <a:cs typeface="+mn-cs"/>
+              </a:defRPr>
+            </a:lvl6pPr>
+            <a:lvl7pPr marL="2743200" algn="l" defTabSz="914400" rtl="0" eaLnBrk="1" latinLnBrk="0" hangingPunct="1">
+              <a:defRPr sz="1800" kern="1200">
+                <a:solidFill>
+                  <a:schemeClr val="tx1"/>
+                </a:solidFill>
+                <a:latin typeface="+mn-lt"/>
+                <a:ea typeface="+mn-ea"/>
+                <a:cs typeface="+mn-cs"/>
+              </a:defRPr>
+            </a:lvl7pPr>
+            <a:lvl8pPr marL="3200400" algn="l" defTabSz="914400" rtl="0" eaLnBrk="1" latinLnBrk="0" hangingPunct="1">
+              <a:defRPr sz="1800" kern="1200">
+                <a:solidFill>
+                  <a:schemeClr val="tx1"/>
+                </a:solidFill>
+                <a:latin typeface="+mn-lt"/>
+                <a:ea typeface="+mn-ea"/>
+                <a:cs typeface="+mn-cs"/>
+              </a:defRPr>
+            </a:lvl8pPr>
+            <a:lvl9pPr marL="3657600" algn="l" defTabSz="914400" rtl="0" eaLnBrk="1" latinLnBrk="0" hangingPunct="1">
+              <a:defRPr sz="1800" kern="1200">
+                <a:solidFill>
+                  <a:schemeClr val="tx1"/>
+                </a:solidFill>
+                <a:latin typeface="+mn-lt"/>
+                <a:ea typeface="+mn-ea"/>
+                <a:cs typeface="+mn-cs"/>
+              </a:defRPr>
+            </a:lvl9pPr>
+          </a:lstStyle>
+          <a:p>
             <a:pPr algn="ctr"/>
             <a:r>
-              <a:rPr lang="en-US" dirty="0" smtClean="0"/>
-              <a:t>Results (6/6)</a:t>
-            </a:r>
-            <a:endParaRPr lang="en-GB" dirty="0"/>
+              <a:rPr lang="en-US" dirty="0" smtClean="0">
+                <a:solidFill>
+                  <a:schemeClr val="bg1">
+                    <a:lumMod val="50000"/>
+                  </a:schemeClr>
+                </a:solidFill>
+              </a:rPr>
+              <a:t>Fig: Shadow price of exporters</a:t>
+            </a:r>
+            <a:endParaRPr lang="en-GB" dirty="0">
+              <a:solidFill>
+                <a:schemeClr val="bg1">
+                  <a:lumMod val="50000"/>
+                </a:schemeClr>
+              </a:solidFill>
+            </a:endParaRPr>
           </a:p>
         </p:txBody>
       </p:sp>
@@ -11678,12 +12743,12 @@
       </p:sp>
       <p:sp>
         <p:nvSpPr>
-          <p:cNvPr id="5" name="Inhaltsplatzhalter 4"/>
+          <p:cNvPr id="4" name="Titel 3"/>
           <p:cNvSpPr>
             <a:spLocks noGrp="1"/>
           </p:cNvSpPr>
           <p:nvPr>
-            <p:ph sz="half" idx="1"/>
+            <p:ph type="title"/>
           </p:nvPr>
         </p:nvSpPr>
         <p:spPr/>
@@ -11691,50 +12756,1217 @@
           <a:bodyPr/>
           <a:lstStyle/>
           <a:p>
+            <a:r>
+              <a:rPr lang="en-US" dirty="0" smtClean="0"/>
+              <a:t>Global LNG market development </a:t>
+            </a:r>
+            <a:r>
+              <a:rPr lang="en-US" dirty="0" smtClean="0"/>
+              <a:t>until 2040</a:t>
+            </a:r>
+            <a:endParaRPr lang="en-US" dirty="0"/>
+          </a:p>
+        </p:txBody>
+      </p:sp>
+      <p:sp>
+        <p:nvSpPr>
+          <p:cNvPr id="6" name="TextBox 4">
+            <a:extLst>
+              <a:ext uri="{FF2B5EF4-FFF2-40B4-BE49-F238E27FC236}">
+                <a16:creationId xmlns:a16="http://schemas.microsoft.com/office/drawing/2014/main" id="{5CEB32EF-ED71-4BE6-A144-799910B73E69}"/>
+              </a:ext>
+            </a:extLst>
+          </p:cNvPr>
+          <p:cNvSpPr txBox="1"/>
+          <p:nvPr/>
+        </p:nvSpPr>
+        <p:spPr>
+          <a:xfrm>
+            <a:off x="8759778" y="951675"/>
+            <a:ext cx="2698798" cy="1286418"/>
+          </a:xfrm>
+          <a:prstGeom prst="wedgeRectCallout">
+            <a:avLst>
+              <a:gd name="adj1" fmla="val -83477"/>
+              <a:gd name="adj2" fmla="val -44852"/>
+            </a:avLst>
+          </a:prstGeom>
+          <a:solidFill>
+            <a:sysClr val="window" lastClr="FFFFFF"/>
+          </a:solidFill>
+          <a:ln w="6350" cap="flat" cmpd="sng" algn="ctr">
+            <a:solidFill>
+              <a:schemeClr val="bg1">
+                <a:lumMod val="50000"/>
+              </a:schemeClr>
+            </a:solidFill>
+            <a:prstDash val="solid"/>
+            <a:miter lim="800000"/>
+          </a:ln>
+          <a:effectLst/>
+        </p:spPr>
+        <p:txBody>
+          <a:bodyPr lIns="36000" tIns="36000" rIns="36000" bIns="36000" rtlCol="0" anchor="ctr"/>
+          <a:lstStyle>
+            <a:defPPr>
+              <a:defRPr lang="en-US"/>
+            </a:defPPr>
+            <a:lvl1pPr indent="-457200" algn="ctr">
+              <a:spcAft>
+                <a:spcPts val="200"/>
+              </a:spcAft>
+              <a:buSzPct val="100000"/>
+              <a:defRPr sz="1200">
+                <a:solidFill>
+                  <a:schemeClr val="tx1">
+                    <a:lumMod val="100000"/>
+                  </a:schemeClr>
+                </a:solidFill>
+                <a:latin typeface="Arial" panose="020B0604020202020204" pitchFamily="34" charset="0"/>
+              </a:defRPr>
+            </a:lvl1pPr>
+            <a:lvl2pPr marL="180000" lvl="1" indent="-180000" algn="ctr">
+              <a:spcAft>
+                <a:spcPts val="200"/>
+              </a:spcAft>
+              <a:buClr>
+                <a:schemeClr val="bg2">
+                  <a:lumMod val="100000"/>
+                </a:schemeClr>
+              </a:buClr>
+              <a:buSzPct val="100000"/>
+              <a:buFont typeface="Wingdings 2" panose="05020102010507070707" pitchFamily="18" charset="2"/>
+              <a:buChar char=""/>
+              <a:defRPr sz="1200">
+                <a:solidFill>
+                  <a:schemeClr val="tx1">
+                    <a:lumMod val="100000"/>
+                  </a:schemeClr>
+                </a:solidFill>
+                <a:latin typeface="Arial" panose="020B0604020202020204" pitchFamily="34" charset="0"/>
+              </a:defRPr>
+            </a:lvl2pPr>
+            <a:lvl3pPr marL="360363" lvl="2" indent="-180000" algn="ctr">
+              <a:spcAft>
+                <a:spcPts val="200"/>
+              </a:spcAft>
+              <a:buClr>
+                <a:schemeClr val="bg2">
+                  <a:lumMod val="100000"/>
+                </a:schemeClr>
+              </a:buClr>
+              <a:buSzPct val="100000"/>
+              <a:buFont typeface="Wingdings" panose="05000000000000000000" pitchFamily="2" charset="2"/>
+              <a:buChar char=""/>
+              <a:defRPr sz="1200">
+                <a:solidFill>
+                  <a:schemeClr val="tx1">
+                    <a:lumMod val="100000"/>
+                  </a:schemeClr>
+                </a:solidFill>
+                <a:latin typeface="Arial" panose="020B0604020202020204" pitchFamily="34" charset="0"/>
+              </a:defRPr>
+            </a:lvl3pPr>
+            <a:lvl4pPr marL="540000" lvl="3" indent="-180000" algn="ctr">
+              <a:spcAft>
+                <a:spcPts val="200"/>
+              </a:spcAft>
+              <a:buClr>
+                <a:schemeClr val="bg2">
+                  <a:lumMod val="100000"/>
+                </a:schemeClr>
+              </a:buClr>
+              <a:buSzPct val="100000"/>
+              <a:buFont typeface="Arial" panose="020B0604020202020204" pitchFamily="34" charset="0"/>
+              <a:buChar char="–"/>
+              <a:defRPr sz="1200">
+                <a:solidFill>
+                  <a:schemeClr val="tx1">
+                    <a:lumMod val="100000"/>
+                  </a:schemeClr>
+                </a:solidFill>
+                <a:latin typeface="Arial" panose="020B0604020202020204" pitchFamily="34" charset="0"/>
+              </a:defRPr>
+            </a:lvl4pPr>
+            <a:lvl5pPr marL="720725" lvl="4" indent="-180000" algn="ctr">
+              <a:spcAft>
+                <a:spcPts val="200"/>
+              </a:spcAft>
+              <a:buClr>
+                <a:schemeClr val="bg2">
+                  <a:lumMod val="100000"/>
+                </a:schemeClr>
+              </a:buClr>
+              <a:buSzPct val="100000"/>
+              <a:buFont typeface="Arial" panose="020B0604020202020204" pitchFamily="34" charset="0"/>
+              <a:buChar char="●"/>
+              <a:defRPr sz="1200">
+                <a:solidFill>
+                  <a:schemeClr val="tx1">
+                    <a:lumMod val="100000"/>
+                  </a:schemeClr>
+                </a:solidFill>
+                <a:latin typeface="Arial" panose="020B0604020202020204" pitchFamily="34" charset="0"/>
+              </a:defRPr>
+            </a:lvl5pPr>
+            <a:lvl6pPr marL="900000" lvl="5" indent="-180000" algn="ctr">
+              <a:spcAft>
+                <a:spcPts val="200"/>
+              </a:spcAft>
+              <a:buClr>
+                <a:schemeClr val="bg2">
+                  <a:lumMod val="100000"/>
+                </a:schemeClr>
+              </a:buClr>
+              <a:buSzPct val="100000"/>
+              <a:buFont typeface="Courier New" panose="02070309020205020404" pitchFamily="49" charset="0"/>
+              <a:buChar char="o"/>
+              <a:defRPr sz="1200">
+                <a:solidFill>
+                  <a:schemeClr val="tx1">
+                    <a:lumMod val="100000"/>
+                  </a:schemeClr>
+                </a:solidFill>
+                <a:latin typeface="Arial" panose="020B0604020202020204" pitchFamily="34" charset="0"/>
+              </a:defRPr>
+            </a:lvl6pPr>
+            <a:lvl7pPr marL="900000" lvl="6" indent="-180975" algn="ctr">
+              <a:spcAft>
+                <a:spcPts val="200"/>
+              </a:spcAft>
+              <a:buClr>
+                <a:schemeClr val="bg2">
+                  <a:lumMod val="100000"/>
+                </a:schemeClr>
+              </a:buClr>
+              <a:buSzPct val="100000"/>
+              <a:buFont typeface="Courier New" panose="02070309020205020404" pitchFamily="49" charset="0"/>
+              <a:buChar char="o"/>
+              <a:defRPr sz="1200">
+                <a:solidFill>
+                  <a:schemeClr val="tx1">
+                    <a:lumMod val="100000"/>
+                  </a:schemeClr>
+                </a:solidFill>
+                <a:latin typeface="Arial" panose="020B0604020202020204" pitchFamily="34" charset="0"/>
+              </a:defRPr>
+            </a:lvl7pPr>
+            <a:lvl8pPr marL="900000" lvl="7" indent="-180975" algn="ctr">
+              <a:spcAft>
+                <a:spcPts val="200"/>
+              </a:spcAft>
+              <a:buClr>
+                <a:schemeClr val="bg2">
+                  <a:lumMod val="100000"/>
+                </a:schemeClr>
+              </a:buClr>
+              <a:buSzPct val="100000"/>
+              <a:buFont typeface="Courier New" panose="02070309020205020404" pitchFamily="49" charset="0"/>
+              <a:buChar char="o"/>
+              <a:defRPr sz="1200">
+                <a:solidFill>
+                  <a:schemeClr val="tx1">
+                    <a:lumMod val="100000"/>
+                  </a:schemeClr>
+                </a:solidFill>
+                <a:latin typeface="Arial" panose="020B0604020202020204" pitchFamily="34" charset="0"/>
+              </a:defRPr>
+            </a:lvl8pPr>
+            <a:lvl9pPr marL="900000" lvl="8" indent="-180975" algn="ctr">
+              <a:spcAft>
+                <a:spcPts val="200"/>
+              </a:spcAft>
+              <a:buClr>
+                <a:schemeClr val="bg2">
+                  <a:lumMod val="100000"/>
+                </a:schemeClr>
+              </a:buClr>
+              <a:buSzPct val="100000"/>
+              <a:buFont typeface="Courier New" panose="02070309020205020404" pitchFamily="49" charset="0"/>
+              <a:buChar char="o"/>
+              <a:defRPr sz="1200">
+                <a:solidFill>
+                  <a:schemeClr val="tx1">
+                    <a:lumMod val="100000"/>
+                  </a:schemeClr>
+                </a:solidFill>
+                <a:latin typeface="Arial" panose="020B0604020202020204" pitchFamily="34" charset="0"/>
+              </a:defRPr>
+            </a:lvl9pPr>
+          </a:lstStyle>
+          <a:p>
+            <a:pPr marL="0" lvl="1" indent="0">
+              <a:buClr>
+                <a:srgbClr val="971B2F">
+                  <a:lumMod val="100000"/>
+                </a:srgbClr>
+              </a:buClr>
+              <a:buNone/>
+            </a:pPr>
+            <a:r>
+              <a:rPr kumimoji="0" lang="en-US" sz="1400" i="0" u="none" strike="noStrike" kern="0" cap="none" spc="0" normalizeH="0" baseline="0" noProof="0" dirty="0" smtClean="0">
+                <a:ln>
+                  <a:noFill/>
+                </a:ln>
+                <a:solidFill>
+                  <a:srgbClr val="2D2926"/>
+                </a:solidFill>
+                <a:effectLst/>
+                <a:uLnTx/>
+                <a:uFillTx/>
+                <a:latin typeface="Segoe UI Light" panose="020B0502040204020203" pitchFamily="34" charset="0"/>
+                <a:cs typeface="Segoe UI Light" panose="020B0502040204020203" pitchFamily="34" charset="0"/>
+                <a:sym typeface=""/>
+              </a:rPr>
+              <a:t>Assumption</a:t>
+            </a:r>
+            <a:r>
+              <a:rPr kumimoji="0" lang="en-US" sz="1400" b="1" i="0" u="none" strike="noStrike" kern="0" cap="none" spc="0" normalizeH="0" baseline="0" noProof="0" dirty="0" smtClean="0">
+                <a:ln>
+                  <a:noFill/>
+                </a:ln>
+                <a:solidFill>
+                  <a:srgbClr val="2D2926"/>
+                </a:solidFill>
+                <a:effectLst/>
+                <a:uLnTx/>
+                <a:uFillTx/>
+                <a:latin typeface="Segoe UI Light" panose="020B0502040204020203" pitchFamily="34" charset="0"/>
+                <a:cs typeface="Segoe UI Light" panose="020B0502040204020203" pitchFamily="34" charset="0"/>
+                <a:sym typeface=""/>
+              </a:rPr>
+              <a:t>: Steady growth </a:t>
+            </a:r>
+            <a:br>
+              <a:rPr kumimoji="0" lang="en-US" sz="1400" b="1" i="0" u="none" strike="noStrike" kern="0" cap="none" spc="0" normalizeH="0" baseline="0" noProof="0" dirty="0" smtClean="0">
+                <a:ln>
+                  <a:noFill/>
+                </a:ln>
+                <a:solidFill>
+                  <a:srgbClr val="2D2926"/>
+                </a:solidFill>
+                <a:effectLst/>
+                <a:uLnTx/>
+                <a:uFillTx/>
+                <a:latin typeface="Segoe UI Light" panose="020B0502040204020203" pitchFamily="34" charset="0"/>
+                <a:cs typeface="Segoe UI Light" panose="020B0502040204020203" pitchFamily="34" charset="0"/>
+                <a:sym typeface=""/>
+              </a:rPr>
+            </a:br>
+            <a:r>
+              <a:rPr kumimoji="0" lang="en-US" sz="1400" b="1" i="0" u="none" strike="noStrike" kern="0" cap="none" spc="0" normalizeH="0" baseline="0" noProof="0" dirty="0" smtClean="0">
+                <a:ln>
+                  <a:noFill/>
+                </a:ln>
+                <a:solidFill>
+                  <a:srgbClr val="2D2926"/>
+                </a:solidFill>
+                <a:effectLst/>
+                <a:uLnTx/>
+                <a:uFillTx/>
+                <a:latin typeface="Segoe UI Light" panose="020B0502040204020203" pitchFamily="34" charset="0"/>
+                <a:cs typeface="Segoe UI Light" panose="020B0502040204020203" pitchFamily="34" charset="0"/>
+                <a:sym typeface=""/>
+              </a:rPr>
+              <a:t>of global</a:t>
+            </a:r>
+            <a:r>
+              <a:rPr kumimoji="0" lang="en-US" sz="1400" b="1" i="0" u="none" strike="noStrike" kern="0" cap="none" spc="0" normalizeH="0" noProof="0" dirty="0" smtClean="0">
+                <a:ln>
+                  <a:noFill/>
+                </a:ln>
+                <a:solidFill>
+                  <a:srgbClr val="2D2926"/>
+                </a:solidFill>
+                <a:effectLst/>
+                <a:uLnTx/>
+                <a:uFillTx/>
+                <a:latin typeface="Segoe UI Light" panose="020B0502040204020203" pitchFamily="34" charset="0"/>
+                <a:cs typeface="Segoe UI Light" panose="020B0502040204020203" pitchFamily="34" charset="0"/>
+                <a:sym typeface=""/>
+              </a:rPr>
+              <a:t> LNG trade</a:t>
+            </a:r>
+          </a:p>
+          <a:p>
+            <a:pPr lvl="1" algn="l">
+              <a:buClr>
+                <a:srgbClr val="971B2F">
+                  <a:lumMod val="100000"/>
+                </a:srgbClr>
+              </a:buClr>
+            </a:pPr>
+            <a:r>
+              <a:rPr lang="en-US" kern="0" dirty="0" smtClean="0">
+                <a:solidFill>
+                  <a:schemeClr val="bg1">
+                    <a:lumMod val="50000"/>
+                  </a:schemeClr>
+                </a:solidFill>
+                <a:latin typeface="Segoe UI Light" panose="020B0502040204020203" pitchFamily="34" charset="0"/>
+                <a:cs typeface="Segoe UI Light" panose="020B0502040204020203" pitchFamily="34" charset="0"/>
+                <a:sym typeface=""/>
+              </a:rPr>
+              <a:t>Floating Storage and Re-Gasification Units (FSRU)</a:t>
+            </a:r>
+            <a:r>
+              <a:rPr lang="en-US" kern="0" dirty="0">
+                <a:solidFill>
+                  <a:schemeClr val="bg1">
+                    <a:lumMod val="50000"/>
+                  </a:schemeClr>
+                </a:solidFill>
+                <a:latin typeface="Segoe UI Light" panose="020B0502040204020203" pitchFamily="34" charset="0"/>
+                <a:cs typeface="Segoe UI Light" panose="020B0502040204020203" pitchFamily="34" charset="0"/>
+                <a:sym typeface=""/>
+              </a:rPr>
+              <a:t> </a:t>
+            </a:r>
+            <a:r>
+              <a:rPr lang="en-US" kern="0" dirty="0" smtClean="0">
+                <a:solidFill>
+                  <a:schemeClr val="bg1">
+                    <a:lumMod val="50000"/>
+                  </a:schemeClr>
+                </a:solidFill>
+                <a:latin typeface="Segoe UI Light" panose="020B0502040204020203" pitchFamily="34" charset="0"/>
+                <a:cs typeface="Segoe UI Light" panose="020B0502040204020203" pitchFamily="34" charset="0"/>
+                <a:sym typeface=""/>
+              </a:rPr>
+              <a:t>with low CAPEX</a:t>
+            </a:r>
+          </a:p>
+          <a:p>
+            <a:pPr lvl="1" algn="l">
+              <a:buClr>
+                <a:srgbClr val="971B2F">
+                  <a:lumMod val="100000"/>
+                </a:srgbClr>
+              </a:buClr>
+            </a:pPr>
+            <a:r>
+              <a:rPr lang="en-US" kern="0" dirty="0" smtClean="0">
+                <a:solidFill>
+                  <a:schemeClr val="bg1">
+                    <a:lumMod val="50000"/>
+                  </a:schemeClr>
+                </a:solidFill>
+                <a:latin typeface="Segoe UI Light" panose="020B0502040204020203" pitchFamily="34" charset="0"/>
+                <a:cs typeface="Segoe UI Light" panose="020B0502040204020203" pitchFamily="34" charset="0"/>
+                <a:sym typeface=""/>
+              </a:rPr>
+              <a:t>“LNG to power” possibility with FSRU</a:t>
+            </a:r>
+          </a:p>
+          <a:p>
+            <a:pPr lvl="1" algn="l">
+              <a:buClr>
+                <a:srgbClr val="971B2F">
+                  <a:lumMod val="100000"/>
+                </a:srgbClr>
+              </a:buClr>
+            </a:pPr>
+            <a:r>
+              <a:rPr lang="en-US" kern="0" dirty="0" smtClean="0">
+                <a:solidFill>
+                  <a:schemeClr val="bg1">
+                    <a:lumMod val="50000"/>
+                  </a:schemeClr>
+                </a:solidFill>
+                <a:latin typeface="Segoe UI Light" panose="020B0502040204020203" pitchFamily="34" charset="0"/>
+                <a:cs typeface="Segoe UI Light" panose="020B0502040204020203" pitchFamily="34" charset="0"/>
+                <a:sym typeface=""/>
+              </a:rPr>
+              <a:t>Much shorter time for realization</a:t>
+            </a:r>
+          </a:p>
+        </p:txBody>
+      </p:sp>
+      <p:pic>
+        <p:nvPicPr>
+          <p:cNvPr id="3" name="Grafik 2"/>
+          <p:cNvPicPr>
+            <a:picLocks noChangeAspect="1"/>
+          </p:cNvPicPr>
+          <p:nvPr/>
+        </p:nvPicPr>
+        <p:blipFill>
+          <a:blip r:embed="rId3"/>
+          <a:stretch>
+            <a:fillRect/>
+          </a:stretch>
+        </p:blipFill>
+        <p:spPr>
+          <a:xfrm>
+            <a:off x="1093222" y="1105102"/>
+            <a:ext cx="6267450" cy="5328422"/>
+          </a:xfrm>
+          <a:prstGeom prst="rect">
+            <a:avLst/>
+          </a:prstGeom>
+        </p:spPr>
+      </p:pic>
+      <p:sp>
+        <p:nvSpPr>
+          <p:cNvPr id="7" name="Textfeld 6"/>
+          <p:cNvSpPr txBox="1"/>
+          <p:nvPr/>
+        </p:nvSpPr>
+        <p:spPr>
+          <a:xfrm>
+            <a:off x="6677253" y="1385193"/>
+            <a:ext cx="495071" cy="577081"/>
+          </a:xfrm>
+          <a:prstGeom prst="rect">
+            <a:avLst/>
+          </a:prstGeom>
+          <a:solidFill>
+            <a:schemeClr val="bg1"/>
+          </a:solidFill>
+        </p:spPr>
+        <p:txBody>
+          <a:bodyPr wrap="square" rtlCol="0" anchor="ctr">
+            <a:spAutoFit/>
+          </a:bodyPr>
+          <a:lstStyle/>
+          <a:p>
+            <a:r>
+              <a:rPr lang="en-US" sz="1050" b="1" dirty="0" smtClean="0">
+                <a:latin typeface="Segoe UI Light" panose="020B0502040204020203" pitchFamily="34" charset="0"/>
+                <a:cs typeface="Segoe UI Light" panose="020B0502040204020203" pitchFamily="34" charset="0"/>
+              </a:rPr>
+              <a:t>2019</a:t>
+            </a:r>
+            <a:br>
+              <a:rPr lang="en-US" sz="1050" b="1" dirty="0" smtClean="0">
+                <a:latin typeface="Segoe UI Light" panose="020B0502040204020203" pitchFamily="34" charset="0"/>
+                <a:cs typeface="Segoe UI Light" panose="020B0502040204020203" pitchFamily="34" charset="0"/>
+              </a:rPr>
+            </a:br>
+            <a:r>
+              <a:rPr lang="en-US" sz="1050" b="1" dirty="0" smtClean="0">
+                <a:latin typeface="Segoe UI Light" panose="020B0502040204020203" pitchFamily="34" charset="0"/>
+                <a:cs typeface="Segoe UI Light" panose="020B0502040204020203" pitchFamily="34" charset="0"/>
+              </a:rPr>
+              <a:t>2030</a:t>
+            </a:r>
+            <a:br>
+              <a:rPr lang="en-US" sz="1050" b="1" dirty="0" smtClean="0">
+                <a:latin typeface="Segoe UI Light" panose="020B0502040204020203" pitchFamily="34" charset="0"/>
+                <a:cs typeface="Segoe UI Light" panose="020B0502040204020203" pitchFamily="34" charset="0"/>
+              </a:rPr>
+            </a:br>
+            <a:r>
+              <a:rPr lang="en-US" sz="1050" b="1" dirty="0" smtClean="0">
+                <a:latin typeface="Segoe UI Light" panose="020B0502040204020203" pitchFamily="34" charset="0"/>
+                <a:cs typeface="Segoe UI Light" panose="020B0502040204020203" pitchFamily="34" charset="0"/>
+              </a:rPr>
+              <a:t>2040</a:t>
+            </a:r>
+            <a:endParaRPr lang="en-US" sz="1050" b="1" dirty="0">
+              <a:latin typeface="Segoe UI Light" panose="020B0502040204020203" pitchFamily="34" charset="0"/>
+              <a:cs typeface="Segoe UI Light" panose="020B0502040204020203" pitchFamily="34" charset="0"/>
+            </a:endParaRPr>
+          </a:p>
+        </p:txBody>
+      </p:sp>
+      <p:sp>
+        <p:nvSpPr>
+          <p:cNvPr id="10" name="Textfeld 9"/>
+          <p:cNvSpPr txBox="1"/>
+          <p:nvPr/>
+        </p:nvSpPr>
+        <p:spPr>
+          <a:xfrm>
+            <a:off x="6182182" y="1372012"/>
+            <a:ext cx="495071" cy="577081"/>
+          </a:xfrm>
+          <a:prstGeom prst="rect">
+            <a:avLst/>
+          </a:prstGeom>
+          <a:solidFill>
+            <a:schemeClr val="bg1"/>
+          </a:solidFill>
+        </p:spPr>
+        <p:txBody>
+          <a:bodyPr wrap="square" rtlCol="0" anchor="ctr">
+            <a:spAutoFit/>
+          </a:bodyPr>
+          <a:lstStyle/>
+          <a:p>
+            <a:r>
+              <a:rPr lang="en-US" sz="1050" dirty="0" smtClean="0">
+                <a:solidFill>
+                  <a:schemeClr val="bg1"/>
+                </a:solidFill>
+                <a:latin typeface="Segoe UI Light" panose="020B0502040204020203" pitchFamily="34" charset="0"/>
+                <a:cs typeface="Segoe UI Light" panose="020B0502040204020203" pitchFamily="34" charset="0"/>
+              </a:rPr>
+              <a:t>2019</a:t>
+            </a:r>
+            <a:br>
+              <a:rPr lang="en-US" sz="1050" dirty="0" smtClean="0">
+                <a:solidFill>
+                  <a:schemeClr val="bg1"/>
+                </a:solidFill>
+                <a:latin typeface="Segoe UI Light" panose="020B0502040204020203" pitchFamily="34" charset="0"/>
+                <a:cs typeface="Segoe UI Light" panose="020B0502040204020203" pitchFamily="34" charset="0"/>
+              </a:rPr>
+            </a:br>
+            <a:r>
+              <a:rPr lang="en-US" sz="1050" dirty="0" smtClean="0">
+                <a:solidFill>
+                  <a:schemeClr val="bg1"/>
+                </a:solidFill>
+                <a:latin typeface="Segoe UI Light" panose="020B0502040204020203" pitchFamily="34" charset="0"/>
+                <a:cs typeface="Segoe UI Light" panose="020B0502040204020203" pitchFamily="34" charset="0"/>
+              </a:rPr>
+              <a:t>2030</a:t>
+            </a:r>
+            <a:br>
+              <a:rPr lang="en-US" sz="1050" dirty="0" smtClean="0">
+                <a:solidFill>
+                  <a:schemeClr val="bg1"/>
+                </a:solidFill>
+                <a:latin typeface="Segoe UI Light" panose="020B0502040204020203" pitchFamily="34" charset="0"/>
+                <a:cs typeface="Segoe UI Light" panose="020B0502040204020203" pitchFamily="34" charset="0"/>
+              </a:rPr>
+            </a:br>
+            <a:r>
+              <a:rPr lang="en-US" sz="1050" dirty="0" smtClean="0">
+                <a:solidFill>
+                  <a:schemeClr val="bg1"/>
+                </a:solidFill>
+                <a:latin typeface="Segoe UI Light" panose="020B0502040204020203" pitchFamily="34" charset="0"/>
+                <a:cs typeface="Segoe UI Light" panose="020B0502040204020203" pitchFamily="34" charset="0"/>
+              </a:rPr>
+              <a:t>2040</a:t>
+            </a:r>
+            <a:endParaRPr lang="en-US" sz="1050" dirty="0">
+              <a:solidFill>
+                <a:schemeClr val="bg1"/>
+              </a:solidFill>
+              <a:latin typeface="Segoe UI Light" panose="020B0502040204020203" pitchFamily="34" charset="0"/>
+              <a:cs typeface="Segoe UI Light" panose="020B0502040204020203" pitchFamily="34" charset="0"/>
+            </a:endParaRPr>
+          </a:p>
+        </p:txBody>
+      </p:sp>
+      <p:sp>
+        <p:nvSpPr>
+          <p:cNvPr id="8" name="Rechteck 7"/>
+          <p:cNvSpPr/>
+          <p:nvPr/>
+        </p:nvSpPr>
+        <p:spPr>
+          <a:xfrm>
+            <a:off x="6429717" y="1479948"/>
+            <a:ext cx="290512" cy="83344"/>
+          </a:xfrm>
+          <a:prstGeom prst="rect">
+            <a:avLst/>
+          </a:prstGeom>
+          <a:ln>
+            <a:noFill/>
+          </a:ln>
+        </p:spPr>
+        <p:style>
+          <a:lnRef idx="2">
+            <a:schemeClr val="accent1">
+              <a:shade val="50000"/>
+            </a:schemeClr>
+          </a:lnRef>
+          <a:fillRef idx="1">
+            <a:schemeClr val="accent1"/>
+          </a:fillRef>
+          <a:effectRef idx="0">
+            <a:schemeClr val="accent1"/>
+          </a:effectRef>
+          <a:fontRef idx="minor">
+            <a:schemeClr val="lt1"/>
+          </a:fontRef>
+        </p:style>
+        <p:txBody>
+          <a:bodyPr rtlCol="0" anchor="ctr"/>
+          <a:lstStyle/>
+          <a:p>
+            <a:pPr algn="ctr"/>
             <a:endParaRPr lang="en-US"/>
           </a:p>
         </p:txBody>
       </p:sp>
       <p:sp>
         <p:nvSpPr>
-          <p:cNvPr id="4" name="Titel 3"/>
-          <p:cNvSpPr>
-            <a:spLocks noGrp="1"/>
-          </p:cNvSpPr>
-          <p:nvPr>
-            <p:ph type="title"/>
-          </p:nvPr>
-        </p:nvSpPr>
-        <p:spPr/>
-        <p:txBody>
-          <a:bodyPr/>
+          <p:cNvPr id="11" name="Rechteck 10"/>
+          <p:cNvSpPr/>
+          <p:nvPr/>
+        </p:nvSpPr>
+        <p:spPr>
+          <a:xfrm>
+            <a:off x="6429717" y="1646435"/>
+            <a:ext cx="290512" cy="83344"/>
+          </a:xfrm>
+          <a:prstGeom prst="rect">
+            <a:avLst/>
+          </a:prstGeom>
+          <a:solidFill>
+            <a:srgbClr val="FF9900"/>
+          </a:solidFill>
+          <a:ln>
+            <a:noFill/>
+          </a:ln>
+        </p:spPr>
+        <p:style>
+          <a:lnRef idx="2">
+            <a:schemeClr val="accent1">
+              <a:shade val="50000"/>
+            </a:schemeClr>
+          </a:lnRef>
+          <a:fillRef idx="1">
+            <a:schemeClr val="accent1"/>
+          </a:fillRef>
+          <a:effectRef idx="0">
+            <a:schemeClr val="accent1"/>
+          </a:effectRef>
+          <a:fontRef idx="minor">
+            <a:schemeClr val="lt1"/>
+          </a:fontRef>
+        </p:style>
+        <p:txBody>
+          <a:bodyPr rtlCol="0" anchor="ctr"/>
           <a:lstStyle/>
           <a:p>
-            <a:endParaRPr lang="en-US" dirty="0"/>
-          </a:p>
-        </p:txBody>
-      </p:sp>
-      <p:sp>
-        <p:nvSpPr>
-          <p:cNvPr id="9" name="Fußzeilenplatzhalter 8"/>
-          <p:cNvSpPr>
-            <a:spLocks noGrp="1"/>
-          </p:cNvSpPr>
-          <p:nvPr>
-            <p:ph type="ftr" sz="quarter" idx="3"/>
-          </p:nvPr>
-        </p:nvSpPr>
-        <p:spPr/>
-        <p:txBody>
-          <a:bodyPr/>
+            <a:pPr algn="ctr"/>
+            <a:endParaRPr lang="en-US"/>
+          </a:p>
+        </p:txBody>
+      </p:sp>
+      <p:sp>
+        <p:nvSpPr>
+          <p:cNvPr id="12" name="Rechteck 11"/>
+          <p:cNvSpPr/>
+          <p:nvPr/>
+        </p:nvSpPr>
+        <p:spPr>
+          <a:xfrm>
+            <a:off x="6429717" y="1797764"/>
+            <a:ext cx="290512" cy="83344"/>
+          </a:xfrm>
+          <a:prstGeom prst="rect">
+            <a:avLst/>
+          </a:prstGeom>
+          <a:solidFill>
+            <a:srgbClr val="5EC260"/>
+          </a:solidFill>
+          <a:ln>
+            <a:noFill/>
+          </a:ln>
+        </p:spPr>
+        <p:style>
+          <a:lnRef idx="2">
+            <a:schemeClr val="accent1">
+              <a:shade val="50000"/>
+            </a:schemeClr>
+          </a:lnRef>
+          <a:fillRef idx="1">
+            <a:schemeClr val="accent1"/>
+          </a:fillRef>
+          <a:effectRef idx="0">
+            <a:schemeClr val="accent1"/>
+          </a:effectRef>
+          <a:fontRef idx="minor">
+            <a:schemeClr val="lt1"/>
+          </a:fontRef>
+        </p:style>
+        <p:txBody>
+          <a:bodyPr rtlCol="0" anchor="ctr"/>
           <a:lstStyle/>
           <a:p>
             <a:pPr algn="ctr"/>
-            <a:r>
-              <a:rPr lang="en-US" dirty="0" smtClean="0"/>
-              <a:t>Results (6/6)</a:t>
-            </a:r>
-            <a:endParaRPr lang="en-GB" dirty="0"/>
+            <a:endParaRPr lang="en-US"/>
+          </a:p>
+        </p:txBody>
+      </p:sp>
+      <p:sp>
+        <p:nvSpPr>
+          <p:cNvPr id="13" name="Line Callout 2 (Accent Bar) 4">
+            <a:extLst>
+              <a:ext uri="{FF2B5EF4-FFF2-40B4-BE49-F238E27FC236}">
+                <a16:creationId xmlns:a16="http://schemas.microsoft.com/office/drawing/2014/main" id="{218B7C8E-0342-4CB2-8F37-63ECAB33323C}"/>
+              </a:ext>
+            </a:extLst>
+          </p:cNvPr>
+          <p:cNvSpPr/>
+          <p:nvPr/>
+        </p:nvSpPr>
+        <p:spPr bwMode="gray">
+          <a:xfrm flipH="1">
+            <a:off x="8091182" y="2769225"/>
+            <a:ext cx="1871802" cy="753409"/>
+          </a:xfrm>
+          <a:prstGeom prst="accentCallout2">
+            <a:avLst>
+              <a:gd name="adj1" fmla="val 43021"/>
+              <a:gd name="adj2" fmla="val 103931"/>
+              <a:gd name="adj3" fmla="val -146084"/>
+              <a:gd name="adj4" fmla="val 123832"/>
+              <a:gd name="adj5" fmla="val -145598"/>
+              <a:gd name="adj6" fmla="val 152260"/>
+            </a:avLst>
+          </a:prstGeom>
+          <a:solidFill>
+            <a:schemeClr val="bg1">
+              <a:lumMod val="95000"/>
+            </a:schemeClr>
+          </a:solidFill>
+          <a:ln w="19050">
+            <a:solidFill>
+              <a:schemeClr val="tx1">
+                <a:lumMod val="95000"/>
+                <a:lumOff val="5000"/>
+              </a:schemeClr>
+            </a:solidFill>
+            <a:headEnd type="oval" w="med" len="med"/>
+            <a:tailEnd type="oval" w="med" len="med"/>
+          </a:ln>
+        </p:spPr>
+        <p:style>
+          <a:lnRef idx="2">
+            <a:schemeClr val="accent2">
+              <a:shade val="50000"/>
+            </a:schemeClr>
+          </a:lnRef>
+          <a:fillRef idx="1">
+            <a:schemeClr val="accent2"/>
+          </a:fillRef>
+          <a:effectRef idx="0">
+            <a:schemeClr val="accent2"/>
+          </a:effectRef>
+          <a:fontRef idx="minor">
+            <a:schemeClr val="lt1"/>
+          </a:fontRef>
+        </p:style>
+        <p:txBody>
+          <a:bodyPr lIns="108000" tIns="72000" rIns="108000" bIns="72000" rtlCol="0" anchor="t" anchorCtr="0"/>
+          <a:lstStyle/>
+          <a:p>
+            <a:pPr/>
+            <a:r>
+              <a:rPr lang="en-US" sz="1050" dirty="0" smtClean="0">
+                <a:solidFill>
+                  <a:schemeClr val="tx1"/>
+                </a:solidFill>
+                <a:latin typeface="Segoe UI Light" panose="020B0502040204020203" pitchFamily="34" charset="0"/>
+                <a:cs typeface="Segoe UI Light" panose="020B0502040204020203" pitchFamily="34" charset="0"/>
+              </a:rPr>
+              <a:t>Geographical trend of LNG market prices in 2040 remain relatively the same compared </a:t>
+            </a:r>
+            <a:br>
+              <a:rPr lang="en-US" sz="1050" dirty="0" smtClean="0">
+                <a:solidFill>
+                  <a:schemeClr val="tx1"/>
+                </a:solidFill>
+                <a:latin typeface="Segoe UI Light" panose="020B0502040204020203" pitchFamily="34" charset="0"/>
+                <a:cs typeface="Segoe UI Light" panose="020B0502040204020203" pitchFamily="34" charset="0"/>
+              </a:rPr>
+            </a:br>
+            <a:r>
+              <a:rPr lang="en-US" sz="1050" dirty="0" smtClean="0">
+                <a:solidFill>
+                  <a:schemeClr val="tx1"/>
+                </a:solidFill>
+                <a:latin typeface="Segoe UI Light" panose="020B0502040204020203" pitchFamily="34" charset="0"/>
+                <a:cs typeface="Segoe UI Light" panose="020B0502040204020203" pitchFamily="34" charset="0"/>
+              </a:rPr>
+              <a:t>to 2019 </a:t>
+            </a:r>
+            <a:endParaRPr lang="en-US" sz="1050" dirty="0">
+              <a:solidFill>
+                <a:schemeClr val="tx1"/>
+              </a:solidFill>
+              <a:latin typeface="Segoe UI Light" panose="020B0502040204020203" pitchFamily="34" charset="0"/>
+              <a:cs typeface="Segoe UI Light" panose="020B0502040204020203" pitchFamily="34" charset="0"/>
+            </a:endParaRPr>
+          </a:p>
+        </p:txBody>
+      </p:sp>
+      <p:pic>
+        <p:nvPicPr>
+          <p:cNvPr id="14" name="Grafik 13"/>
+          <p:cNvPicPr>
+            <a:picLocks noChangeAspect="1"/>
+          </p:cNvPicPr>
+          <p:nvPr/>
+        </p:nvPicPr>
+        <p:blipFill rotWithShape="1">
+          <a:blip r:embed="rId4"/>
+          <a:srcRect b="10122"/>
+          <a:stretch/>
+        </p:blipFill>
+        <p:spPr>
+          <a:xfrm>
+            <a:off x="7858126" y="3721508"/>
+            <a:ext cx="3600450" cy="2364967"/>
+          </a:xfrm>
+          <a:prstGeom prst="rect">
+            <a:avLst/>
+          </a:prstGeom>
+        </p:spPr>
+      </p:pic>
+      <p:sp>
+        <p:nvSpPr>
+          <p:cNvPr id="15" name="Fußzeilenplatzhalter 8"/>
+          <p:cNvSpPr txBox="1">
+            <a:spLocks/>
+          </p:cNvSpPr>
+          <p:nvPr/>
+        </p:nvSpPr>
+        <p:spPr>
+          <a:xfrm>
+            <a:off x="2445083" y="1087615"/>
+            <a:ext cx="3413173" cy="246221"/>
+          </a:xfrm>
+          <a:prstGeom prst="rect">
+            <a:avLst/>
+          </a:prstGeom>
+        </p:spPr>
+        <p:txBody>
+          <a:bodyPr vert="horz" lIns="91440" tIns="45720" rIns="91440" bIns="45720" rtlCol="0" anchor="b" anchorCtr="0">
+            <a:noAutofit/>
+          </a:bodyPr>
+          <a:lstStyle>
+            <a:defPPr>
+              <a:defRPr lang="en-US"/>
+            </a:defPPr>
+            <a:lvl1pPr marL="0" algn="r" defTabSz="914400" rtl="0" eaLnBrk="1" latinLnBrk="0" hangingPunct="1">
+              <a:defRPr sz="1000" kern="1200">
+                <a:solidFill>
+                  <a:schemeClr val="tx1">
+                    <a:tint val="75000"/>
+                  </a:schemeClr>
+                </a:solidFill>
+                <a:latin typeface="Tahoma" panose="020B0604030504040204" pitchFamily="34" charset="0"/>
+                <a:ea typeface="Tahoma" panose="020B0604030504040204" pitchFamily="34" charset="0"/>
+                <a:cs typeface="Tahoma" panose="020B0604030504040204" pitchFamily="34" charset="0"/>
+              </a:defRPr>
+            </a:lvl1pPr>
+            <a:lvl2pPr marL="457200" algn="l" defTabSz="914400" rtl="0" eaLnBrk="1" latinLnBrk="0" hangingPunct="1">
+              <a:defRPr sz="1800" kern="1200">
+                <a:solidFill>
+                  <a:schemeClr val="tx1"/>
+                </a:solidFill>
+                <a:latin typeface="+mn-lt"/>
+                <a:ea typeface="+mn-ea"/>
+                <a:cs typeface="+mn-cs"/>
+              </a:defRPr>
+            </a:lvl2pPr>
+            <a:lvl3pPr marL="914400" algn="l" defTabSz="914400" rtl="0" eaLnBrk="1" latinLnBrk="0" hangingPunct="1">
+              <a:defRPr sz="1800" kern="1200">
+                <a:solidFill>
+                  <a:schemeClr val="tx1"/>
+                </a:solidFill>
+                <a:latin typeface="+mn-lt"/>
+                <a:ea typeface="+mn-ea"/>
+                <a:cs typeface="+mn-cs"/>
+              </a:defRPr>
+            </a:lvl3pPr>
+            <a:lvl4pPr marL="1371600" algn="l" defTabSz="914400" rtl="0" eaLnBrk="1" latinLnBrk="0" hangingPunct="1">
+              <a:defRPr sz="1800" kern="1200">
+                <a:solidFill>
+                  <a:schemeClr val="tx1"/>
+                </a:solidFill>
+                <a:latin typeface="+mn-lt"/>
+                <a:ea typeface="+mn-ea"/>
+                <a:cs typeface="+mn-cs"/>
+              </a:defRPr>
+            </a:lvl4pPr>
+            <a:lvl5pPr marL="1828800" algn="l" defTabSz="914400" rtl="0" eaLnBrk="1" latinLnBrk="0" hangingPunct="1">
+              <a:defRPr sz="1800" kern="1200">
+                <a:solidFill>
+                  <a:schemeClr val="tx1"/>
+                </a:solidFill>
+                <a:latin typeface="+mn-lt"/>
+                <a:ea typeface="+mn-ea"/>
+                <a:cs typeface="+mn-cs"/>
+              </a:defRPr>
+            </a:lvl5pPr>
+            <a:lvl6pPr marL="2286000" algn="l" defTabSz="914400" rtl="0" eaLnBrk="1" latinLnBrk="0" hangingPunct="1">
+              <a:defRPr sz="1800" kern="1200">
+                <a:solidFill>
+                  <a:schemeClr val="tx1"/>
+                </a:solidFill>
+                <a:latin typeface="+mn-lt"/>
+                <a:ea typeface="+mn-ea"/>
+                <a:cs typeface="+mn-cs"/>
+              </a:defRPr>
+            </a:lvl6pPr>
+            <a:lvl7pPr marL="2743200" algn="l" defTabSz="914400" rtl="0" eaLnBrk="1" latinLnBrk="0" hangingPunct="1">
+              <a:defRPr sz="1800" kern="1200">
+                <a:solidFill>
+                  <a:schemeClr val="tx1"/>
+                </a:solidFill>
+                <a:latin typeface="+mn-lt"/>
+                <a:ea typeface="+mn-ea"/>
+                <a:cs typeface="+mn-cs"/>
+              </a:defRPr>
+            </a:lvl7pPr>
+            <a:lvl8pPr marL="3200400" algn="l" defTabSz="914400" rtl="0" eaLnBrk="1" latinLnBrk="0" hangingPunct="1">
+              <a:defRPr sz="1800" kern="1200">
+                <a:solidFill>
+                  <a:schemeClr val="tx1"/>
+                </a:solidFill>
+                <a:latin typeface="+mn-lt"/>
+                <a:ea typeface="+mn-ea"/>
+                <a:cs typeface="+mn-cs"/>
+              </a:defRPr>
+            </a:lvl8pPr>
+            <a:lvl9pPr marL="3657600" algn="l" defTabSz="914400" rtl="0" eaLnBrk="1" latinLnBrk="0" hangingPunct="1">
+              <a:defRPr sz="1800" kern="1200">
+                <a:solidFill>
+                  <a:schemeClr val="tx1"/>
+                </a:solidFill>
+                <a:latin typeface="+mn-lt"/>
+                <a:ea typeface="+mn-ea"/>
+                <a:cs typeface="+mn-cs"/>
+              </a:defRPr>
+            </a:lvl9pPr>
+          </a:lstStyle>
+          <a:p>
+            <a:pPr algn="ctr"/>
+            <a:r>
+              <a:rPr lang="en-US" dirty="0" smtClean="0">
+                <a:solidFill>
+                  <a:schemeClr val="bg1">
+                    <a:lumMod val="50000"/>
+                  </a:schemeClr>
+                </a:solidFill>
+              </a:rPr>
+              <a:t>Fig: Weighted DES prices of importers until 2040</a:t>
+            </a:r>
+            <a:endParaRPr lang="en-GB" dirty="0">
+              <a:solidFill>
+                <a:schemeClr val="bg1">
+                  <a:lumMod val="50000"/>
+                </a:schemeClr>
+              </a:solidFill>
+            </a:endParaRPr>
+          </a:p>
+        </p:txBody>
+      </p:sp>
+      <p:sp>
+        <p:nvSpPr>
+          <p:cNvPr id="16" name="Fußzeilenplatzhalter 8"/>
+          <p:cNvSpPr txBox="1">
+            <a:spLocks/>
+          </p:cNvSpPr>
+          <p:nvPr/>
+        </p:nvSpPr>
+        <p:spPr>
+          <a:xfrm>
+            <a:off x="7951764" y="6078346"/>
+            <a:ext cx="3413173" cy="246221"/>
+          </a:xfrm>
+          <a:prstGeom prst="rect">
+            <a:avLst/>
+          </a:prstGeom>
+        </p:spPr>
+        <p:txBody>
+          <a:bodyPr vert="horz" lIns="91440" tIns="45720" rIns="91440" bIns="45720" rtlCol="0" anchor="b" anchorCtr="0">
+            <a:noAutofit/>
+          </a:bodyPr>
+          <a:lstStyle>
+            <a:defPPr>
+              <a:defRPr lang="en-US"/>
+            </a:defPPr>
+            <a:lvl1pPr marL="0" algn="r" defTabSz="914400" rtl="0" eaLnBrk="1" latinLnBrk="0" hangingPunct="1">
+              <a:defRPr sz="1000" kern="1200">
+                <a:solidFill>
+                  <a:schemeClr val="tx1">
+                    <a:tint val="75000"/>
+                  </a:schemeClr>
+                </a:solidFill>
+                <a:latin typeface="Tahoma" panose="020B0604030504040204" pitchFamily="34" charset="0"/>
+                <a:ea typeface="Tahoma" panose="020B0604030504040204" pitchFamily="34" charset="0"/>
+                <a:cs typeface="Tahoma" panose="020B0604030504040204" pitchFamily="34" charset="0"/>
+              </a:defRPr>
+            </a:lvl1pPr>
+            <a:lvl2pPr marL="457200" algn="l" defTabSz="914400" rtl="0" eaLnBrk="1" latinLnBrk="0" hangingPunct="1">
+              <a:defRPr sz="1800" kern="1200">
+                <a:solidFill>
+                  <a:schemeClr val="tx1"/>
+                </a:solidFill>
+                <a:latin typeface="+mn-lt"/>
+                <a:ea typeface="+mn-ea"/>
+                <a:cs typeface="+mn-cs"/>
+              </a:defRPr>
+            </a:lvl2pPr>
+            <a:lvl3pPr marL="914400" algn="l" defTabSz="914400" rtl="0" eaLnBrk="1" latinLnBrk="0" hangingPunct="1">
+              <a:defRPr sz="1800" kern="1200">
+                <a:solidFill>
+                  <a:schemeClr val="tx1"/>
+                </a:solidFill>
+                <a:latin typeface="+mn-lt"/>
+                <a:ea typeface="+mn-ea"/>
+                <a:cs typeface="+mn-cs"/>
+              </a:defRPr>
+            </a:lvl3pPr>
+            <a:lvl4pPr marL="1371600" algn="l" defTabSz="914400" rtl="0" eaLnBrk="1" latinLnBrk="0" hangingPunct="1">
+              <a:defRPr sz="1800" kern="1200">
+                <a:solidFill>
+                  <a:schemeClr val="tx1"/>
+                </a:solidFill>
+                <a:latin typeface="+mn-lt"/>
+                <a:ea typeface="+mn-ea"/>
+                <a:cs typeface="+mn-cs"/>
+              </a:defRPr>
+            </a:lvl4pPr>
+            <a:lvl5pPr marL="1828800" algn="l" defTabSz="914400" rtl="0" eaLnBrk="1" latinLnBrk="0" hangingPunct="1">
+              <a:defRPr sz="1800" kern="1200">
+                <a:solidFill>
+                  <a:schemeClr val="tx1"/>
+                </a:solidFill>
+                <a:latin typeface="+mn-lt"/>
+                <a:ea typeface="+mn-ea"/>
+                <a:cs typeface="+mn-cs"/>
+              </a:defRPr>
+            </a:lvl5pPr>
+            <a:lvl6pPr marL="2286000" algn="l" defTabSz="914400" rtl="0" eaLnBrk="1" latinLnBrk="0" hangingPunct="1">
+              <a:defRPr sz="1800" kern="1200">
+                <a:solidFill>
+                  <a:schemeClr val="tx1"/>
+                </a:solidFill>
+                <a:latin typeface="+mn-lt"/>
+                <a:ea typeface="+mn-ea"/>
+                <a:cs typeface="+mn-cs"/>
+              </a:defRPr>
+            </a:lvl6pPr>
+            <a:lvl7pPr marL="2743200" algn="l" defTabSz="914400" rtl="0" eaLnBrk="1" latinLnBrk="0" hangingPunct="1">
+              <a:defRPr sz="1800" kern="1200">
+                <a:solidFill>
+                  <a:schemeClr val="tx1"/>
+                </a:solidFill>
+                <a:latin typeface="+mn-lt"/>
+                <a:ea typeface="+mn-ea"/>
+                <a:cs typeface="+mn-cs"/>
+              </a:defRPr>
+            </a:lvl7pPr>
+            <a:lvl8pPr marL="3200400" algn="l" defTabSz="914400" rtl="0" eaLnBrk="1" latinLnBrk="0" hangingPunct="1">
+              <a:defRPr sz="1800" kern="1200">
+                <a:solidFill>
+                  <a:schemeClr val="tx1"/>
+                </a:solidFill>
+                <a:latin typeface="+mn-lt"/>
+                <a:ea typeface="+mn-ea"/>
+                <a:cs typeface="+mn-cs"/>
+              </a:defRPr>
+            </a:lvl8pPr>
+            <a:lvl9pPr marL="3657600" algn="l" defTabSz="914400" rtl="0" eaLnBrk="1" latinLnBrk="0" hangingPunct="1">
+              <a:defRPr sz="1800" kern="1200">
+                <a:solidFill>
+                  <a:schemeClr val="tx1"/>
+                </a:solidFill>
+                <a:latin typeface="+mn-lt"/>
+                <a:ea typeface="+mn-ea"/>
+                <a:cs typeface="+mn-cs"/>
+              </a:defRPr>
+            </a:lvl9pPr>
+          </a:lstStyle>
+          <a:p>
+            <a:pPr algn="ctr"/>
+            <a:r>
+              <a:rPr lang="en-US" dirty="0" smtClean="0">
+                <a:solidFill>
+                  <a:schemeClr val="bg1">
+                    <a:lumMod val="50000"/>
+                  </a:schemeClr>
+                </a:solidFill>
+              </a:rPr>
+              <a:t>Fig: Number of LNG carriers in 2019, 2030, and 2040</a:t>
+            </a:r>
+            <a:endParaRPr lang="en-GB" dirty="0">
+              <a:solidFill>
+                <a:schemeClr val="bg1">
+                  <a:lumMod val="50000"/>
+                </a:schemeClr>
+              </a:solidFill>
+            </a:endParaRPr>
+          </a:p>
+        </p:txBody>
+      </p:sp>
+      <p:cxnSp>
+        <p:nvCxnSpPr>
+          <p:cNvPr id="18" name="Gerade Verbindung mit Pfeil 17"/>
+          <p:cNvCxnSpPr/>
+          <p:nvPr/>
+        </p:nvCxnSpPr>
+        <p:spPr>
+          <a:xfrm flipV="1">
+            <a:off x="8658155" y="4053766"/>
+            <a:ext cx="1451022" cy="613484"/>
+          </a:xfrm>
+          <a:prstGeom prst="straightConnector1">
+            <a:avLst/>
+          </a:prstGeom>
+          <a:ln w="38100">
+            <a:solidFill>
+              <a:schemeClr val="tx2">
+                <a:lumMod val="60000"/>
+                <a:lumOff val="40000"/>
+              </a:schemeClr>
+            </a:solidFill>
+            <a:tailEnd type="triangle"/>
+          </a:ln>
+        </p:spPr>
+        <p:style>
+          <a:lnRef idx="1">
+            <a:schemeClr val="accent1"/>
+          </a:lnRef>
+          <a:fillRef idx="0">
+            <a:schemeClr val="accent1"/>
+          </a:fillRef>
+          <a:effectRef idx="0">
+            <a:schemeClr val="accent1"/>
+          </a:effectRef>
+          <a:fontRef idx="minor">
+            <a:schemeClr val="tx1"/>
+          </a:fontRef>
+        </p:style>
+      </p:cxnSp>
+      <p:sp>
+        <p:nvSpPr>
+          <p:cNvPr id="20" name="Textfeld 19"/>
+          <p:cNvSpPr txBox="1"/>
+          <p:nvPr/>
+        </p:nvSpPr>
+        <p:spPr>
+          <a:xfrm>
+            <a:off x="8562975" y="3996817"/>
+            <a:ext cx="1114425" cy="369332"/>
+          </a:xfrm>
+          <a:prstGeom prst="rect">
+            <a:avLst/>
+          </a:prstGeom>
+          <a:noFill/>
+        </p:spPr>
+        <p:txBody>
+          <a:bodyPr wrap="square" rtlCol="0">
+            <a:spAutoFit/>
+          </a:bodyPr>
+          <a:lstStyle/>
+          <a:p>
+            <a:r>
+              <a:rPr lang="en-US" dirty="0" smtClean="0">
+                <a:solidFill>
+                  <a:schemeClr val="tx2"/>
+                </a:solidFill>
+              </a:rPr>
+              <a:t>+ 148%</a:t>
+            </a:r>
+            <a:endParaRPr lang="en-US" dirty="0">
+              <a:solidFill>
+                <a:schemeClr val="tx2"/>
+              </a:solidFill>
+            </a:endParaRPr>
           </a:p>
         </p:txBody>
       </p:sp>
@@ -12517,25 +14749,8 @@
                   </a:schemeClr>
                 </a:solidFill>
               </a:rPr>
-              <a:t>(or bridge fuels) are necessary if renewable energy cannot fully supply the energy </a:t>
-            </a:r>
-            <a:r>
-              <a:rPr lang="en-US" dirty="0">
-                <a:solidFill>
-                  <a:schemeClr val="bg1">
-                    <a:lumMod val="50000"/>
-                  </a:schemeClr>
-                </a:solidFill>
-              </a:rPr>
-              <a:t>system</a:t>
-            </a:r>
-            <a:endParaRPr lang="en-US" dirty="0">
-              <a:solidFill>
-                <a:schemeClr val="bg1">
-                  <a:lumMod val="50000"/>
-                </a:schemeClr>
-              </a:solidFill>
-            </a:endParaRPr>
+              <a:t>(or bridge fuels) are necessary if renewable energy cannot fully supply the energy system</a:t>
+            </a:r>
           </a:p>
           <a:p>
             <a:r>
@@ -14082,8 +16297,8 @@
           </a:p>
         </p:txBody>
       </p:sp>
-      <mc:AlternateContent xmlns:mc="http://schemas.openxmlformats.org/markup-compatibility/2006">
-        <mc:Choice xmlns:a14="http://schemas.microsoft.com/office/drawing/2010/main" Requires="a14">
+      <mc:AlternateContent xmlns:mc="http://schemas.openxmlformats.org/markup-compatibility/2006" xmlns:a14="http://schemas.microsoft.com/office/drawing/2010/main">
+        <mc:Choice Requires="a14">
           <p:sp>
             <p:nvSpPr>
               <p:cNvPr id="9" name="Inhaltsplatzhalter 8"/>
@@ -14672,13 +16887,6 @@
                   </a:rPr>
                   <a:t>1</a:t>
                 </a:r>
-                <a:endParaRPr lang="en-US" baseline="30000" dirty="0" smtClean="0">
-                  <a:solidFill>
-                    <a:schemeClr val="bg1">
-                      <a:lumMod val="50000"/>
-                    </a:schemeClr>
-                  </a:solidFill>
-                </a:endParaRPr>
               </a:p>
               <a:p>
                 <a14:m>
@@ -15789,7 +17997,7 @@
             </p:txBody>
           </p:sp>
         </mc:Choice>
-        <mc:Fallback>
+        <mc:Fallback xmlns="">
           <p:sp>
             <p:nvSpPr>
               <p:cNvPr id="9" name="Inhaltsplatzhalter 8"/>
@@ -15936,8 +18144,8 @@
           </a:p>
         </p:txBody>
       </p:sp>
-      <mc:AlternateContent xmlns:mc="http://schemas.openxmlformats.org/markup-compatibility/2006">
-        <mc:Choice xmlns:a14="http://schemas.microsoft.com/office/drawing/2010/main" Requires="a14">
+      <mc:AlternateContent xmlns:mc="http://schemas.openxmlformats.org/markup-compatibility/2006" xmlns:a14="http://schemas.microsoft.com/office/drawing/2010/main">
+        <mc:Choice Requires="a14">
           <p:sp>
             <p:nvSpPr>
               <p:cNvPr id="10" name="Line Callout 2 (Accent Bar) 4">
@@ -15996,6 +18204,7 @@
               <a:bodyPr lIns="108000" tIns="72000" rIns="108000" bIns="72000" rtlCol="0" anchor="t" anchorCtr="0"/>
               <a:lstStyle/>
               <a:p>
+                <a:pPr/>
                 <a14:m>
                   <m:oMathPara xmlns:m="http://schemas.openxmlformats.org/officeDocument/2006/math">
                     <m:oMathParaPr>
@@ -16140,15 +18349,7 @@
                       <a:schemeClr val="tx1"/>
                     </a:solidFill>
                   </a:rPr>
-                  <a:t>Deliver</a:t>
-                </a:r>
-                <a:r>
-                  <a:rPr lang="de-DE" sz="1050" dirty="0" err="1" smtClean="0">
-                    <a:solidFill>
-                      <a:schemeClr val="tx1"/>
-                    </a:solidFill>
-                  </a:rPr>
-                  <a:t>y</a:t>
+                  <a:t>Delivery</a:t>
                 </a:r>
                 <a:r>
                   <a:rPr lang="de-DE" sz="1050" dirty="0" smtClean="0">
@@ -16238,7 +18439,7 @@
             </p:txBody>
           </p:sp>
         </mc:Choice>
-        <mc:Fallback>
+        <mc:Fallback xmlns="">
           <p:sp>
             <p:nvSpPr>
               <p:cNvPr id="10" name="Line Callout 2 (Accent Bar) 4">
@@ -16519,8 +18720,8 @@
         </p:nvSpPr>
         <p:spPr>
           <a:xfrm>
-            <a:off x="7404654" y="4419057"/>
-            <a:ext cx="2499463" cy="687711"/>
+            <a:off x="7997777" y="4666707"/>
+            <a:ext cx="3244296" cy="1286418"/>
           </a:xfrm>
           <a:prstGeom prst="wedgeRectCallout">
             <a:avLst>
@@ -16732,17 +18933,16 @@
             </a:lvl9pPr>
           </a:lstStyle>
           <a:p>
-            <a:pPr lvl="1" algn="l">
+            <a:pPr marL="0" lvl="1" indent="0">
               <a:buClr>
                 <a:srgbClr val="971B2F">
                   <a:lumMod val="100000"/>
                 </a:srgbClr>
               </a:buClr>
-              <a:buFont typeface="Wingdings" panose="05000000000000000000" pitchFamily="2" charset="2"/>
-              <a:buChar char="§"/>
+              <a:buNone/>
             </a:pPr>
             <a:r>
-              <a:rPr kumimoji="0" lang="en-US" sz="1200" b="0" i="0" u="none" strike="noStrike" kern="0" cap="none" spc="0" normalizeH="0" baseline="0" noProof="0" dirty="0" smtClean="0">
+              <a:rPr kumimoji="0" lang="en-US" sz="1600" b="0" i="0" u="none" strike="noStrike" kern="0" cap="none" spc="0" normalizeH="0" baseline="0" noProof="0" dirty="0" smtClean="0">
                 <a:ln>
                   <a:noFill/>
                 </a:ln>
@@ -16759,7 +18959,7 @@
               <a:t>LNG Break</a:t>
             </a:r>
             <a:r>
-              <a:rPr kumimoji="0" lang="en-US" sz="1200" b="0" i="0" u="none" strike="noStrike" kern="0" cap="none" spc="0" normalizeH="0" noProof="0" dirty="0" smtClean="0">
+              <a:rPr kumimoji="0" lang="en-US" sz="1600" b="0" i="0" u="none" strike="noStrike" kern="0" cap="none" spc="0" normalizeH="0" noProof="0" dirty="0" smtClean="0">
                 <a:ln>
                   <a:noFill/>
                 </a:ln>
@@ -16773,10 +18973,10 @@
                 <a:cs typeface="Segoe UI Light" panose="020B0502040204020203" pitchFamily="34" charset="0"/>
                 <a:sym typeface=""/>
               </a:rPr>
-              <a:t> Even Price = feed gas </a:t>
-            </a:r>
-            <a:br>
-              <a:rPr kumimoji="0" lang="en-US" sz="1200" b="0" i="0" u="none" strike="noStrike" kern="0" cap="none" spc="0" normalizeH="0" noProof="0" dirty="0" smtClean="0">
+              <a:t> Even Price </a:t>
+            </a:r>
+            <a:r>
+              <a:rPr kumimoji="0" lang="en-US" sz="1600" b="0" i="0" u="none" strike="noStrike" kern="0" cap="none" spc="0" normalizeH="0" noProof="0" dirty="0" smtClean="0">
                 <a:ln>
                   <a:noFill/>
                 </a:ln>
@@ -16790,9 +18990,10 @@
                 <a:cs typeface="Segoe UI Light" panose="020B0502040204020203" pitchFamily="34" charset="0"/>
                 <a:sym typeface=""/>
               </a:rPr>
-            </a:br>
-            <a:r>
-              <a:rPr kumimoji="0" lang="en-US" sz="1200" b="0" i="0" u="none" strike="noStrike" kern="0" cap="none" spc="0" normalizeH="0" noProof="0" dirty="0" smtClean="0">
+              <a:t/>
+            </a:r>
+            <a:br>
+              <a:rPr kumimoji="0" lang="en-US" sz="1600" b="0" i="0" u="none" strike="noStrike" kern="0" cap="none" spc="0" normalizeH="0" noProof="0" dirty="0" smtClean="0">
                 <a:ln>
                   <a:noFill/>
                 </a:ln>
@@ -16806,53 +19007,76 @@
                 <a:cs typeface="Segoe UI Light" panose="020B0502040204020203" pitchFamily="34" charset="0"/>
                 <a:sym typeface=""/>
               </a:rPr>
-              <a:t>+ Capex</a:t>
-            </a:r>
-            <a:r>
-              <a:rPr lang="en-US" kern="0" dirty="0" smtClean="0">
+            </a:br>
+            <a:r>
+              <a:rPr kumimoji="0" lang="en-US" sz="1600" b="0" i="0" u="none" strike="noStrike" kern="0" cap="none" spc="0" normalizeH="0" noProof="0" dirty="0" smtClean="0">
+                <a:ln>
+                  <a:noFill/>
+                </a:ln>
                 <a:solidFill>
                   <a:srgbClr val="2D2926"/>
                 </a:solidFill>
+                <a:effectLst/>
+                <a:uLnTx/>
+                <a:uFillTx/>
                 <a:latin typeface="Segoe UI Light" panose="020B0502040204020203" pitchFamily="34" charset="0"/>
                 <a:cs typeface="Segoe UI Light" panose="020B0502040204020203" pitchFamily="34" charset="0"/>
                 <a:sym typeface=""/>
               </a:rPr>
-              <a:t> of </a:t>
-            </a:r>
-            <a:r>
-              <a:rPr lang="en-US" kern="0" dirty="0">
+              <a:t>= </a:t>
+            </a:r>
+            <a:r>
+              <a:rPr kumimoji="0" lang="en-US" sz="1600" b="0" i="0" u="none" strike="noStrike" kern="0" cap="none" spc="0" normalizeH="0" noProof="0" dirty="0" smtClean="0">
+                <a:ln>
+                  <a:noFill/>
+                </a:ln>
                 <a:solidFill>
                   <a:srgbClr val="2D2926"/>
                 </a:solidFill>
+                <a:effectLst/>
+                <a:uLnTx/>
+                <a:uFillTx/>
                 <a:latin typeface="Segoe UI Light" panose="020B0502040204020203" pitchFamily="34" charset="0"/>
                 <a:cs typeface="Segoe UI Light" panose="020B0502040204020203" pitchFamily="34" charset="0"/>
                 <a:sym typeface=""/>
               </a:rPr>
-              <a:t>liquefaction facilitates </a:t>
-            </a:r>
-            <a:r>
-              <a:rPr lang="en-US" kern="0" dirty="0" smtClean="0">
+              <a:t>feed gas </a:t>
+            </a:r>
+            <a:br>
+              <a:rPr kumimoji="0" lang="en-US" sz="1600" b="0" i="0" u="none" strike="noStrike" kern="0" cap="none" spc="0" normalizeH="0" noProof="0" dirty="0" smtClean="0">
+                <a:ln>
+                  <a:noFill/>
+                </a:ln>
                 <a:solidFill>
                   <a:srgbClr val="2D2926"/>
                 </a:solidFill>
+                <a:effectLst/>
+                <a:uLnTx/>
+                <a:uFillTx/>
                 <a:latin typeface="Segoe UI Light" panose="020B0502040204020203" pitchFamily="34" charset="0"/>
                 <a:cs typeface="Segoe UI Light" panose="020B0502040204020203" pitchFamily="34" charset="0"/>
                 <a:sym typeface=""/>
               </a:rPr>
-              <a:t/>
-            </a:r>
-            <a:br>
-              <a:rPr lang="en-US" kern="0" dirty="0" smtClean="0">
+            </a:br>
+            <a:r>
+              <a:rPr kumimoji="0" lang="en-US" sz="1600" b="0" i="0" u="none" strike="noStrike" kern="0" cap="none" spc="0" normalizeH="0" noProof="0" dirty="0" smtClean="0">
+                <a:ln>
+                  <a:noFill/>
+                </a:ln>
                 <a:solidFill>
                   <a:srgbClr val="2D2926"/>
                 </a:solidFill>
+                <a:effectLst/>
+                <a:uLnTx/>
+                <a:uFillTx/>
                 <a:latin typeface="Segoe UI Light" panose="020B0502040204020203" pitchFamily="34" charset="0"/>
                 <a:cs typeface="Segoe UI Light" panose="020B0502040204020203" pitchFamily="34" charset="0"/>
                 <a:sym typeface=""/>
               </a:rPr>
-            </a:br>
-            <a:r>
-              <a:rPr lang="en-US" kern="0" dirty="0" smtClean="0">
+              <a:t>+ Capex</a:t>
+            </a:r>
+            <a:r>
+              <a:rPr lang="en-US" sz="1600" kern="0" dirty="0" smtClean="0">
                 <a:solidFill>
                   <a:srgbClr val="2D2926"/>
                 </a:solidFill>
@@ -16860,10 +19084,10 @@
                 <a:cs typeface="Segoe UI Light" panose="020B0502040204020203" pitchFamily="34" charset="0"/>
                 <a:sym typeface=""/>
               </a:rPr>
-              <a:t>+ </a:t>
-            </a:r>
-            <a:r>
-              <a:rPr lang="en-US" kern="0" dirty="0">
+              <a:t> of </a:t>
+            </a:r>
+            <a:r>
+              <a:rPr lang="en-US" sz="1600" kern="0" dirty="0">
                 <a:solidFill>
                   <a:srgbClr val="2D2926"/>
                 </a:solidFill>
@@ -16871,9 +19095,52 @@
                 <a:cs typeface="Segoe UI Light" panose="020B0502040204020203" pitchFamily="34" charset="0"/>
                 <a:sym typeface=""/>
               </a:rPr>
+              <a:t>liquefaction facilitates </a:t>
+            </a:r>
+            <a:r>
+              <a:rPr lang="en-US" sz="1600" kern="0" dirty="0" smtClean="0">
+                <a:solidFill>
+                  <a:srgbClr val="2D2926"/>
+                </a:solidFill>
+                <a:latin typeface="Segoe UI Light" panose="020B0502040204020203" pitchFamily="34" charset="0"/>
+                <a:cs typeface="Segoe UI Light" panose="020B0502040204020203" pitchFamily="34" charset="0"/>
+                <a:sym typeface=""/>
+              </a:rPr>
+              <a:t/>
+            </a:r>
+            <a:br>
+              <a:rPr lang="en-US" sz="1600" kern="0" dirty="0" smtClean="0">
+                <a:solidFill>
+                  <a:srgbClr val="2D2926"/>
+                </a:solidFill>
+                <a:latin typeface="Segoe UI Light" panose="020B0502040204020203" pitchFamily="34" charset="0"/>
+                <a:cs typeface="Segoe UI Light" panose="020B0502040204020203" pitchFamily="34" charset="0"/>
+                <a:sym typeface=""/>
+              </a:rPr>
+            </a:br>
+            <a:r>
+              <a:rPr lang="en-US" sz="1600" kern="0" dirty="0" smtClean="0">
+                <a:solidFill>
+                  <a:srgbClr val="2D2926"/>
+                </a:solidFill>
+                <a:latin typeface="Segoe UI Light" panose="020B0502040204020203" pitchFamily="34" charset="0"/>
+                <a:cs typeface="Segoe UI Light" panose="020B0502040204020203" pitchFamily="34" charset="0"/>
+                <a:sym typeface=""/>
+              </a:rPr>
+              <a:t>+ </a:t>
+            </a:r>
+            <a:r>
+              <a:rPr lang="en-US" sz="1600" kern="0" dirty="0">
+                <a:solidFill>
+                  <a:srgbClr val="2D2926"/>
+                </a:solidFill>
+                <a:latin typeface="Segoe UI Light" panose="020B0502040204020203" pitchFamily="34" charset="0"/>
+                <a:cs typeface="Segoe UI Light" panose="020B0502040204020203" pitchFamily="34" charset="0"/>
+                <a:sym typeface=""/>
+              </a:rPr>
               <a:t>royalties and taxes </a:t>
             </a:r>
-            <a:endParaRPr lang="en-US" kern="0" dirty="0" smtClean="0">
+            <a:endParaRPr lang="en-US" sz="1600" kern="0" dirty="0" smtClean="0">
               <a:solidFill>
                 <a:srgbClr val="2D2926"/>
               </a:solidFill>
@@ -17005,7 +19272,6 @@
               <a:rPr lang="en-US" sz="2000" dirty="0"/>
               <a:t>(2019)</a:t>
             </a:r>
-            <a:endParaRPr lang="en-US" sz="2000" dirty="0"/>
           </a:p>
         </p:txBody>
       </p:sp>
@@ -17110,7 +19376,7 @@
       </p:sp>
       <p:sp>
         <p:nvSpPr>
-          <p:cNvPr id="5" name="Inhaltsplatzhalter 4"/>
+          <p:cNvPr id="11" name="Inhaltsplatzhalter 10"/>
           <p:cNvSpPr>
             <a:spLocks noGrp="1"/>
           </p:cNvSpPr>
@@ -17123,7 +19389,168 @@
           <a:bodyPr/>
           <a:lstStyle/>
           <a:p>
-            <a:endParaRPr lang="en-US"/>
+            <a:r>
+              <a:rPr lang="en-US" dirty="0" smtClean="0">
+                <a:solidFill>
+                  <a:schemeClr val="bg1">
+                    <a:lumMod val="50000"/>
+                  </a:schemeClr>
+                </a:solidFill>
+              </a:rPr>
+              <a:t>Determined LNG flows confirm the clear perspective of</a:t>
+            </a:r>
+            <a:br>
+              <a:rPr lang="en-US" dirty="0" smtClean="0">
+                <a:solidFill>
+                  <a:schemeClr val="bg1">
+                    <a:lumMod val="50000"/>
+                  </a:schemeClr>
+                </a:solidFill>
+              </a:rPr>
+            </a:br>
+            <a:r>
+              <a:rPr lang="en-US" dirty="0" smtClean="0">
+                <a:solidFill>
+                  <a:schemeClr val="bg1">
+                    <a:lumMod val="50000"/>
+                  </a:schemeClr>
+                </a:solidFill>
+              </a:rPr>
+              <a:t>the geographical </a:t>
+            </a:r>
+            <a:r>
+              <a:rPr lang="en-US" b="1" dirty="0" smtClean="0">
+                <a:solidFill>
+                  <a:schemeClr val="bg1">
+                    <a:lumMod val="50000"/>
+                  </a:schemeClr>
+                </a:solidFill>
+              </a:rPr>
+              <a:t>division</a:t>
+            </a:r>
+            <a:r>
+              <a:rPr lang="en-US" dirty="0" smtClean="0">
+                <a:solidFill>
+                  <a:schemeClr val="bg1">
+                    <a:lumMod val="50000"/>
+                  </a:schemeClr>
+                </a:solidFill>
+              </a:rPr>
+              <a:t> of the global LNG market</a:t>
+            </a:r>
+            <a:br>
+              <a:rPr lang="en-US" dirty="0" smtClean="0">
+                <a:solidFill>
+                  <a:schemeClr val="bg1">
+                    <a:lumMod val="50000"/>
+                  </a:schemeClr>
+                </a:solidFill>
+              </a:rPr>
+            </a:br>
+            <a:r>
+              <a:rPr lang="en-US" b="1" dirty="0" smtClean="0">
+                <a:solidFill>
+                  <a:schemeClr val="bg1">
+                    <a:lumMod val="50000"/>
+                  </a:schemeClr>
+                </a:solidFill>
+              </a:rPr>
+              <a:t>into three regions </a:t>
+            </a:r>
+            <a:r>
+              <a:rPr lang="en-US" dirty="0" smtClean="0">
+                <a:solidFill>
+                  <a:schemeClr val="bg1">
+                    <a:lumMod val="50000"/>
+                  </a:schemeClr>
+                </a:solidFill>
+              </a:rPr>
+              <a:t>(valid for importers and exporters)</a:t>
+            </a:r>
+            <a:br>
+              <a:rPr lang="en-US" dirty="0" smtClean="0">
+                <a:solidFill>
+                  <a:schemeClr val="bg1">
+                    <a:lumMod val="50000"/>
+                  </a:schemeClr>
+                </a:solidFill>
+              </a:rPr>
+            </a:br>
+            <a:r>
+              <a:rPr lang="en-US" dirty="0" smtClean="0">
+                <a:solidFill>
+                  <a:schemeClr val="bg1">
+                    <a:lumMod val="50000"/>
+                  </a:schemeClr>
+                </a:solidFill>
+              </a:rPr>
+              <a:t>	(A) Atlantic Basin</a:t>
+            </a:r>
+            <a:br>
+              <a:rPr lang="en-US" dirty="0" smtClean="0">
+                <a:solidFill>
+                  <a:schemeClr val="bg1">
+                    <a:lumMod val="50000"/>
+                  </a:schemeClr>
+                </a:solidFill>
+              </a:rPr>
+            </a:br>
+            <a:r>
+              <a:rPr lang="en-US" dirty="0" smtClean="0">
+                <a:solidFill>
+                  <a:schemeClr val="bg1">
+                    <a:lumMod val="50000"/>
+                  </a:schemeClr>
+                </a:solidFill>
+              </a:rPr>
+              <a:t>	(B) Pacific Basin</a:t>
+            </a:r>
+            <a:br>
+              <a:rPr lang="en-US" dirty="0" smtClean="0">
+                <a:solidFill>
+                  <a:schemeClr val="bg1">
+                    <a:lumMod val="50000"/>
+                  </a:schemeClr>
+                </a:solidFill>
+              </a:rPr>
+            </a:br>
+            <a:r>
+              <a:rPr lang="en-US" dirty="0" smtClean="0">
+                <a:solidFill>
+                  <a:schemeClr val="bg1">
+                    <a:lumMod val="50000"/>
+                  </a:schemeClr>
+                </a:solidFill>
+              </a:rPr>
+              <a:t>	(C) Middle East</a:t>
+            </a:r>
+          </a:p>
+          <a:p>
+            <a:endParaRPr lang="en-US" dirty="0" smtClean="0">
+              <a:solidFill>
+                <a:schemeClr val="bg1">
+                  <a:lumMod val="50000"/>
+                </a:schemeClr>
+              </a:solidFill>
+            </a:endParaRPr>
+          </a:p>
+          <a:p>
+            <a:endParaRPr lang="en-US" dirty="0" smtClean="0">
+              <a:solidFill>
+                <a:schemeClr val="bg1">
+                  <a:lumMod val="50000"/>
+                </a:schemeClr>
+              </a:solidFill>
+            </a:endParaRPr>
+          </a:p>
+          <a:p>
+            <a:endParaRPr lang="en-US" dirty="0">
+              <a:solidFill>
+                <a:schemeClr val="bg1">
+                  <a:lumMod val="50000"/>
+                </a:schemeClr>
+              </a:solidFill>
+            </a:endParaRPr>
           </a:p>
         </p:txBody>
       </p:sp>
@@ -17142,13 +19569,21 @@
           <a:bodyPr/>
           <a:lstStyle/>
           <a:p>
-            <a:endParaRPr lang="en-US" dirty="0"/>
-          </a:p>
-        </p:txBody>
-      </p:sp>
-      <p:sp>
-        <p:nvSpPr>
-          <p:cNvPr id="9" name="Fußzeilenplatzhalter 8"/>
+            <a:r>
+              <a:rPr lang="en-US" dirty="0" smtClean="0"/>
+              <a:t>Global LNG market in 2019 </a:t>
+            </a:r>
+            <a:r>
+              <a:rPr lang="en-US" sz="2000" dirty="0"/>
+              <a:t>(validation of the model)</a:t>
+            </a:r>
+            <a:endParaRPr lang="en-US" sz="2000" dirty="0"/>
+          </a:p>
+        </p:txBody>
+      </p:sp>
+      <p:sp>
+        <p:nvSpPr>
+          <p:cNvPr id="8" name="Fußzeilenplatzhalter 8"/>
           <p:cNvSpPr>
             <a:spLocks noGrp="1"/>
           </p:cNvSpPr>
@@ -17156,17 +19591,429 @@
             <p:ph type="ftr" sz="quarter" idx="3"/>
           </p:nvPr>
         </p:nvSpPr>
-        <p:spPr/>
-        <p:txBody>
-          <a:bodyPr/>
+        <p:spPr>
+          <a:xfrm>
+            <a:off x="8138270" y="5922589"/>
+            <a:ext cx="2211940" cy="246221"/>
+          </a:xfrm>
+        </p:spPr>
+        <p:txBody>
+          <a:bodyPr>
+            <a:noAutofit/>
+          </a:bodyPr>
           <a:lstStyle/>
           <a:p>
             <a:pPr algn="ctr"/>
             <a:r>
-              <a:rPr lang="en-US" dirty="0" smtClean="0"/>
-              <a:t>Results (6/6)</a:t>
-            </a:r>
-            <a:endParaRPr lang="en-GB" dirty="0"/>
+              <a:rPr lang="en-US" dirty="0" smtClean="0">
+                <a:solidFill>
+                  <a:schemeClr val="bg1">
+                    <a:lumMod val="50000"/>
+                  </a:schemeClr>
+                </a:solidFill>
+              </a:rPr>
+              <a:t>Fig: </a:t>
+            </a:r>
+            <a:r>
+              <a:rPr lang="en-US" dirty="0" smtClean="0">
+                <a:solidFill>
+                  <a:schemeClr val="bg1">
+                    <a:lumMod val="50000"/>
+                  </a:schemeClr>
+                </a:solidFill>
+              </a:rPr>
+              <a:t>Determined LNG flows</a:t>
+            </a:r>
+            <a:endParaRPr lang="en-GB" dirty="0">
+              <a:solidFill>
+                <a:schemeClr val="bg1">
+                  <a:lumMod val="50000"/>
+                </a:schemeClr>
+              </a:solidFill>
+            </a:endParaRPr>
+          </a:p>
+        </p:txBody>
+      </p:sp>
+      <p:pic>
+        <p:nvPicPr>
+          <p:cNvPr id="3" name="Grafik 2"/>
+          <p:cNvPicPr>
+            <a:picLocks noChangeAspect="1"/>
+          </p:cNvPicPr>
+          <p:nvPr/>
+        </p:nvPicPr>
+        <p:blipFill>
+          <a:blip r:embed="rId3"/>
+          <a:stretch>
+            <a:fillRect/>
+          </a:stretch>
+        </p:blipFill>
+        <p:spPr>
+          <a:xfrm>
+            <a:off x="6867980" y="1365154"/>
+            <a:ext cx="4752520" cy="4557435"/>
+          </a:xfrm>
+          <a:prstGeom prst="rect">
+            <a:avLst/>
+          </a:prstGeom>
+        </p:spPr>
+      </p:pic>
+      <p:sp>
+        <p:nvSpPr>
+          <p:cNvPr id="10" name="Line Callout 2 (Accent Bar) 4">
+            <a:extLst>
+              <a:ext uri="{FF2B5EF4-FFF2-40B4-BE49-F238E27FC236}">
+                <a16:creationId xmlns:a16="http://schemas.microsoft.com/office/drawing/2014/main" id="{218B7C8E-0342-4CB2-8F37-63ECAB33323C}"/>
+              </a:ext>
+            </a:extLst>
+          </p:cNvPr>
+          <p:cNvSpPr/>
+          <p:nvPr/>
+        </p:nvSpPr>
+        <p:spPr bwMode="gray">
+          <a:xfrm flipH="1">
+            <a:off x="4124322" y="2746700"/>
+            <a:ext cx="1651239" cy="987099"/>
+          </a:xfrm>
+          <a:prstGeom prst="accentCallout2">
+            <a:avLst>
+              <a:gd name="adj1" fmla="val 35301"/>
+              <a:gd name="adj2" fmla="val -3938"/>
+              <a:gd name="adj3" fmla="val 35202"/>
+              <a:gd name="adj4" fmla="val -23596"/>
+              <a:gd name="adj5" fmla="val -41176"/>
+              <a:gd name="adj6" fmla="val -64245"/>
+            </a:avLst>
+          </a:prstGeom>
+          <a:solidFill>
+            <a:srgbClr val="BEE397"/>
+          </a:solidFill>
+          <a:ln w="19050">
+            <a:solidFill>
+              <a:srgbClr val="92D050"/>
+            </a:solidFill>
+            <a:headEnd type="oval" w="med" len="med"/>
+            <a:tailEnd type="oval" w="med" len="med"/>
+          </a:ln>
+        </p:spPr>
+        <p:style>
+          <a:lnRef idx="2">
+            <a:schemeClr val="accent2">
+              <a:shade val="50000"/>
+            </a:schemeClr>
+          </a:lnRef>
+          <a:fillRef idx="1">
+            <a:schemeClr val="accent2"/>
+          </a:fillRef>
+          <a:effectRef idx="0">
+            <a:schemeClr val="accent2"/>
+          </a:effectRef>
+          <a:fontRef idx="minor">
+            <a:schemeClr val="lt1"/>
+          </a:fontRef>
+        </p:style>
+        <p:txBody>
+          <a:bodyPr lIns="108000" tIns="72000" rIns="108000" bIns="72000" rtlCol="0" anchor="t" anchorCtr="0"/>
+          <a:lstStyle/>
+          <a:p>
+            <a:pPr/>
+            <a:r>
+              <a:rPr lang="en-US" sz="1050" dirty="0" smtClean="0">
+                <a:solidFill>
+                  <a:schemeClr val="tx1"/>
+                </a:solidFill>
+                <a:latin typeface="Segoe UI Light" panose="020B0502040204020203" pitchFamily="34" charset="0"/>
+                <a:cs typeface="Segoe UI Light" panose="020B0502040204020203" pitchFamily="34" charset="0"/>
+              </a:rPr>
+              <a:t>Japan, China and South Korea are mainly supplied by Australia</a:t>
+            </a:r>
+            <a:r>
+              <a:rPr lang="en-US" sz="1050" dirty="0" smtClean="0">
+                <a:solidFill>
+                  <a:schemeClr val="tx1"/>
+                </a:solidFill>
+                <a:latin typeface="Segoe UI Light" panose="020B0502040204020203" pitchFamily="34" charset="0"/>
+                <a:cs typeface="Segoe UI Light" panose="020B0502040204020203" pitchFamily="34" charset="0"/>
+              </a:rPr>
+              <a:t>, Indonesia and Malaysia</a:t>
+            </a:r>
+            <a:br>
+              <a:rPr lang="en-US" sz="1050" dirty="0" smtClean="0">
+                <a:solidFill>
+                  <a:schemeClr val="tx1"/>
+                </a:solidFill>
+                <a:latin typeface="Segoe UI Light" panose="020B0502040204020203" pitchFamily="34" charset="0"/>
+                <a:cs typeface="Segoe UI Light" panose="020B0502040204020203" pitchFamily="34" charset="0"/>
+              </a:rPr>
+            </a:br>
+            <a:r>
+              <a:rPr lang="en-US" sz="1050" dirty="0" smtClean="0">
+                <a:solidFill>
+                  <a:schemeClr val="tx1"/>
+                </a:solidFill>
+                <a:latin typeface="Segoe UI Light" panose="020B0502040204020203" pitchFamily="34" charset="0"/>
+                <a:cs typeface="Segoe UI Light" panose="020B0502040204020203" pitchFamily="34" charset="0"/>
+              </a:rPr>
+              <a:t>(</a:t>
+            </a:r>
+            <a:r>
+              <a:rPr lang="en-US" sz="1050" dirty="0" smtClean="0">
+                <a:solidFill>
+                  <a:schemeClr val="tx1"/>
+                </a:solidFill>
+                <a:latin typeface="Segoe UI Light" panose="020B0502040204020203" pitchFamily="34" charset="0"/>
+                <a:cs typeface="Segoe UI Light" panose="020B0502040204020203" pitchFamily="34" charset="0"/>
+                <a:sym typeface="Wingdings" panose="05000000000000000000" pitchFamily="2" charset="2"/>
+              </a:rPr>
+              <a:t> </a:t>
+            </a:r>
+            <a:r>
+              <a:rPr lang="en-US" sz="1050" b="1" dirty="0" smtClean="0">
+                <a:solidFill>
+                  <a:schemeClr val="tx1"/>
+                </a:solidFill>
+                <a:latin typeface="Segoe UI Light" panose="020B0502040204020203" pitchFamily="34" charset="0"/>
+                <a:cs typeface="Segoe UI Light" panose="020B0502040204020203" pitchFamily="34" charset="0"/>
+                <a:sym typeface="Wingdings" panose="05000000000000000000" pitchFamily="2" charset="2"/>
+              </a:rPr>
+              <a:t>Pacific Basin</a:t>
+            </a:r>
+            <a:r>
+              <a:rPr lang="en-US" sz="1050" dirty="0" smtClean="0">
+                <a:solidFill>
+                  <a:schemeClr val="tx1"/>
+                </a:solidFill>
+                <a:latin typeface="Segoe UI Light" panose="020B0502040204020203" pitchFamily="34" charset="0"/>
+                <a:cs typeface="Segoe UI Light" panose="020B0502040204020203" pitchFamily="34" charset="0"/>
+                <a:sym typeface="Wingdings" panose="05000000000000000000" pitchFamily="2" charset="2"/>
+              </a:rPr>
+              <a:t>)</a:t>
+            </a:r>
+            <a:endParaRPr lang="en-US" sz="1050" dirty="0">
+              <a:solidFill>
+                <a:schemeClr val="tx1"/>
+              </a:solidFill>
+              <a:latin typeface="Segoe UI Light" panose="020B0502040204020203" pitchFamily="34" charset="0"/>
+              <a:cs typeface="Segoe UI Light" panose="020B0502040204020203" pitchFamily="34" charset="0"/>
+            </a:endParaRPr>
+          </a:p>
+        </p:txBody>
+      </p:sp>
+      <p:sp>
+        <p:nvSpPr>
+          <p:cNvPr id="12" name="Line Callout 2 (Accent Bar) 4">
+            <a:extLst>
+              <a:ext uri="{FF2B5EF4-FFF2-40B4-BE49-F238E27FC236}">
+                <a16:creationId xmlns:a16="http://schemas.microsoft.com/office/drawing/2014/main" id="{218B7C8E-0342-4CB2-8F37-63ECAB33323C}"/>
+              </a:ext>
+            </a:extLst>
+          </p:cNvPr>
+          <p:cNvSpPr/>
+          <p:nvPr/>
+        </p:nvSpPr>
+        <p:spPr bwMode="gray">
+          <a:xfrm flipH="1">
+            <a:off x="897305" y="5379222"/>
+            <a:ext cx="1651239" cy="789588"/>
+          </a:xfrm>
+          <a:prstGeom prst="accentCallout2">
+            <a:avLst>
+              <a:gd name="adj1" fmla="val 35301"/>
+              <a:gd name="adj2" fmla="val -3938"/>
+              <a:gd name="adj3" fmla="val 33996"/>
+              <a:gd name="adj4" fmla="val -220298"/>
+              <a:gd name="adj5" fmla="val -21633"/>
+              <a:gd name="adj6" fmla="val -255756"/>
+            </a:avLst>
+          </a:prstGeom>
+          <a:solidFill>
+            <a:srgbClr val="BEE397"/>
+          </a:solidFill>
+          <a:ln w="19050">
+            <a:solidFill>
+              <a:srgbClr val="92D050"/>
+            </a:solidFill>
+            <a:headEnd type="oval" w="med" len="med"/>
+            <a:tailEnd type="oval" w="med" len="med"/>
+          </a:ln>
+        </p:spPr>
+        <p:style>
+          <a:lnRef idx="2">
+            <a:schemeClr val="accent2">
+              <a:shade val="50000"/>
+            </a:schemeClr>
+          </a:lnRef>
+          <a:fillRef idx="1">
+            <a:schemeClr val="accent2"/>
+          </a:fillRef>
+          <a:effectRef idx="0">
+            <a:schemeClr val="accent2"/>
+          </a:effectRef>
+          <a:fontRef idx="minor">
+            <a:schemeClr val="lt1"/>
+          </a:fontRef>
+        </p:style>
+        <p:txBody>
+          <a:bodyPr lIns="108000" tIns="72000" rIns="108000" bIns="72000" rtlCol="0" anchor="t" anchorCtr="0"/>
+          <a:lstStyle/>
+          <a:p>
+            <a:pPr/>
+            <a:r>
+              <a:rPr lang="en-US" sz="1050" dirty="0" smtClean="0">
+                <a:solidFill>
+                  <a:schemeClr val="tx1"/>
+                </a:solidFill>
+                <a:latin typeface="Segoe UI Light" panose="020B0502040204020203" pitchFamily="34" charset="0"/>
+                <a:cs typeface="Segoe UI Light" panose="020B0502040204020203" pitchFamily="34" charset="0"/>
+              </a:rPr>
+              <a:t>USA, Algeria and Nigeria are the main exporters for </a:t>
+            </a:r>
+            <a:r>
+              <a:rPr lang="en-US" sz="1050" b="1" dirty="0" smtClean="0">
+                <a:solidFill>
+                  <a:schemeClr val="tx1"/>
+                </a:solidFill>
+                <a:latin typeface="Segoe UI Light" panose="020B0502040204020203" pitchFamily="34" charset="0"/>
+                <a:cs typeface="Segoe UI Light" panose="020B0502040204020203" pitchFamily="34" charset="0"/>
+              </a:rPr>
+              <a:t>Europe‘s LNG demand</a:t>
+            </a:r>
+            <a:r>
+              <a:rPr lang="en-US" sz="1050" dirty="0" smtClean="0">
+                <a:solidFill>
+                  <a:schemeClr val="tx1"/>
+                </a:solidFill>
+                <a:latin typeface="Segoe UI Light" panose="020B0502040204020203" pitchFamily="34" charset="0"/>
+                <a:cs typeface="Segoe UI Light" panose="020B0502040204020203" pitchFamily="34" charset="0"/>
+              </a:rPr>
+              <a:t> in 2019</a:t>
+            </a:r>
+            <a:endParaRPr lang="en-US" sz="1050" dirty="0">
+              <a:solidFill>
+                <a:schemeClr val="tx1"/>
+              </a:solidFill>
+              <a:latin typeface="Segoe UI Light" panose="020B0502040204020203" pitchFamily="34" charset="0"/>
+              <a:cs typeface="Segoe UI Light" panose="020B0502040204020203" pitchFamily="34" charset="0"/>
+            </a:endParaRPr>
+          </a:p>
+        </p:txBody>
+      </p:sp>
+      <p:sp>
+        <p:nvSpPr>
+          <p:cNvPr id="13" name="Line Callout 2 (Accent Bar) 4">
+            <a:extLst>
+              <a:ext uri="{FF2B5EF4-FFF2-40B4-BE49-F238E27FC236}">
+                <a16:creationId xmlns:a16="http://schemas.microsoft.com/office/drawing/2014/main" id="{218B7C8E-0342-4CB2-8F37-63ECAB33323C}"/>
+              </a:ext>
+            </a:extLst>
+          </p:cNvPr>
+          <p:cNvSpPr/>
+          <p:nvPr/>
+        </p:nvSpPr>
+        <p:spPr bwMode="gray">
+          <a:xfrm flipH="1">
+            <a:off x="2152649" y="4074915"/>
+            <a:ext cx="1771505" cy="789588"/>
+          </a:xfrm>
+          <a:prstGeom prst="accentCallout2">
+            <a:avLst>
+              <a:gd name="adj1" fmla="val 54602"/>
+              <a:gd name="adj2" fmla="val -3938"/>
+              <a:gd name="adj3" fmla="val 53296"/>
+              <a:gd name="adj4" fmla="val -93970"/>
+              <a:gd name="adj5" fmla="val -131409"/>
+              <a:gd name="adj6" fmla="val -167745"/>
+            </a:avLst>
+          </a:prstGeom>
+          <a:solidFill>
+            <a:srgbClr val="BEE397"/>
+          </a:solidFill>
+          <a:ln w="19050">
+            <a:solidFill>
+              <a:srgbClr val="92D050"/>
+            </a:solidFill>
+            <a:headEnd type="oval" w="med" len="med"/>
+            <a:tailEnd type="oval" w="med" len="med"/>
+          </a:ln>
+        </p:spPr>
+        <p:style>
+          <a:lnRef idx="2">
+            <a:schemeClr val="accent2">
+              <a:shade val="50000"/>
+            </a:schemeClr>
+          </a:lnRef>
+          <a:fillRef idx="1">
+            <a:schemeClr val="accent2"/>
+          </a:fillRef>
+          <a:effectRef idx="0">
+            <a:schemeClr val="accent2"/>
+          </a:effectRef>
+          <a:fontRef idx="minor">
+            <a:schemeClr val="lt1"/>
+          </a:fontRef>
+        </p:style>
+        <p:txBody>
+          <a:bodyPr lIns="108000" tIns="72000" rIns="108000" bIns="72000" rtlCol="0" anchor="t" anchorCtr="0"/>
+          <a:lstStyle/>
+          <a:p>
+            <a:pPr/>
+            <a:r>
+              <a:rPr lang="en-US" sz="1050" b="1" dirty="0" smtClean="0">
+                <a:solidFill>
+                  <a:schemeClr val="tx1"/>
+                </a:solidFill>
+                <a:latin typeface="Segoe UI Light" panose="020B0502040204020203" pitchFamily="34" charset="0"/>
+                <a:cs typeface="Segoe UI Light" panose="020B0502040204020203" pitchFamily="34" charset="0"/>
+              </a:rPr>
+              <a:t>Qatar:</a:t>
+            </a:r>
+            <a:r>
+              <a:rPr lang="en-US" sz="1050" dirty="0" smtClean="0">
+                <a:solidFill>
+                  <a:schemeClr val="tx1"/>
+                </a:solidFill>
+                <a:latin typeface="Segoe UI Light" panose="020B0502040204020203" pitchFamily="34" charset="0"/>
+                <a:cs typeface="Segoe UI Light" panose="020B0502040204020203" pitchFamily="34" charset="0"/>
+              </a:rPr>
+              <a:t> (1) </a:t>
+            </a:r>
+            <a:r>
+              <a:rPr lang="en-US" sz="1050" dirty="0" smtClean="0">
+                <a:solidFill>
+                  <a:schemeClr val="tx1"/>
+                </a:solidFill>
+                <a:latin typeface="Segoe UI Light" panose="020B0502040204020203" pitchFamily="34" charset="0"/>
+                <a:cs typeface="Segoe UI Light" panose="020B0502040204020203" pitchFamily="34" charset="0"/>
+              </a:rPr>
+              <a:t>largest LNG exporter; (2) l</a:t>
+            </a:r>
+            <a:r>
+              <a:rPr lang="en-US" sz="1050" dirty="0" smtClean="0">
+                <a:solidFill>
+                  <a:schemeClr val="tx1"/>
+                </a:solidFill>
+                <a:latin typeface="Segoe UI Light" panose="020B0502040204020203" pitchFamily="34" charset="0"/>
+                <a:cs typeface="Segoe UI Light" panose="020B0502040204020203" pitchFamily="34" charset="0"/>
+              </a:rPr>
+              <a:t>owest “Break Even Price”; (3) mainly serving</a:t>
+            </a:r>
+            <a:r>
+              <a:rPr lang="en-US" sz="1050" dirty="0" smtClean="0">
+                <a:solidFill>
+                  <a:schemeClr val="tx1"/>
+                </a:solidFill>
+                <a:latin typeface="Segoe UI Light" panose="020B0502040204020203" pitchFamily="34" charset="0"/>
+                <a:cs typeface="Segoe UI Light" panose="020B0502040204020203" pitchFamily="34" charset="0"/>
+              </a:rPr>
+              <a:t> the Asian market</a:t>
+            </a:r>
+            <a:endParaRPr lang="en-US" sz="1050" dirty="0">
+              <a:solidFill>
+                <a:schemeClr val="tx1"/>
+              </a:solidFill>
+              <a:latin typeface="Segoe UI Light" panose="020B0502040204020203" pitchFamily="34" charset="0"/>
+              <a:cs typeface="Segoe UI Light" panose="020B0502040204020203" pitchFamily="34" charset="0"/>
+            </a:endParaRPr>
           </a:p>
         </p:txBody>
       </p:sp>
@@ -18303,65 +21150,6 @@
 </file>
 
 <file path=customXml/item1.xml><?xml version="1.0" encoding="utf-8"?>
-<?mso-contentType ?>
-<FormTemplates xmlns="http://schemas.microsoft.com/sharepoint/v3/contenttype/forms">
-  <Display>DocumentLibraryForm</Display>
-  <Edit>DocumentLibraryForm</Edit>
-  <New>DocumentLibraryForm</New>
-</FormTemplates>
-</file>
-
-<file path=customXml/item2.xml><?xml version="1.0" encoding="utf-8"?>
-<?mso-contentType ?>
-<spe:Receivers xmlns:spe="http://schemas.microsoft.com/sharepoint/events">
-  <Receiver>
-    <Name>Document ID Generator</Name>
-    <Synchronization>Synchronous</Synchronization>
-    <Type>10001</Type>
-    <SequenceNumber>1000</SequenceNumber>
-    <Url/>
-    <Assembly>Microsoft.Office.DocumentManagement, Version=16.0.0.0, Culture=neutral, PublicKeyToken=71e9bce111e9429c</Assembly>
-    <Class>Microsoft.Office.DocumentManagement.Internal.DocIdHandler</Class>
-    <Data/>
-    <Filter/>
-  </Receiver>
-  <Receiver>
-    <Name>Document ID Generator</Name>
-    <Synchronization>Synchronous</Synchronization>
-    <Type>10002</Type>
-    <SequenceNumber>1001</SequenceNumber>
-    <Url/>
-    <Assembly>Microsoft.Office.DocumentManagement, Version=16.0.0.0, Culture=neutral, PublicKeyToken=71e9bce111e9429c</Assembly>
-    <Class>Microsoft.Office.DocumentManagement.Internal.DocIdHandler</Class>
-    <Data/>
-    <Filter/>
-  </Receiver>
-  <Receiver>
-    <Name>Document ID Generator</Name>
-    <Synchronization>Synchronous</Synchronization>
-    <Type>10004</Type>
-    <SequenceNumber>1002</SequenceNumber>
-    <Url/>
-    <Assembly>Microsoft.Office.DocumentManagement, Version=16.0.0.0, Culture=neutral, PublicKeyToken=71e9bce111e9429c</Assembly>
-    <Class>Microsoft.Office.DocumentManagement.Internal.DocIdHandler</Class>
-    <Data/>
-    <Filter/>
-  </Receiver>
-  <Receiver>
-    <Name>Document ID Generator</Name>
-    <Synchronization>Synchronous</Synchronization>
-    <Type>10006</Type>
-    <SequenceNumber>1003</SequenceNumber>
-    <Url/>
-    <Assembly>Microsoft.Office.DocumentManagement, Version=16.0.0.0, Culture=neutral, PublicKeyToken=71e9bce111e9429c</Assembly>
-    <Class>Microsoft.Office.DocumentManagement.Internal.DocIdHandler</Class>
-    <Data/>
-    <Filter/>
-  </Receiver>
-</spe:Receivers>
-</file>
-
-<file path=customXml/item3.xml><?xml version="1.0" encoding="utf-8"?>
 <ct:contentTypeSchema xmlns:ct="http://schemas.microsoft.com/office/2006/metadata/contentType" xmlns:ma="http://schemas.microsoft.com/office/2006/metadata/properties/metaAttributes" ct:_="" ma:_="" ma:contentTypeName="Document" ma:contentTypeID="0x010100709E5D021178B04082DE841A61810ABC" ma:contentTypeVersion="6" ma:contentTypeDescription="Create a new document." ma:contentTypeScope="" ma:versionID="bf37d4ac1dddfc53a56261334840b7df">
   <xsd:schema xmlns:xsd="http://www.w3.org/2001/XMLSchema" xmlns:xs="http://www.w3.org/2001/XMLSchema" xmlns:p="http://schemas.microsoft.com/office/2006/metadata/properties" xmlns:ns2="0689c177-5e19-464b-8532-40aa8fde3a94" xmlns:ns3="06814371-4dd9-40ea-9cc7-40b39613c6ae" xmlns:ns4="749ef8e9-4186-4c55-b2d4-b1c3f2fa9400" targetNamespace="http://schemas.microsoft.com/office/2006/metadata/properties" ma:root="true" ma:fieldsID="382a45c066b9cd32e8d486b5ba424e80" ns2:_="" ns3:_="" ns4:_="">
     <xsd:import namespace="0689c177-5e19-464b-8532-40aa8fde3a94"/>
@@ -18568,6 +21356,65 @@
 </ct:contentTypeSchema>
 </file>
 
+<file path=customXml/item2.xml><?xml version="1.0" encoding="utf-8"?>
+<?mso-contentType ?>
+<spe:Receivers xmlns:spe="http://schemas.microsoft.com/sharepoint/events">
+  <Receiver>
+    <Name>Document ID Generator</Name>
+    <Synchronization>Synchronous</Synchronization>
+    <Type>10001</Type>
+    <SequenceNumber>1000</SequenceNumber>
+    <Url/>
+    <Assembly>Microsoft.Office.DocumentManagement, Version=16.0.0.0, Culture=neutral, PublicKeyToken=71e9bce111e9429c</Assembly>
+    <Class>Microsoft.Office.DocumentManagement.Internal.DocIdHandler</Class>
+    <Data/>
+    <Filter/>
+  </Receiver>
+  <Receiver>
+    <Name>Document ID Generator</Name>
+    <Synchronization>Synchronous</Synchronization>
+    <Type>10002</Type>
+    <SequenceNumber>1001</SequenceNumber>
+    <Url/>
+    <Assembly>Microsoft.Office.DocumentManagement, Version=16.0.0.0, Culture=neutral, PublicKeyToken=71e9bce111e9429c</Assembly>
+    <Class>Microsoft.Office.DocumentManagement.Internal.DocIdHandler</Class>
+    <Data/>
+    <Filter/>
+  </Receiver>
+  <Receiver>
+    <Name>Document ID Generator</Name>
+    <Synchronization>Synchronous</Synchronization>
+    <Type>10004</Type>
+    <SequenceNumber>1002</SequenceNumber>
+    <Url/>
+    <Assembly>Microsoft.Office.DocumentManagement, Version=16.0.0.0, Culture=neutral, PublicKeyToken=71e9bce111e9429c</Assembly>
+    <Class>Microsoft.Office.DocumentManagement.Internal.DocIdHandler</Class>
+    <Data/>
+    <Filter/>
+  </Receiver>
+  <Receiver>
+    <Name>Document ID Generator</Name>
+    <Synchronization>Synchronous</Synchronization>
+    <Type>10006</Type>
+    <SequenceNumber>1003</SequenceNumber>
+    <Url/>
+    <Assembly>Microsoft.Office.DocumentManagement, Version=16.0.0.0, Culture=neutral, PublicKeyToken=71e9bce111e9429c</Assembly>
+    <Class>Microsoft.Office.DocumentManagement.Internal.DocIdHandler</Class>
+    <Data/>
+    <Filter/>
+  </Receiver>
+</spe:Receivers>
+</file>
+
+<file path=customXml/item3.xml><?xml version="1.0" encoding="utf-8"?>
+<?mso-contentType ?>
+<FormTemplates xmlns="http://schemas.microsoft.com/sharepoint/v3/contenttype/forms">
+  <Display>DocumentLibraryForm</Display>
+  <Edit>DocumentLibraryForm</Edit>
+  <New>DocumentLibraryForm</New>
+</FormTemplates>
+</file>
+
 <file path=customXml/item4.xml><?xml version="1.0" encoding="utf-8"?>
 <p:properties xmlns:p="http://schemas.microsoft.com/office/2006/metadata/properties" xmlns:xsi="http://www.w3.org/2001/XMLSchema-instance" xmlns:pc="http://schemas.microsoft.com/office/infopath/2007/PartnerControls">
   <documentManagement>
@@ -18581,22 +21428,6 @@
 </file>
 
 <file path=customXml/itemProps1.xml><?xml version="1.0" encoding="utf-8"?>
-<ds:datastoreItem xmlns:ds="http://schemas.openxmlformats.org/officeDocument/2006/customXml" ds:itemID="{6E794EA7-8E28-4624-885F-9EF05194D2E6}">
-  <ds:schemaRefs>
-    <ds:schemaRef ds:uri="http://schemas.microsoft.com/sharepoint/v3/contenttype/forms"/>
-  </ds:schemaRefs>
-</ds:datastoreItem>
-</file>
-
-<file path=customXml/itemProps2.xml><?xml version="1.0" encoding="utf-8"?>
-<ds:datastoreItem xmlns:ds="http://schemas.openxmlformats.org/officeDocument/2006/customXml" ds:itemID="{B0542633-460B-4F10-AED0-D9CC98DDA495}">
-  <ds:schemaRefs>
-    <ds:schemaRef ds:uri="http://schemas.microsoft.com/sharepoint/events"/>
-  </ds:schemaRefs>
-</ds:datastoreItem>
-</file>
-
-<file path=customXml/itemProps3.xml><?xml version="1.0" encoding="utf-8"?>
 <ds:datastoreItem xmlns:ds="http://schemas.openxmlformats.org/officeDocument/2006/customXml" ds:itemID="{FE961F14-CA64-4A5B-8D0E-270958149F57}">
   <ds:schemaRefs>
     <ds:schemaRef ds:uri="http://schemas.microsoft.com/office/2006/metadata/contentType"/>
@@ -18612,6 +21443,22 @@
     <ds:schemaRef ds:uri="http://purl.org/dc/elements/1.1/"/>
     <ds:schemaRef ds:uri="http://purl.org/dc/terms/"/>
     <ds:schemaRef ds:uri="http://schemas.microsoft.com/internal/obd"/>
+  </ds:schemaRefs>
+</ds:datastoreItem>
+</file>
+
+<file path=customXml/itemProps2.xml><?xml version="1.0" encoding="utf-8"?>
+<ds:datastoreItem xmlns:ds="http://schemas.openxmlformats.org/officeDocument/2006/customXml" ds:itemID="{B0542633-460B-4F10-AED0-D9CC98DDA495}">
+  <ds:schemaRefs>
+    <ds:schemaRef ds:uri="http://schemas.microsoft.com/sharepoint/events"/>
+  </ds:schemaRefs>
+</ds:datastoreItem>
+</file>
+
+<file path=customXml/itemProps3.xml><?xml version="1.0" encoding="utf-8"?>
+<ds:datastoreItem xmlns:ds="http://schemas.openxmlformats.org/officeDocument/2006/customXml" ds:itemID="{6E794EA7-8E28-4624-885F-9EF05194D2E6}">
+  <ds:schemaRefs>
+    <ds:schemaRef ds:uri="http://schemas.microsoft.com/sharepoint/v3/contenttype/forms"/>
   </ds:schemaRefs>
 </ds:datastoreItem>
 </file>

</xml_diff>

<commit_message>
add comments in manuscript and presentation slides
</commit_message>
<xml_diff>
--- a/presentation/230214_IEWT.pptx
+++ b/presentation/230214_IEWT.pptx
@@ -6,10 +6,10 @@
     <p:sldMasterId id="2147483673" r:id="rId6"/>
   </p:sldMasterIdLst>
   <p:notesMasterIdLst>
-    <p:notesMasterId r:id="rId21"/>
+    <p:notesMasterId r:id="rId22"/>
   </p:notesMasterIdLst>
   <p:handoutMasterIdLst>
-    <p:handoutMasterId r:id="rId22"/>
+    <p:handoutMasterId r:id="rId23"/>
   </p:handoutMasterIdLst>
   <p:sldIdLst>
     <p:sldId id="256" r:id="rId7"/>
@@ -25,7 +25,8 @@
     <p:sldId id="283" r:id="rId17"/>
     <p:sldId id="284" r:id="rId18"/>
     <p:sldId id="285" r:id="rId19"/>
-    <p:sldId id="270" r:id="rId20"/>
+    <p:sldId id="286" r:id="rId20"/>
+    <p:sldId id="270" r:id="rId21"/>
   </p:sldIdLst>
   <p:sldSz cx="12192000" cy="6858000"/>
   <p:notesSz cx="10234613" cy="7104063"/>
@@ -1018,7 +1019,7 @@
     </p:spTree>
     <p:extLst>
       <p:ext uri="{BB962C8B-B14F-4D97-AF65-F5344CB8AC3E}">
-        <p14:creationId xmlns:p14="http://schemas.microsoft.com/office/powerpoint/2010/main" val="4062620709"/>
+        <p14:creationId xmlns:p14="http://schemas.microsoft.com/office/powerpoint/2010/main" val="22617631"/>
       </p:ext>
     </p:extLst>
   </p:cSld>
@@ -1072,7 +1073,7 @@
           <a:bodyPr/>
           <a:lstStyle/>
           <a:p>
-            <a:endParaRPr lang="en-US" dirty="0"/>
+            <a:endParaRPr lang="en-US"/>
           </a:p>
         </p:txBody>
       </p:sp>
@@ -1094,6 +1095,90 @@
             <a:fld id="{0B17A1DD-B70C-B048-99CA-ED854228726D}" type="slidenum">
               <a:rPr lang="en-US" smtClean="0"/>
               <a:t>14</a:t>
+            </a:fld>
+            <a:endParaRPr lang="en-US"/>
+          </a:p>
+        </p:txBody>
+      </p:sp>
+    </p:spTree>
+    <p:extLst>
+      <p:ext uri="{BB962C8B-B14F-4D97-AF65-F5344CB8AC3E}">
+        <p14:creationId xmlns:p14="http://schemas.microsoft.com/office/powerpoint/2010/main" val="4202405486"/>
+      </p:ext>
+    </p:extLst>
+  </p:cSld>
+  <p:clrMapOvr>
+    <a:masterClrMapping/>
+  </p:clrMapOvr>
+</p:notes>
+</file>
+
+<file path=ppt/notesSlides/notesSlide14.xml><?xml version="1.0" encoding="utf-8"?>
+<p:notes xmlns:a="http://schemas.openxmlformats.org/drawingml/2006/main" xmlns:r="http://schemas.openxmlformats.org/officeDocument/2006/relationships" xmlns:p="http://schemas.openxmlformats.org/presentationml/2006/main">
+  <p:cSld>
+    <p:spTree>
+      <p:nvGrpSpPr>
+        <p:cNvPr id="1" name=""/>
+        <p:cNvGrpSpPr/>
+        <p:nvPr/>
+      </p:nvGrpSpPr>
+      <p:grpSpPr>
+        <a:xfrm>
+          <a:off x="0" y="0"/>
+          <a:ext cx="0" cy="0"/>
+          <a:chOff x="0" y="0"/>
+          <a:chExt cx="0" cy="0"/>
+        </a:xfrm>
+      </p:grpSpPr>
+      <p:sp>
+        <p:nvSpPr>
+          <p:cNvPr id="2" name="Folienbildplatzhalter 1"/>
+          <p:cNvSpPr>
+            <a:spLocks noGrp="1" noRot="1" noChangeAspect="1"/>
+          </p:cNvSpPr>
+          <p:nvPr>
+            <p:ph type="sldImg"/>
+          </p:nvPr>
+        </p:nvSpPr>
+        <p:spPr/>
+      </p:sp>
+      <p:sp>
+        <p:nvSpPr>
+          <p:cNvPr id="3" name="Notizenplatzhalter 2"/>
+          <p:cNvSpPr>
+            <a:spLocks noGrp="1"/>
+          </p:cNvSpPr>
+          <p:nvPr>
+            <p:ph type="body" idx="1"/>
+          </p:nvPr>
+        </p:nvSpPr>
+        <p:spPr/>
+        <p:txBody>
+          <a:bodyPr/>
+          <a:lstStyle/>
+          <a:p>
+            <a:endParaRPr lang="en-US" dirty="0"/>
+          </a:p>
+        </p:txBody>
+      </p:sp>
+      <p:sp>
+        <p:nvSpPr>
+          <p:cNvPr id="4" name="Foliennummernplatzhalter 3"/>
+          <p:cNvSpPr>
+            <a:spLocks noGrp="1"/>
+          </p:cNvSpPr>
+          <p:nvPr>
+            <p:ph type="sldNum" sz="quarter" idx="10"/>
+          </p:nvPr>
+        </p:nvSpPr>
+        <p:spPr/>
+        <p:txBody>
+          <a:bodyPr/>
+          <a:lstStyle/>
+          <a:p>
+            <a:fld id="{0B17A1DD-B70C-B048-99CA-ED854228726D}" type="slidenum">
+              <a:rPr lang="en-US" smtClean="0"/>
+              <a:t>15</a:t>
             </a:fld>
             <a:endParaRPr lang="en-US"/>
           </a:p>
@@ -11604,12 +11689,11 @@
               <a:rPr lang="en-US" sz="2000" dirty="0"/>
               <a:t>(2019)</a:t>
             </a:r>
-            <a:endParaRPr lang="en-US" sz="2000" dirty="0"/>
-          </a:p>
-        </p:txBody>
-      </p:sp>
-      <mc:AlternateContent xmlns:mc="http://schemas.openxmlformats.org/markup-compatibility/2006">
-        <mc:Choice xmlns:a14="http://schemas.microsoft.com/office/drawing/2010/main" Requires="a14">
+          </a:p>
+        </p:txBody>
+      </p:sp>
+      <mc:AlternateContent xmlns:mc="http://schemas.openxmlformats.org/markup-compatibility/2006" xmlns:a14="http://schemas.microsoft.com/office/drawing/2010/main">
+        <mc:Choice Requires="a14">
           <p:sp>
             <p:nvSpPr>
               <p:cNvPr id="9" name="Fußzeilenplatzhalter 8"/>
@@ -11837,7 +11921,7 @@
             </p:txBody>
           </p:sp>
         </mc:Choice>
-        <mc:Fallback>
+        <mc:Fallback xmlns="">
           <p:sp>
             <p:nvSpPr>
               <p:cNvPr id="9" name="Fußzeilenplatzhalter 8"/>
@@ -12335,7 +12419,6 @@
           <a:bodyPr lIns="108000" tIns="72000" rIns="108000" bIns="72000" rtlCol="0" anchor="t" anchorCtr="0"/>
           <a:lstStyle/>
           <a:p>
-            <a:pPr/>
             <a:r>
               <a:rPr lang="en-US" sz="1050" dirty="0">
                 <a:solidFill>
@@ -12386,13 +12469,6 @@
               </a:rPr>
               <a:t>developments in the LNG market</a:t>
             </a:r>
-            <a:endParaRPr lang="en-US" sz="1050" dirty="0">
-              <a:solidFill>
-                <a:schemeClr val="tx1"/>
-              </a:solidFill>
-              <a:latin typeface="Segoe UI Light" panose="020B0502040204020203" pitchFamily="34" charset="0"/>
-              <a:cs typeface="Segoe UI Light" panose="020B0502040204020203" pitchFamily="34" charset="0"/>
-            </a:endParaRPr>
           </a:p>
         </p:txBody>
       </p:sp>
@@ -12459,7 +12535,6 @@
           <a:bodyPr lIns="108000" tIns="72000" rIns="108000" bIns="72000" rtlCol="0" anchor="t" anchorCtr="0"/>
           <a:lstStyle/>
           <a:p>
-            <a:pPr/>
             <a:r>
               <a:rPr lang="en-US" sz="1050" dirty="0" smtClean="0">
                 <a:solidFill>
@@ -12758,11 +12833,7 @@
           <a:p>
             <a:r>
               <a:rPr lang="en-US" dirty="0" smtClean="0"/>
-              <a:t>Global LNG market development </a:t>
-            </a:r>
-            <a:r>
-              <a:rPr lang="en-US" dirty="0" smtClean="0"/>
-              <a:t>until 2040</a:t>
+              <a:t>Global LNG market development until 2040</a:t>
             </a:r>
             <a:endParaRPr lang="en-US" dirty="0"/>
           </a:p>
@@ -13550,7 +13621,6 @@
           <a:bodyPr lIns="108000" tIns="72000" rIns="108000" bIns="72000" rtlCol="0" anchor="t" anchorCtr="0"/>
           <a:lstStyle/>
           <a:p>
-            <a:pPr/>
             <a:r>
               <a:rPr lang="en-US" sz="1050" dirty="0" smtClean="0">
                 <a:solidFill>
@@ -13624,7 +13694,7 @@
         <p:spPr>
           <a:xfrm>
             <a:off x="2445083" y="1087615"/>
-            <a:ext cx="3413173" cy="246221"/>
+            <a:ext cx="3914388" cy="246221"/>
           </a:xfrm>
           <a:prstGeom prst="rect">
             <a:avLst/>
@@ -13741,7 +13811,27 @@
                   </a:schemeClr>
                 </a:solidFill>
               </a:rPr>
-              <a:t>Fig: Weighted DES prices of importers until 2040</a:t>
+              <a:t>Fig: Weighted DES prices of importers until </a:t>
+            </a:r>
+            <a:r>
+              <a:rPr lang="en-US" dirty="0" smtClean="0">
+                <a:solidFill>
+                  <a:schemeClr val="bg1">
+                    <a:lumMod val="50000"/>
+                  </a:schemeClr>
+                </a:solidFill>
+              </a:rPr>
+              <a:t>2040 in $ per </a:t>
+            </a:r>
+            <a:r>
+              <a:rPr lang="en-US" dirty="0" err="1" smtClean="0">
+                <a:solidFill>
+                  <a:schemeClr val="bg1">
+                    <a:lumMod val="50000"/>
+                  </a:schemeClr>
+                </a:solidFill>
+              </a:rPr>
+              <a:t>mmBTU</a:t>
             </a:r>
             <a:endParaRPr lang="en-GB" dirty="0">
               <a:solidFill>
@@ -14033,25 +14123,6 @@
       </p:sp>
       <p:sp>
         <p:nvSpPr>
-          <p:cNvPr id="5" name="Inhaltsplatzhalter 4"/>
-          <p:cNvSpPr>
-            <a:spLocks noGrp="1"/>
-          </p:cNvSpPr>
-          <p:nvPr>
-            <p:ph sz="half" idx="1"/>
-          </p:nvPr>
-        </p:nvSpPr>
-        <p:spPr/>
-        <p:txBody>
-          <a:bodyPr/>
-          <a:lstStyle/>
-          <a:p>
-            <a:endParaRPr lang="en-US"/>
-          </a:p>
-        </p:txBody>
-      </p:sp>
-      <p:sp>
-        <p:nvSpPr>
           <p:cNvPr id="4" name="Titel 3"/>
           <p:cNvSpPr>
             <a:spLocks noGrp="1"/>
@@ -14065,31 +14136,790 @@
           <a:bodyPr/>
           <a:lstStyle/>
           <a:p>
+            <a:r>
+              <a:rPr lang="en-US" dirty="0"/>
+              <a:t>Value of increasing liquefaction capacities of exporters </a:t>
+            </a:r>
+            <a:r>
+              <a:rPr lang="en-US" sz="2000" dirty="0"/>
+              <a:t>(</a:t>
+            </a:r>
+            <a:r>
+              <a:rPr lang="en-US" sz="2000" dirty="0" smtClean="0"/>
+              <a:t>2040)</a:t>
+            </a:r>
             <a:endParaRPr lang="en-US" dirty="0"/>
           </a:p>
         </p:txBody>
       </p:sp>
-      <p:sp>
-        <p:nvSpPr>
-          <p:cNvPr id="9" name="Fußzeilenplatzhalter 8"/>
-          <p:cNvSpPr>
-            <a:spLocks noGrp="1"/>
+      <p:pic>
+        <p:nvPicPr>
+          <p:cNvPr id="3" name="Grafik 2"/>
+          <p:cNvPicPr>
+            <a:picLocks noChangeAspect="1"/>
+          </p:cNvPicPr>
+          <p:nvPr/>
+        </p:nvPicPr>
+        <p:blipFill rotWithShape="1">
+          <a:blip r:embed="rId3"/>
+          <a:srcRect b="5393"/>
+          <a:stretch/>
+        </p:blipFill>
+        <p:spPr>
+          <a:xfrm>
+            <a:off x="1716198" y="1257025"/>
+            <a:ext cx="6232286" cy="4988580"/>
+          </a:xfrm>
+          <a:prstGeom prst="rect">
+            <a:avLst/>
+          </a:prstGeom>
+        </p:spPr>
+      </p:pic>
+      <p:sp>
+        <p:nvSpPr>
+          <p:cNvPr id="13" name="Rechteck 12"/>
+          <p:cNvSpPr/>
+          <p:nvPr/>
+        </p:nvSpPr>
+        <p:spPr>
+          <a:xfrm>
+            <a:off x="6630248" y="4260491"/>
+            <a:ext cx="1079715" cy="817787"/>
+          </a:xfrm>
+          <a:prstGeom prst="rect">
+            <a:avLst/>
+          </a:prstGeom>
+          <a:solidFill>
+            <a:schemeClr val="bg1"/>
+          </a:solidFill>
+          <a:ln>
+            <a:noFill/>
+          </a:ln>
+        </p:spPr>
+        <p:style>
+          <a:lnRef idx="2">
+            <a:schemeClr val="accent1">
+              <a:shade val="50000"/>
+            </a:schemeClr>
+          </a:lnRef>
+          <a:fillRef idx="1">
+            <a:schemeClr val="accent1"/>
+          </a:fillRef>
+          <a:effectRef idx="0">
+            <a:schemeClr val="accent1"/>
+          </a:effectRef>
+          <a:fontRef idx="minor">
+            <a:schemeClr val="lt1"/>
+          </a:fontRef>
+        </p:style>
+        <p:txBody>
+          <a:bodyPr rtlCol="0" anchor="ctr"/>
+          <a:lstStyle/>
+          <a:p>
+            <a:pPr algn="ctr"/>
+            <a:endParaRPr lang="en-US"/>
+          </a:p>
+        </p:txBody>
+      </p:sp>
+      <p:grpSp>
+        <p:nvGrpSpPr>
+          <p:cNvPr id="6" name="Gruppieren 5"/>
+          <p:cNvGrpSpPr/>
+          <p:nvPr/>
+        </p:nvGrpSpPr>
+        <p:grpSpPr>
+          <a:xfrm>
+            <a:off x="6675034" y="4431063"/>
+            <a:ext cx="990142" cy="590262"/>
+            <a:chOff x="7933490" y="3929233"/>
+            <a:chExt cx="990142" cy="590262"/>
+          </a:xfrm>
+        </p:grpSpPr>
+        <p:sp>
+          <p:nvSpPr>
+            <p:cNvPr id="7" name="Textfeld 6"/>
+            <p:cNvSpPr txBox="1"/>
+            <p:nvPr/>
+          </p:nvSpPr>
+          <p:spPr>
+            <a:xfrm>
+              <a:off x="8428561" y="3942414"/>
+              <a:ext cx="495071" cy="577081"/>
+            </a:xfrm>
+            <a:prstGeom prst="rect">
+              <a:avLst/>
+            </a:prstGeom>
+            <a:solidFill>
+              <a:schemeClr val="bg1"/>
+            </a:solidFill>
+          </p:spPr>
+          <p:txBody>
+            <a:bodyPr wrap="square" rtlCol="0" anchor="ctr">
+              <a:spAutoFit/>
+            </a:bodyPr>
+            <a:lstStyle/>
+            <a:p>
+              <a:r>
+                <a:rPr lang="en-US" sz="1050" b="1" dirty="0" smtClean="0">
+                  <a:latin typeface="Segoe UI Light" panose="020B0502040204020203" pitchFamily="34" charset="0"/>
+                  <a:cs typeface="Segoe UI Light" panose="020B0502040204020203" pitchFamily="34" charset="0"/>
+                </a:rPr>
+                <a:t>2019</a:t>
+              </a:r>
+              <a:br>
+                <a:rPr lang="en-US" sz="1050" b="1" dirty="0" smtClean="0">
+                  <a:latin typeface="Segoe UI Light" panose="020B0502040204020203" pitchFamily="34" charset="0"/>
+                  <a:cs typeface="Segoe UI Light" panose="020B0502040204020203" pitchFamily="34" charset="0"/>
+                </a:rPr>
+              </a:br>
+              <a:r>
+                <a:rPr lang="en-US" sz="1050" b="1" dirty="0" smtClean="0">
+                  <a:latin typeface="Segoe UI Light" panose="020B0502040204020203" pitchFamily="34" charset="0"/>
+                  <a:cs typeface="Segoe UI Light" panose="020B0502040204020203" pitchFamily="34" charset="0"/>
+                </a:rPr>
+                <a:t>2030</a:t>
+              </a:r>
+              <a:br>
+                <a:rPr lang="en-US" sz="1050" b="1" dirty="0" smtClean="0">
+                  <a:latin typeface="Segoe UI Light" panose="020B0502040204020203" pitchFamily="34" charset="0"/>
+                  <a:cs typeface="Segoe UI Light" panose="020B0502040204020203" pitchFamily="34" charset="0"/>
+                </a:rPr>
+              </a:br>
+              <a:r>
+                <a:rPr lang="en-US" sz="1050" b="1" dirty="0" smtClean="0">
+                  <a:latin typeface="Segoe UI Light" panose="020B0502040204020203" pitchFamily="34" charset="0"/>
+                  <a:cs typeface="Segoe UI Light" panose="020B0502040204020203" pitchFamily="34" charset="0"/>
+                </a:rPr>
+                <a:t>2040</a:t>
+              </a:r>
+              <a:endParaRPr lang="en-US" sz="1050" b="1" dirty="0">
+                <a:latin typeface="Segoe UI Light" panose="020B0502040204020203" pitchFamily="34" charset="0"/>
+                <a:cs typeface="Segoe UI Light" panose="020B0502040204020203" pitchFamily="34" charset="0"/>
+              </a:endParaRPr>
+            </a:p>
+          </p:txBody>
+        </p:sp>
+        <p:sp>
+          <p:nvSpPr>
+            <p:cNvPr id="8" name="Textfeld 7"/>
+            <p:cNvSpPr txBox="1"/>
+            <p:nvPr/>
+          </p:nvSpPr>
+          <p:spPr>
+            <a:xfrm>
+              <a:off x="7933490" y="3929233"/>
+              <a:ext cx="495071" cy="577081"/>
+            </a:xfrm>
+            <a:prstGeom prst="rect">
+              <a:avLst/>
+            </a:prstGeom>
+            <a:solidFill>
+              <a:schemeClr val="bg1"/>
+            </a:solidFill>
+          </p:spPr>
+          <p:txBody>
+            <a:bodyPr wrap="square" rtlCol="0" anchor="ctr">
+              <a:spAutoFit/>
+            </a:bodyPr>
+            <a:lstStyle/>
+            <a:p>
+              <a:r>
+                <a:rPr lang="en-US" sz="1050" dirty="0" smtClean="0">
+                  <a:solidFill>
+                    <a:schemeClr val="bg1"/>
+                  </a:solidFill>
+                  <a:latin typeface="Segoe UI Light" panose="020B0502040204020203" pitchFamily="34" charset="0"/>
+                  <a:cs typeface="Segoe UI Light" panose="020B0502040204020203" pitchFamily="34" charset="0"/>
+                </a:rPr>
+                <a:t>2019</a:t>
+              </a:r>
+              <a:br>
+                <a:rPr lang="en-US" sz="1050" dirty="0" smtClean="0">
+                  <a:solidFill>
+                    <a:schemeClr val="bg1"/>
+                  </a:solidFill>
+                  <a:latin typeface="Segoe UI Light" panose="020B0502040204020203" pitchFamily="34" charset="0"/>
+                  <a:cs typeface="Segoe UI Light" panose="020B0502040204020203" pitchFamily="34" charset="0"/>
+                </a:rPr>
+              </a:br>
+              <a:r>
+                <a:rPr lang="en-US" sz="1050" dirty="0" smtClean="0">
+                  <a:solidFill>
+                    <a:schemeClr val="bg1"/>
+                  </a:solidFill>
+                  <a:latin typeface="Segoe UI Light" panose="020B0502040204020203" pitchFamily="34" charset="0"/>
+                  <a:cs typeface="Segoe UI Light" panose="020B0502040204020203" pitchFamily="34" charset="0"/>
+                </a:rPr>
+                <a:t>2030</a:t>
+              </a:r>
+              <a:br>
+                <a:rPr lang="en-US" sz="1050" dirty="0" smtClean="0">
+                  <a:solidFill>
+                    <a:schemeClr val="bg1"/>
+                  </a:solidFill>
+                  <a:latin typeface="Segoe UI Light" panose="020B0502040204020203" pitchFamily="34" charset="0"/>
+                  <a:cs typeface="Segoe UI Light" panose="020B0502040204020203" pitchFamily="34" charset="0"/>
+                </a:rPr>
+              </a:br>
+              <a:r>
+                <a:rPr lang="en-US" sz="1050" dirty="0" smtClean="0">
+                  <a:solidFill>
+                    <a:schemeClr val="bg1"/>
+                  </a:solidFill>
+                  <a:latin typeface="Segoe UI Light" panose="020B0502040204020203" pitchFamily="34" charset="0"/>
+                  <a:cs typeface="Segoe UI Light" panose="020B0502040204020203" pitchFamily="34" charset="0"/>
+                </a:rPr>
+                <a:t>2040</a:t>
+              </a:r>
+              <a:endParaRPr lang="en-US" sz="1050" dirty="0">
+                <a:solidFill>
+                  <a:schemeClr val="bg1"/>
+                </a:solidFill>
+                <a:latin typeface="Segoe UI Light" panose="020B0502040204020203" pitchFamily="34" charset="0"/>
+                <a:cs typeface="Segoe UI Light" panose="020B0502040204020203" pitchFamily="34" charset="0"/>
+              </a:endParaRPr>
+            </a:p>
+          </p:txBody>
+        </p:sp>
+        <p:sp>
+          <p:nvSpPr>
+            <p:cNvPr id="10" name="Rechteck 9"/>
+            <p:cNvSpPr/>
+            <p:nvPr/>
+          </p:nvSpPr>
+          <p:spPr>
+            <a:xfrm>
+              <a:off x="8181025" y="4037169"/>
+              <a:ext cx="290512" cy="83344"/>
+            </a:xfrm>
+            <a:prstGeom prst="rect">
+              <a:avLst/>
+            </a:prstGeom>
+            <a:ln>
+              <a:noFill/>
+            </a:ln>
+          </p:spPr>
+          <p:style>
+            <a:lnRef idx="2">
+              <a:schemeClr val="accent1">
+                <a:shade val="50000"/>
+              </a:schemeClr>
+            </a:lnRef>
+            <a:fillRef idx="1">
+              <a:schemeClr val="accent1"/>
+            </a:fillRef>
+            <a:effectRef idx="0">
+              <a:schemeClr val="accent1"/>
+            </a:effectRef>
+            <a:fontRef idx="minor">
+              <a:schemeClr val="lt1"/>
+            </a:fontRef>
+          </p:style>
+          <p:txBody>
+            <a:bodyPr rtlCol="0" anchor="ctr"/>
+            <a:lstStyle/>
+            <a:p>
+              <a:pPr algn="ctr"/>
+              <a:endParaRPr lang="en-US"/>
+            </a:p>
+          </p:txBody>
+        </p:sp>
+        <p:sp>
+          <p:nvSpPr>
+            <p:cNvPr id="11" name="Rechteck 10"/>
+            <p:cNvSpPr/>
+            <p:nvPr/>
+          </p:nvSpPr>
+          <p:spPr>
+            <a:xfrm>
+              <a:off x="8181025" y="4203656"/>
+              <a:ext cx="290512" cy="83344"/>
+            </a:xfrm>
+            <a:prstGeom prst="rect">
+              <a:avLst/>
+            </a:prstGeom>
+            <a:solidFill>
+              <a:srgbClr val="FF9900"/>
+            </a:solidFill>
+            <a:ln>
+              <a:noFill/>
+            </a:ln>
+          </p:spPr>
+          <p:style>
+            <a:lnRef idx="2">
+              <a:schemeClr val="accent1">
+                <a:shade val="50000"/>
+              </a:schemeClr>
+            </a:lnRef>
+            <a:fillRef idx="1">
+              <a:schemeClr val="accent1"/>
+            </a:fillRef>
+            <a:effectRef idx="0">
+              <a:schemeClr val="accent1"/>
+            </a:effectRef>
+            <a:fontRef idx="minor">
+              <a:schemeClr val="lt1"/>
+            </a:fontRef>
+          </p:style>
+          <p:txBody>
+            <a:bodyPr rtlCol="0" anchor="ctr"/>
+            <a:lstStyle/>
+            <a:p>
+              <a:pPr algn="ctr"/>
+              <a:endParaRPr lang="en-US"/>
+            </a:p>
+          </p:txBody>
+        </p:sp>
+        <p:sp>
+          <p:nvSpPr>
+            <p:cNvPr id="12" name="Rechteck 11"/>
+            <p:cNvSpPr/>
+            <p:nvPr/>
+          </p:nvSpPr>
+          <p:spPr>
+            <a:xfrm>
+              <a:off x="8181025" y="4354985"/>
+              <a:ext cx="290512" cy="83344"/>
+            </a:xfrm>
+            <a:prstGeom prst="rect">
+              <a:avLst/>
+            </a:prstGeom>
+            <a:solidFill>
+              <a:srgbClr val="5EC260"/>
+            </a:solidFill>
+            <a:ln>
+              <a:noFill/>
+            </a:ln>
+          </p:spPr>
+          <p:style>
+            <a:lnRef idx="2">
+              <a:schemeClr val="accent1">
+                <a:shade val="50000"/>
+              </a:schemeClr>
+            </a:lnRef>
+            <a:fillRef idx="1">
+              <a:schemeClr val="accent1"/>
+            </a:fillRef>
+            <a:effectRef idx="0">
+              <a:schemeClr val="accent1"/>
+            </a:effectRef>
+            <a:fontRef idx="minor">
+              <a:schemeClr val="lt1"/>
+            </a:fontRef>
+          </p:style>
+          <p:txBody>
+            <a:bodyPr rtlCol="0" anchor="ctr"/>
+            <a:lstStyle/>
+            <a:p>
+              <a:pPr algn="ctr"/>
+              <a:endParaRPr lang="en-US"/>
+            </a:p>
+          </p:txBody>
+        </p:sp>
+      </p:grpSp>
+      <p:sp>
+        <p:nvSpPr>
+          <p:cNvPr id="14" name="Line Callout 2 (Accent Bar) 4">
+            <a:extLst>
+              <a:ext uri="{FF2B5EF4-FFF2-40B4-BE49-F238E27FC236}">
+                <a16:creationId xmlns:a16="http://schemas.microsoft.com/office/drawing/2014/main" id="{218B7C8E-0342-4CB2-8F37-63ECAB33323C}"/>
+              </a:ext>
+            </a:extLst>
+          </p:cNvPr>
+          <p:cNvSpPr/>
+          <p:nvPr/>
+        </p:nvSpPr>
+        <p:spPr bwMode="gray">
+          <a:xfrm flipH="1">
+            <a:off x="9155857" y="4397633"/>
+            <a:ext cx="1760115" cy="918363"/>
+          </a:xfrm>
+          <a:prstGeom prst="accentCallout2">
+            <a:avLst>
+              <a:gd name="adj1" fmla="val 43021"/>
+              <a:gd name="adj2" fmla="val 103931"/>
+              <a:gd name="adj3" fmla="val -82206"/>
+              <a:gd name="adj4" fmla="val 222871"/>
+              <a:gd name="adj5" fmla="val -81842"/>
+              <a:gd name="adj6" fmla="val 348611"/>
+            </a:avLst>
+          </a:prstGeom>
+          <a:solidFill>
+            <a:schemeClr val="bg1">
+              <a:lumMod val="95000"/>
+            </a:schemeClr>
+          </a:solidFill>
+          <a:ln w="19050">
+            <a:solidFill>
+              <a:schemeClr val="tx1">
+                <a:lumMod val="95000"/>
+                <a:lumOff val="5000"/>
+              </a:schemeClr>
+            </a:solidFill>
+            <a:headEnd type="oval" w="med" len="med"/>
+            <a:tailEnd type="oval" w="med" len="med"/>
+          </a:ln>
+        </p:spPr>
+        <p:style>
+          <a:lnRef idx="2">
+            <a:schemeClr val="accent2">
+              <a:shade val="50000"/>
+            </a:schemeClr>
+          </a:lnRef>
+          <a:fillRef idx="1">
+            <a:schemeClr val="accent2"/>
+          </a:fillRef>
+          <a:effectRef idx="0">
+            <a:schemeClr val="accent2"/>
+          </a:effectRef>
+          <a:fontRef idx="minor">
+            <a:schemeClr val="lt1"/>
+          </a:fontRef>
+        </p:style>
+        <p:txBody>
+          <a:bodyPr lIns="108000" tIns="72000" rIns="108000" bIns="72000" rtlCol="0" anchor="t" anchorCtr="0"/>
+          <a:lstStyle/>
+          <a:p>
+            <a:r>
+              <a:rPr lang="en-US" sz="1050" dirty="0" smtClean="0">
+                <a:solidFill>
+                  <a:schemeClr val="tx1"/>
+                </a:solidFill>
+                <a:latin typeface="Segoe UI Light" panose="020B0502040204020203" pitchFamily="34" charset="0"/>
+                <a:cs typeface="Segoe UI Light" panose="020B0502040204020203" pitchFamily="34" charset="0"/>
+              </a:rPr>
+              <a:t>In 2040, results indicate the </a:t>
+            </a:r>
+            <a:r>
+              <a:rPr lang="en-US" sz="1050" b="1" dirty="0" smtClean="0">
+                <a:solidFill>
+                  <a:schemeClr val="tx1"/>
+                </a:solidFill>
+                <a:latin typeface="Segoe UI Light" panose="020B0502040204020203" pitchFamily="34" charset="0"/>
+                <a:cs typeface="Segoe UI Light" panose="020B0502040204020203" pitchFamily="34" charset="0"/>
+              </a:rPr>
+              <a:t>same</a:t>
+            </a:r>
+            <a:r>
+              <a:rPr lang="en-US" sz="1050" dirty="0" smtClean="0">
+                <a:solidFill>
+                  <a:schemeClr val="tx1"/>
+                </a:solidFill>
+                <a:latin typeface="Segoe UI Light" panose="020B0502040204020203" pitchFamily="34" charset="0"/>
+                <a:cs typeface="Segoe UI Light" panose="020B0502040204020203" pitchFamily="34" charset="0"/>
+              </a:rPr>
+              <a:t> division of exporters into the aforementioned </a:t>
+            </a:r>
+            <a:r>
+              <a:rPr lang="en-US" sz="1050" b="1" dirty="0" smtClean="0">
+                <a:solidFill>
+                  <a:schemeClr val="tx1"/>
+                </a:solidFill>
+                <a:latin typeface="Segoe UI Light" panose="020B0502040204020203" pitchFamily="34" charset="0"/>
+                <a:cs typeface="Segoe UI Light" panose="020B0502040204020203" pitchFamily="34" charset="0"/>
+              </a:rPr>
+              <a:t>three groups </a:t>
+            </a:r>
+            <a:r>
+              <a:rPr lang="en-US" sz="1050" dirty="0" smtClean="0">
+                <a:solidFill>
+                  <a:schemeClr val="tx1"/>
+                </a:solidFill>
+                <a:latin typeface="Segoe UI Light" panose="020B0502040204020203" pitchFamily="34" charset="0"/>
+                <a:cs typeface="Segoe UI Light" panose="020B0502040204020203" pitchFamily="34" charset="0"/>
+              </a:rPr>
+              <a:t>as in 2019</a:t>
+            </a:r>
+            <a:endParaRPr lang="en-US" sz="1050" dirty="0">
+              <a:solidFill>
+                <a:schemeClr val="tx1"/>
+              </a:solidFill>
+              <a:latin typeface="Segoe UI Light" panose="020B0502040204020203" pitchFamily="34" charset="0"/>
+              <a:cs typeface="Segoe UI Light" panose="020B0502040204020203" pitchFamily="34" charset="0"/>
+            </a:endParaRPr>
+          </a:p>
+        </p:txBody>
+      </p:sp>
+      <p:sp>
+        <p:nvSpPr>
+          <p:cNvPr id="15" name="Line Callout 2 (Accent Bar) 4">
+            <a:extLst>
+              <a:ext uri="{FF2B5EF4-FFF2-40B4-BE49-F238E27FC236}">
+                <a16:creationId xmlns:a16="http://schemas.microsoft.com/office/drawing/2014/main" id="{218B7C8E-0342-4CB2-8F37-63ECAB33323C}"/>
+              </a:ext>
+            </a:extLst>
+          </p:cNvPr>
+          <p:cNvSpPr/>
+          <p:nvPr/>
+        </p:nvSpPr>
+        <p:spPr bwMode="gray">
+          <a:xfrm flipH="1">
+            <a:off x="9155856" y="2427835"/>
+            <a:ext cx="1760115" cy="918363"/>
+          </a:xfrm>
+          <a:prstGeom prst="accentCallout2">
+            <a:avLst>
+              <a:gd name="adj1" fmla="val 43021"/>
+              <a:gd name="adj2" fmla="val 103931"/>
+              <a:gd name="adj3" fmla="val -82206"/>
+              <a:gd name="adj4" fmla="val 222871"/>
+              <a:gd name="adj5" fmla="val -103781"/>
+              <a:gd name="adj6" fmla="val 222989"/>
+            </a:avLst>
+          </a:prstGeom>
+          <a:solidFill>
+            <a:schemeClr val="bg1">
+              <a:lumMod val="95000"/>
+            </a:schemeClr>
+          </a:solidFill>
+          <a:ln w="19050">
+            <a:solidFill>
+              <a:schemeClr val="tx1">
+                <a:lumMod val="95000"/>
+                <a:lumOff val="5000"/>
+              </a:schemeClr>
+            </a:solidFill>
+            <a:headEnd type="oval" w="med" len="med"/>
+            <a:tailEnd type="oval" w="med" len="med"/>
+          </a:ln>
+        </p:spPr>
+        <p:style>
+          <a:lnRef idx="2">
+            <a:schemeClr val="accent2">
+              <a:shade val="50000"/>
+            </a:schemeClr>
+          </a:lnRef>
+          <a:fillRef idx="1">
+            <a:schemeClr val="accent2"/>
+          </a:fillRef>
+          <a:effectRef idx="0">
+            <a:schemeClr val="accent2"/>
+          </a:effectRef>
+          <a:fontRef idx="minor">
+            <a:schemeClr val="lt1"/>
+          </a:fontRef>
+        </p:style>
+        <p:txBody>
+          <a:bodyPr lIns="108000" tIns="72000" rIns="108000" bIns="72000" rtlCol="0" anchor="t" anchorCtr="0"/>
+          <a:lstStyle/>
+          <a:p>
+            <a:r>
+              <a:rPr lang="en-US" sz="1050" b="1" dirty="0" smtClean="0">
+                <a:solidFill>
+                  <a:schemeClr val="tx1"/>
+                </a:solidFill>
+                <a:latin typeface="Segoe UI Light" panose="020B0502040204020203" pitchFamily="34" charset="0"/>
+                <a:cs typeface="Segoe UI Light" panose="020B0502040204020203" pitchFamily="34" charset="0"/>
+              </a:rPr>
+              <a:t>USA</a:t>
+            </a:r>
+            <a:r>
+              <a:rPr lang="en-US" sz="1050" dirty="0" smtClean="0">
+                <a:solidFill>
+                  <a:schemeClr val="tx1"/>
+                </a:solidFill>
+                <a:latin typeface="Segoe UI Light" panose="020B0502040204020203" pitchFamily="34" charset="0"/>
+                <a:cs typeface="Segoe UI Light" panose="020B0502040204020203" pitchFamily="34" charset="0"/>
+              </a:rPr>
+              <a:t> as exporter with the largest LNG liquefaction capacity replaces Australia as a </a:t>
+            </a:r>
+            <a:r>
+              <a:rPr lang="en-US" sz="1050" b="1" dirty="0" smtClean="0">
+                <a:solidFill>
+                  <a:schemeClr val="tx1"/>
+                </a:solidFill>
+                <a:latin typeface="Segoe UI Light" panose="020B0502040204020203" pitchFamily="34" charset="0"/>
+                <a:cs typeface="Segoe UI Light" panose="020B0502040204020203" pitchFamily="34" charset="0"/>
+              </a:rPr>
+              <a:t>marginal exporter </a:t>
+            </a:r>
+            <a:r>
+              <a:rPr lang="en-US" sz="1050" dirty="0" smtClean="0">
+                <a:solidFill>
+                  <a:schemeClr val="tx1"/>
+                </a:solidFill>
+                <a:latin typeface="Segoe UI Light" panose="020B0502040204020203" pitchFamily="34" charset="0"/>
+                <a:cs typeface="Segoe UI Light" panose="020B0502040204020203" pitchFamily="34" charset="0"/>
+              </a:rPr>
+              <a:t>in 2040 compared to 2019.</a:t>
+            </a:r>
+            <a:endParaRPr lang="en-US" sz="1050" dirty="0">
+              <a:solidFill>
+                <a:schemeClr val="tx1"/>
+              </a:solidFill>
+              <a:latin typeface="Segoe UI Light" panose="020B0502040204020203" pitchFamily="34" charset="0"/>
+              <a:cs typeface="Segoe UI Light" panose="020B0502040204020203" pitchFamily="34" charset="0"/>
+            </a:endParaRPr>
+          </a:p>
+        </p:txBody>
+      </p:sp>
+      <p:sp>
+        <p:nvSpPr>
+          <p:cNvPr id="18" name="Fußzeilenplatzhalter 8"/>
+          <p:cNvSpPr txBox="1">
+            <a:spLocks/>
           </p:cNvSpPr>
-          <p:nvPr>
-            <p:ph type="ftr" sz="quarter" idx="3"/>
-          </p:nvPr>
-        </p:nvSpPr>
-        <p:spPr/>
-        <p:txBody>
-          <a:bodyPr/>
-          <a:lstStyle/>
+          <p:nvPr/>
+        </p:nvSpPr>
+        <p:spPr>
+          <a:xfrm>
+            <a:off x="2875147" y="1125523"/>
+            <a:ext cx="3914388" cy="246221"/>
+          </a:xfrm>
+          <a:prstGeom prst="rect">
+            <a:avLst/>
+          </a:prstGeom>
+        </p:spPr>
+        <p:txBody>
+          <a:bodyPr vert="horz" lIns="91440" tIns="45720" rIns="91440" bIns="45720" rtlCol="0" anchor="b" anchorCtr="0">
+            <a:noAutofit/>
+          </a:bodyPr>
+          <a:lstStyle>
+            <a:defPPr>
+              <a:defRPr lang="en-US"/>
+            </a:defPPr>
+            <a:lvl1pPr marL="0" algn="r" defTabSz="914400" rtl="0" eaLnBrk="1" latinLnBrk="0" hangingPunct="1">
+              <a:defRPr sz="1000" kern="1200">
+                <a:solidFill>
+                  <a:schemeClr val="tx1">
+                    <a:tint val="75000"/>
+                  </a:schemeClr>
+                </a:solidFill>
+                <a:latin typeface="Tahoma" panose="020B0604030504040204" pitchFamily="34" charset="0"/>
+                <a:ea typeface="Tahoma" panose="020B0604030504040204" pitchFamily="34" charset="0"/>
+                <a:cs typeface="Tahoma" panose="020B0604030504040204" pitchFamily="34" charset="0"/>
+              </a:defRPr>
+            </a:lvl1pPr>
+            <a:lvl2pPr marL="457200" algn="l" defTabSz="914400" rtl="0" eaLnBrk="1" latinLnBrk="0" hangingPunct="1">
+              <a:defRPr sz="1800" kern="1200">
+                <a:solidFill>
+                  <a:schemeClr val="tx1"/>
+                </a:solidFill>
+                <a:latin typeface="+mn-lt"/>
+                <a:ea typeface="+mn-ea"/>
+                <a:cs typeface="+mn-cs"/>
+              </a:defRPr>
+            </a:lvl2pPr>
+            <a:lvl3pPr marL="914400" algn="l" defTabSz="914400" rtl="0" eaLnBrk="1" latinLnBrk="0" hangingPunct="1">
+              <a:defRPr sz="1800" kern="1200">
+                <a:solidFill>
+                  <a:schemeClr val="tx1"/>
+                </a:solidFill>
+                <a:latin typeface="+mn-lt"/>
+                <a:ea typeface="+mn-ea"/>
+                <a:cs typeface="+mn-cs"/>
+              </a:defRPr>
+            </a:lvl3pPr>
+            <a:lvl4pPr marL="1371600" algn="l" defTabSz="914400" rtl="0" eaLnBrk="1" latinLnBrk="0" hangingPunct="1">
+              <a:defRPr sz="1800" kern="1200">
+                <a:solidFill>
+                  <a:schemeClr val="tx1"/>
+                </a:solidFill>
+                <a:latin typeface="+mn-lt"/>
+                <a:ea typeface="+mn-ea"/>
+                <a:cs typeface="+mn-cs"/>
+              </a:defRPr>
+            </a:lvl4pPr>
+            <a:lvl5pPr marL="1828800" algn="l" defTabSz="914400" rtl="0" eaLnBrk="1" latinLnBrk="0" hangingPunct="1">
+              <a:defRPr sz="1800" kern="1200">
+                <a:solidFill>
+                  <a:schemeClr val="tx1"/>
+                </a:solidFill>
+                <a:latin typeface="+mn-lt"/>
+                <a:ea typeface="+mn-ea"/>
+                <a:cs typeface="+mn-cs"/>
+              </a:defRPr>
+            </a:lvl5pPr>
+            <a:lvl6pPr marL="2286000" algn="l" defTabSz="914400" rtl="0" eaLnBrk="1" latinLnBrk="0" hangingPunct="1">
+              <a:defRPr sz="1800" kern="1200">
+                <a:solidFill>
+                  <a:schemeClr val="tx1"/>
+                </a:solidFill>
+                <a:latin typeface="+mn-lt"/>
+                <a:ea typeface="+mn-ea"/>
+                <a:cs typeface="+mn-cs"/>
+              </a:defRPr>
+            </a:lvl6pPr>
+            <a:lvl7pPr marL="2743200" algn="l" defTabSz="914400" rtl="0" eaLnBrk="1" latinLnBrk="0" hangingPunct="1">
+              <a:defRPr sz="1800" kern="1200">
+                <a:solidFill>
+                  <a:schemeClr val="tx1"/>
+                </a:solidFill>
+                <a:latin typeface="+mn-lt"/>
+                <a:ea typeface="+mn-ea"/>
+                <a:cs typeface="+mn-cs"/>
+              </a:defRPr>
+            </a:lvl7pPr>
+            <a:lvl8pPr marL="3200400" algn="l" defTabSz="914400" rtl="0" eaLnBrk="1" latinLnBrk="0" hangingPunct="1">
+              <a:defRPr sz="1800" kern="1200">
+                <a:solidFill>
+                  <a:schemeClr val="tx1"/>
+                </a:solidFill>
+                <a:latin typeface="+mn-lt"/>
+                <a:ea typeface="+mn-ea"/>
+                <a:cs typeface="+mn-cs"/>
+              </a:defRPr>
+            </a:lvl8pPr>
+            <a:lvl9pPr marL="3657600" algn="l" defTabSz="914400" rtl="0" eaLnBrk="1" latinLnBrk="0" hangingPunct="1">
+              <a:defRPr sz="1800" kern="1200">
+                <a:solidFill>
+                  <a:schemeClr val="tx1"/>
+                </a:solidFill>
+                <a:latin typeface="+mn-lt"/>
+                <a:ea typeface="+mn-ea"/>
+                <a:cs typeface="+mn-cs"/>
+              </a:defRPr>
+            </a:lvl9pPr>
+          </a:lstStyle>
           <a:p>
             <a:pPr algn="ctr"/>
             <a:r>
-              <a:rPr lang="en-US" dirty="0" smtClean="0"/>
-              <a:t>Results (6/6)</a:t>
-            </a:r>
-            <a:endParaRPr lang="en-GB" dirty="0"/>
+              <a:rPr lang="en-US" dirty="0" smtClean="0">
+                <a:solidFill>
+                  <a:schemeClr val="bg1">
+                    <a:lumMod val="50000"/>
+                  </a:schemeClr>
+                </a:solidFill>
+              </a:rPr>
+              <a:t>Fig: </a:t>
+            </a:r>
+            <a:r>
+              <a:rPr lang="en-US" dirty="0" smtClean="0">
+                <a:solidFill>
+                  <a:schemeClr val="bg1">
+                    <a:lumMod val="50000"/>
+                  </a:schemeClr>
+                </a:solidFill>
+              </a:rPr>
+              <a:t>Shadow price </a:t>
+            </a:r>
+            <a:r>
+              <a:rPr lang="en-US" dirty="0" smtClean="0">
+                <a:solidFill>
+                  <a:schemeClr val="bg1">
+                    <a:lumMod val="50000"/>
+                  </a:schemeClr>
+                </a:solidFill>
+              </a:rPr>
+              <a:t>in $ per </a:t>
+            </a:r>
+            <a:r>
+              <a:rPr lang="en-US" dirty="0" err="1" smtClean="0">
+                <a:solidFill>
+                  <a:schemeClr val="bg1">
+                    <a:lumMod val="50000"/>
+                  </a:schemeClr>
+                </a:solidFill>
+              </a:rPr>
+              <a:t>mmBTU</a:t>
+            </a:r>
+            <a:endParaRPr lang="en-GB" dirty="0">
+              <a:solidFill>
+                <a:schemeClr val="bg1">
+                  <a:lumMod val="50000"/>
+                </a:schemeClr>
+              </a:solidFill>
+            </a:endParaRPr>
           </a:p>
         </p:txBody>
       </p:sp>
@@ -14132,6 +14962,77 @@
       </p:grpSpPr>
       <p:sp>
         <p:nvSpPr>
+          <p:cNvPr id="19" name="Line Callout 2 (Accent Bar) 4">
+            <a:extLst>
+              <a:ext uri="{FF2B5EF4-FFF2-40B4-BE49-F238E27FC236}">
+                <a16:creationId xmlns:a16="http://schemas.microsoft.com/office/drawing/2014/main" id="{218B7C8E-0342-4CB2-8F37-63ECAB33323C}"/>
+              </a:ext>
+            </a:extLst>
+          </p:cNvPr>
+          <p:cNvSpPr/>
+          <p:nvPr/>
+        </p:nvSpPr>
+        <p:spPr bwMode="gray">
+          <a:xfrm flipH="1">
+            <a:off x="8061000" y="1067492"/>
+            <a:ext cx="2109793" cy="2498246"/>
+          </a:xfrm>
+          <a:prstGeom prst="accentCallout2">
+            <a:avLst>
+              <a:gd name="adj1" fmla="val 33686"/>
+              <a:gd name="adj2" fmla="val 104222"/>
+              <a:gd name="adj3" fmla="val 33152"/>
+              <a:gd name="adj4" fmla="val 234886"/>
+              <a:gd name="adj5" fmla="val 45042"/>
+              <a:gd name="adj6" fmla="val 251316"/>
+            </a:avLst>
+          </a:prstGeom>
+          <a:solidFill>
+            <a:schemeClr val="bg1"/>
+          </a:solidFill>
+          <a:ln w="19050">
+            <a:solidFill>
+              <a:schemeClr val="tx1">
+                <a:lumMod val="95000"/>
+                <a:lumOff val="5000"/>
+              </a:schemeClr>
+            </a:solidFill>
+            <a:headEnd type="oval" w="med" len="med"/>
+            <a:tailEnd type="oval" w="med" len="med"/>
+          </a:ln>
+        </p:spPr>
+        <p:style>
+          <a:lnRef idx="2">
+            <a:schemeClr val="accent2">
+              <a:shade val="50000"/>
+            </a:schemeClr>
+          </a:lnRef>
+          <a:fillRef idx="1">
+            <a:schemeClr val="accent2"/>
+          </a:fillRef>
+          <a:effectRef idx="0">
+            <a:schemeClr val="accent2"/>
+          </a:effectRef>
+          <a:fontRef idx="minor">
+            <a:schemeClr val="lt1"/>
+          </a:fontRef>
+        </p:style>
+        <p:txBody>
+          <a:bodyPr lIns="108000" tIns="72000" rIns="108000" bIns="72000" rtlCol="0" anchor="t" anchorCtr="0"/>
+          <a:lstStyle/>
+          <a:p>
+            <a:endParaRPr lang="en-US" sz="1050" dirty="0">
+              <a:solidFill>
+                <a:schemeClr val="tx1"/>
+              </a:solidFill>
+              <a:latin typeface="Segoe UI Light" panose="020B0502040204020203" pitchFamily="34" charset="0"/>
+              <a:cs typeface="Segoe UI Light" panose="020B0502040204020203" pitchFamily="34" charset="0"/>
+            </a:endParaRPr>
+          </a:p>
+        </p:txBody>
+      </p:sp>
+      <p:sp>
+        <p:nvSpPr>
           <p:cNvPr id="2" name="Foliennummernplatzhalter 1"/>
           <p:cNvSpPr>
             <a:spLocks noGrp="1"/>
@@ -14156,25 +15057,6 @@
       </p:sp>
       <p:sp>
         <p:nvSpPr>
-          <p:cNvPr id="5" name="Inhaltsplatzhalter 4"/>
-          <p:cNvSpPr>
-            <a:spLocks noGrp="1"/>
-          </p:cNvSpPr>
-          <p:nvPr>
-            <p:ph sz="half" idx="1"/>
-          </p:nvPr>
-        </p:nvSpPr>
-        <p:spPr/>
-        <p:txBody>
-          <a:bodyPr/>
-          <a:lstStyle/>
-          <a:p>
-            <a:endParaRPr lang="en-US"/>
-          </a:p>
-        </p:txBody>
-      </p:sp>
-      <p:sp>
-        <p:nvSpPr>
           <p:cNvPr id="4" name="Titel 3"/>
           <p:cNvSpPr>
             <a:spLocks noGrp="1"/>
@@ -14188,38 +15070,1463 @@
           <a:bodyPr/>
           <a:lstStyle/>
           <a:p>
+            <a:r>
+              <a:rPr lang="en-US" dirty="0" smtClean="0"/>
+              <a:t>Europe’s </a:t>
+            </a:r>
+            <a:r>
+              <a:rPr lang="en-US" dirty="0" smtClean="0"/>
+              <a:t>LNG </a:t>
+            </a:r>
+            <a:r>
+              <a:rPr lang="en-US" dirty="0" smtClean="0"/>
+              <a:t>prices until 2040</a:t>
+            </a:r>
             <a:endParaRPr lang="en-US" dirty="0"/>
           </a:p>
         </p:txBody>
       </p:sp>
-      <p:sp>
-        <p:nvSpPr>
-          <p:cNvPr id="9" name="Fußzeilenplatzhalter 8"/>
-          <p:cNvSpPr>
-            <a:spLocks noGrp="1"/>
+      <p:graphicFrame>
+        <p:nvGraphicFramePr>
+          <p:cNvPr id="5" name="Tabelle 4"/>
+          <p:cNvGraphicFramePr>
+            <a:graphicFrameLocks noGrp="1"/>
+          </p:cNvGraphicFramePr>
+          <p:nvPr>
+            <p:extLst>
+              <p:ext uri="{D42A27DB-BD31-4B8C-83A1-F6EECF244321}">
+                <p14:modId xmlns:p14="http://schemas.microsoft.com/office/powerpoint/2010/main" val="3520730902"/>
+              </p:ext>
+            </p:extLst>
+          </p:nvPr>
+        </p:nvGraphicFramePr>
+        <p:xfrm>
+          <a:off x="756590" y="2316616"/>
+          <a:ext cx="6190395" cy="3316236"/>
+        </p:xfrm>
+        <a:graphic>
+          <a:graphicData uri="http://schemas.openxmlformats.org/drawingml/2006/table">
+            <a:tbl>
+              <a:tblPr firstRow="1" lastRow="1" bandRow="1">
+                <a:tableStyleId>{5C22544A-7EE6-4342-B048-85BDC9FD1C3A}</a:tableStyleId>
+              </a:tblPr>
+              <a:tblGrid>
+                <a:gridCol w="3586221">
+                  <a:extLst>
+                    <a:ext uri="{9D8B030D-6E8A-4147-A177-3AD203B41FA5}">
+                      <a16:colId xmlns:a16="http://schemas.microsoft.com/office/drawing/2014/main" val="2921874020"/>
+                    </a:ext>
+                  </a:extLst>
+                </a:gridCol>
+                <a:gridCol w="868058">
+                  <a:extLst>
+                    <a:ext uri="{9D8B030D-6E8A-4147-A177-3AD203B41FA5}">
+                      <a16:colId xmlns:a16="http://schemas.microsoft.com/office/drawing/2014/main" val="3901217164"/>
+                    </a:ext>
+                  </a:extLst>
+                </a:gridCol>
+                <a:gridCol w="868058">
+                  <a:extLst>
+                    <a:ext uri="{9D8B030D-6E8A-4147-A177-3AD203B41FA5}">
+                      <a16:colId xmlns:a16="http://schemas.microsoft.com/office/drawing/2014/main" val="2215986841"/>
+                    </a:ext>
+                  </a:extLst>
+                </a:gridCol>
+                <a:gridCol w="868058">
+                  <a:extLst>
+                    <a:ext uri="{9D8B030D-6E8A-4147-A177-3AD203B41FA5}">
+                      <a16:colId xmlns:a16="http://schemas.microsoft.com/office/drawing/2014/main" val="2121073242"/>
+                    </a:ext>
+                  </a:extLst>
+                </a:gridCol>
+              </a:tblGrid>
+              <a:tr h="473748">
+                <a:tc>
+                  <a:txBody>
+                    <a:bodyPr/>
+                    <a:lstStyle/>
+                    <a:p>
+                      <a:r>
+                        <a:rPr lang="en-US" dirty="0" smtClean="0">
+                          <a:latin typeface="Segoe UI Light" panose="020B0502040204020203" pitchFamily="34" charset="0"/>
+                          <a:cs typeface="Segoe UI Light" panose="020B0502040204020203" pitchFamily="34" charset="0"/>
+                        </a:rPr>
+                        <a:t>Country / in $ per </a:t>
+                      </a:r>
+                      <a:r>
+                        <a:rPr lang="en-US" dirty="0" err="1" smtClean="0">
+                          <a:latin typeface="Segoe UI Light" panose="020B0502040204020203" pitchFamily="34" charset="0"/>
+                          <a:cs typeface="Segoe UI Light" panose="020B0502040204020203" pitchFamily="34" charset="0"/>
+                        </a:rPr>
+                        <a:t>mmBTU</a:t>
+                      </a:r>
+                      <a:endParaRPr lang="en-US" dirty="0">
+                        <a:latin typeface="Segoe UI Light" panose="020B0502040204020203" pitchFamily="34" charset="0"/>
+                        <a:cs typeface="Segoe UI Light" panose="020B0502040204020203" pitchFamily="34" charset="0"/>
+                      </a:endParaRPr>
+                    </a:p>
+                  </a:txBody>
+                  <a:tcPr>
+                    <a:solidFill>
+                      <a:srgbClr val="86A3B8"/>
+                    </a:solidFill>
+                  </a:tcPr>
+                </a:tc>
+                <a:tc>
+                  <a:txBody>
+                    <a:bodyPr/>
+                    <a:lstStyle/>
+                    <a:p>
+                      <a:pPr algn="r"/>
+                      <a:r>
+                        <a:rPr lang="en-US" dirty="0" smtClean="0">
+                          <a:latin typeface="Segoe UI Light" panose="020B0502040204020203" pitchFamily="34" charset="0"/>
+                          <a:cs typeface="Segoe UI Light" panose="020B0502040204020203" pitchFamily="34" charset="0"/>
+                        </a:rPr>
+                        <a:t>2019</a:t>
+                      </a:r>
+                      <a:endParaRPr lang="en-US" dirty="0">
+                        <a:latin typeface="Segoe UI Light" panose="020B0502040204020203" pitchFamily="34" charset="0"/>
+                        <a:cs typeface="Segoe UI Light" panose="020B0502040204020203" pitchFamily="34" charset="0"/>
+                      </a:endParaRPr>
+                    </a:p>
+                  </a:txBody>
+                  <a:tcPr>
+                    <a:solidFill>
+                      <a:srgbClr val="86A3B8"/>
+                    </a:solidFill>
+                  </a:tcPr>
+                </a:tc>
+                <a:tc>
+                  <a:txBody>
+                    <a:bodyPr/>
+                    <a:lstStyle/>
+                    <a:p>
+                      <a:pPr algn="r"/>
+                      <a:r>
+                        <a:rPr lang="en-US" dirty="0" smtClean="0">
+                          <a:latin typeface="Segoe UI Light" panose="020B0502040204020203" pitchFamily="34" charset="0"/>
+                          <a:cs typeface="Segoe UI Light" panose="020B0502040204020203" pitchFamily="34" charset="0"/>
+                        </a:rPr>
+                        <a:t>2030</a:t>
+                      </a:r>
+                      <a:endParaRPr lang="en-US" dirty="0">
+                        <a:latin typeface="Segoe UI Light" panose="020B0502040204020203" pitchFamily="34" charset="0"/>
+                        <a:cs typeface="Segoe UI Light" panose="020B0502040204020203" pitchFamily="34" charset="0"/>
+                      </a:endParaRPr>
+                    </a:p>
+                  </a:txBody>
+                  <a:tcPr>
+                    <a:solidFill>
+                      <a:srgbClr val="86A3B8"/>
+                    </a:solidFill>
+                  </a:tcPr>
+                </a:tc>
+                <a:tc>
+                  <a:txBody>
+                    <a:bodyPr/>
+                    <a:lstStyle/>
+                    <a:p>
+                      <a:pPr algn="r"/>
+                      <a:r>
+                        <a:rPr lang="en-US" dirty="0" smtClean="0">
+                          <a:latin typeface="Segoe UI Light" panose="020B0502040204020203" pitchFamily="34" charset="0"/>
+                          <a:cs typeface="Segoe UI Light" panose="020B0502040204020203" pitchFamily="34" charset="0"/>
+                        </a:rPr>
+                        <a:t>2040</a:t>
+                      </a:r>
+                      <a:endParaRPr lang="en-US" dirty="0">
+                        <a:latin typeface="Segoe UI Light" panose="020B0502040204020203" pitchFamily="34" charset="0"/>
+                        <a:cs typeface="Segoe UI Light" panose="020B0502040204020203" pitchFamily="34" charset="0"/>
+                      </a:endParaRPr>
+                    </a:p>
+                  </a:txBody>
+                  <a:tcPr>
+                    <a:solidFill>
+                      <a:srgbClr val="86A3B8"/>
+                    </a:solidFill>
+                  </a:tcPr>
+                </a:tc>
+                <a:extLst>
+                  <a:ext uri="{0D108BD9-81ED-4DB2-BD59-A6C34878D82A}">
+                    <a16:rowId xmlns:a16="http://schemas.microsoft.com/office/drawing/2014/main" val="3530602819"/>
+                  </a:ext>
+                </a:extLst>
+              </a:tr>
+              <a:tr h="473748">
+                <a:tc>
+                  <a:txBody>
+                    <a:bodyPr/>
+                    <a:lstStyle/>
+                    <a:p>
+                      <a:r>
+                        <a:rPr lang="en-US" dirty="0" smtClean="0">
+                          <a:latin typeface="Segoe UI Light" panose="020B0502040204020203" pitchFamily="34" charset="0"/>
+                          <a:cs typeface="Segoe UI Light" panose="020B0502040204020203" pitchFamily="34" charset="0"/>
+                        </a:rPr>
+                        <a:t>Belgium</a:t>
+                      </a:r>
+                    </a:p>
+                  </a:txBody>
+                  <a:tcPr>
+                    <a:solidFill>
+                      <a:srgbClr val="FFFFFF"/>
+                    </a:solidFill>
+                  </a:tcPr>
+                </a:tc>
+                <a:tc>
+                  <a:txBody>
+                    <a:bodyPr/>
+                    <a:lstStyle/>
+                    <a:p>
+                      <a:pPr algn="r"/>
+                      <a:r>
+                        <a:rPr lang="en-US" dirty="0" smtClean="0">
+                          <a:latin typeface="Segoe UI Light" panose="020B0502040204020203" pitchFamily="34" charset="0"/>
+                          <a:cs typeface="Segoe UI Light" panose="020B0502040204020203" pitchFamily="34" charset="0"/>
+                        </a:rPr>
+                        <a:t>7,9</a:t>
+                      </a:r>
+                      <a:endParaRPr lang="en-US" dirty="0">
+                        <a:latin typeface="Segoe UI Light" panose="020B0502040204020203" pitchFamily="34" charset="0"/>
+                        <a:cs typeface="Segoe UI Light" panose="020B0502040204020203" pitchFamily="34" charset="0"/>
+                      </a:endParaRPr>
+                    </a:p>
+                  </a:txBody>
+                  <a:tcPr>
+                    <a:solidFill>
+                      <a:srgbClr val="FFFFFF"/>
+                    </a:solidFill>
+                  </a:tcPr>
+                </a:tc>
+                <a:tc>
+                  <a:txBody>
+                    <a:bodyPr/>
+                    <a:lstStyle/>
+                    <a:p>
+                      <a:pPr algn="r"/>
+                      <a:r>
+                        <a:rPr lang="en-US" dirty="0" smtClean="0">
+                          <a:latin typeface="Segoe UI Light" panose="020B0502040204020203" pitchFamily="34" charset="0"/>
+                          <a:cs typeface="Segoe UI Light" panose="020B0502040204020203" pitchFamily="34" charset="0"/>
+                        </a:rPr>
+                        <a:t>10,0</a:t>
+                      </a:r>
+                      <a:endParaRPr lang="en-US" dirty="0">
+                        <a:latin typeface="Segoe UI Light" panose="020B0502040204020203" pitchFamily="34" charset="0"/>
+                        <a:cs typeface="Segoe UI Light" panose="020B0502040204020203" pitchFamily="34" charset="0"/>
+                      </a:endParaRPr>
+                    </a:p>
+                  </a:txBody>
+                  <a:tcPr>
+                    <a:solidFill>
+                      <a:srgbClr val="FFFFFF"/>
+                    </a:solidFill>
+                  </a:tcPr>
+                </a:tc>
+                <a:tc>
+                  <a:txBody>
+                    <a:bodyPr/>
+                    <a:lstStyle/>
+                    <a:p>
+                      <a:pPr algn="r"/>
+                      <a:r>
+                        <a:rPr lang="en-US" dirty="0" smtClean="0">
+                          <a:latin typeface="Segoe UI Light" panose="020B0502040204020203" pitchFamily="34" charset="0"/>
+                          <a:cs typeface="Segoe UI Light" panose="020B0502040204020203" pitchFamily="34" charset="0"/>
+                        </a:rPr>
+                        <a:t>12,2</a:t>
+                      </a:r>
+                      <a:endParaRPr lang="en-US" dirty="0">
+                        <a:latin typeface="Segoe UI Light" panose="020B0502040204020203" pitchFamily="34" charset="0"/>
+                        <a:cs typeface="Segoe UI Light" panose="020B0502040204020203" pitchFamily="34" charset="0"/>
+                      </a:endParaRPr>
+                    </a:p>
+                  </a:txBody>
+                  <a:tcPr>
+                    <a:solidFill>
+                      <a:srgbClr val="FFFFFF"/>
+                    </a:solidFill>
+                  </a:tcPr>
+                </a:tc>
+                <a:extLst>
+                  <a:ext uri="{0D108BD9-81ED-4DB2-BD59-A6C34878D82A}">
+                    <a16:rowId xmlns:a16="http://schemas.microsoft.com/office/drawing/2014/main" val="2416770383"/>
+                  </a:ext>
+                </a:extLst>
+              </a:tr>
+              <a:tr h="473748">
+                <a:tc>
+                  <a:txBody>
+                    <a:bodyPr/>
+                    <a:lstStyle/>
+                    <a:p>
+                      <a:r>
+                        <a:rPr lang="en-US" dirty="0" smtClean="0">
+                          <a:latin typeface="Segoe UI Light" panose="020B0502040204020203" pitchFamily="34" charset="0"/>
+                          <a:cs typeface="Segoe UI Light" panose="020B0502040204020203" pitchFamily="34" charset="0"/>
+                        </a:rPr>
+                        <a:t>Germany (and </a:t>
+                      </a:r>
+                      <a:r>
+                        <a:rPr lang="en-US" baseline="0" dirty="0" smtClean="0">
+                          <a:latin typeface="Segoe UI Light" panose="020B0502040204020203" pitchFamily="34" charset="0"/>
+                          <a:cs typeface="Segoe UI Light" panose="020B0502040204020203" pitchFamily="34" charset="0"/>
+                        </a:rPr>
+                        <a:t>o</a:t>
+                      </a:r>
+                      <a:r>
+                        <a:rPr lang="en-US" dirty="0" smtClean="0">
+                          <a:latin typeface="Segoe UI Light" panose="020B0502040204020203" pitchFamily="34" charset="0"/>
+                          <a:cs typeface="Segoe UI Light" panose="020B0502040204020203" pitchFamily="34" charset="0"/>
+                        </a:rPr>
+                        <a:t>ther Europe)</a:t>
+                      </a:r>
+                      <a:endParaRPr lang="en-US" dirty="0">
+                        <a:latin typeface="Segoe UI Light" panose="020B0502040204020203" pitchFamily="34" charset="0"/>
+                        <a:cs typeface="Segoe UI Light" panose="020B0502040204020203" pitchFamily="34" charset="0"/>
+                      </a:endParaRPr>
+                    </a:p>
+                  </a:txBody>
+                  <a:tcPr>
+                    <a:solidFill>
+                      <a:srgbClr val="FFFFFF"/>
+                    </a:solidFill>
+                  </a:tcPr>
+                </a:tc>
+                <a:tc>
+                  <a:txBody>
+                    <a:bodyPr/>
+                    <a:lstStyle/>
+                    <a:p>
+                      <a:pPr algn="r"/>
+                      <a:r>
+                        <a:rPr lang="en-US" dirty="0" smtClean="0">
+                          <a:latin typeface="Segoe UI Light" panose="020B0502040204020203" pitchFamily="34" charset="0"/>
+                          <a:cs typeface="Segoe UI Light" panose="020B0502040204020203" pitchFamily="34" charset="0"/>
+                        </a:rPr>
+                        <a:t>7,9</a:t>
+                      </a:r>
+                      <a:endParaRPr lang="en-US" dirty="0">
+                        <a:latin typeface="Segoe UI Light" panose="020B0502040204020203" pitchFamily="34" charset="0"/>
+                        <a:cs typeface="Segoe UI Light" panose="020B0502040204020203" pitchFamily="34" charset="0"/>
+                      </a:endParaRPr>
+                    </a:p>
+                  </a:txBody>
+                  <a:tcPr>
+                    <a:solidFill>
+                      <a:srgbClr val="FFFFFF"/>
+                    </a:solidFill>
+                  </a:tcPr>
+                </a:tc>
+                <a:tc>
+                  <a:txBody>
+                    <a:bodyPr/>
+                    <a:lstStyle/>
+                    <a:p>
+                      <a:pPr algn="r"/>
+                      <a:r>
+                        <a:rPr lang="en-US" dirty="0" smtClean="0">
+                          <a:latin typeface="Segoe UI Light" panose="020B0502040204020203" pitchFamily="34" charset="0"/>
+                          <a:cs typeface="Segoe UI Light" panose="020B0502040204020203" pitchFamily="34" charset="0"/>
+                        </a:rPr>
+                        <a:t>10,0</a:t>
+                      </a:r>
+                      <a:endParaRPr lang="en-US" dirty="0">
+                        <a:latin typeface="Segoe UI Light" panose="020B0502040204020203" pitchFamily="34" charset="0"/>
+                        <a:cs typeface="Segoe UI Light" panose="020B0502040204020203" pitchFamily="34" charset="0"/>
+                      </a:endParaRPr>
+                    </a:p>
+                  </a:txBody>
+                  <a:tcPr>
+                    <a:solidFill>
+                      <a:srgbClr val="FFFFFF"/>
+                    </a:solidFill>
+                  </a:tcPr>
+                </a:tc>
+                <a:tc>
+                  <a:txBody>
+                    <a:bodyPr/>
+                    <a:lstStyle/>
+                    <a:p>
+                      <a:pPr algn="r"/>
+                      <a:r>
+                        <a:rPr lang="en-US" dirty="0" smtClean="0">
+                          <a:latin typeface="Segoe UI Light" panose="020B0502040204020203" pitchFamily="34" charset="0"/>
+                          <a:cs typeface="Segoe UI Light" panose="020B0502040204020203" pitchFamily="34" charset="0"/>
+                        </a:rPr>
+                        <a:t>12,2</a:t>
+                      </a:r>
+                      <a:endParaRPr lang="en-US" dirty="0">
+                        <a:latin typeface="Segoe UI Light" panose="020B0502040204020203" pitchFamily="34" charset="0"/>
+                        <a:cs typeface="Segoe UI Light" panose="020B0502040204020203" pitchFamily="34" charset="0"/>
+                      </a:endParaRPr>
+                    </a:p>
+                  </a:txBody>
+                  <a:tcPr>
+                    <a:solidFill>
+                      <a:srgbClr val="FFFFFF"/>
+                    </a:solidFill>
+                  </a:tcPr>
+                </a:tc>
+                <a:extLst>
+                  <a:ext uri="{0D108BD9-81ED-4DB2-BD59-A6C34878D82A}">
+                    <a16:rowId xmlns:a16="http://schemas.microsoft.com/office/drawing/2014/main" val="2554979920"/>
+                  </a:ext>
+                </a:extLst>
+              </a:tr>
+              <a:tr h="473748">
+                <a:tc>
+                  <a:txBody>
+                    <a:bodyPr/>
+                    <a:lstStyle/>
+                    <a:p>
+                      <a:r>
+                        <a:rPr lang="en-US" dirty="0" smtClean="0">
+                          <a:latin typeface="Segoe UI Light" panose="020B0502040204020203" pitchFamily="34" charset="0"/>
+                          <a:cs typeface="Segoe UI Light" panose="020B0502040204020203" pitchFamily="34" charset="0"/>
+                        </a:rPr>
+                        <a:t>France</a:t>
+                      </a:r>
+                      <a:endParaRPr lang="en-US" dirty="0">
+                        <a:latin typeface="Segoe UI Light" panose="020B0502040204020203" pitchFamily="34" charset="0"/>
+                        <a:cs typeface="Segoe UI Light" panose="020B0502040204020203" pitchFamily="34" charset="0"/>
+                      </a:endParaRPr>
+                    </a:p>
+                  </a:txBody>
+                  <a:tcPr>
+                    <a:solidFill>
+                      <a:srgbClr val="FFFFFF"/>
+                    </a:solidFill>
+                  </a:tcPr>
+                </a:tc>
+                <a:tc>
+                  <a:txBody>
+                    <a:bodyPr/>
+                    <a:lstStyle/>
+                    <a:p>
+                      <a:pPr algn="r"/>
+                      <a:r>
+                        <a:rPr lang="en-US" dirty="0" smtClean="0">
+                          <a:latin typeface="Segoe UI Light" panose="020B0502040204020203" pitchFamily="34" charset="0"/>
+                          <a:cs typeface="Segoe UI Light" panose="020B0502040204020203" pitchFamily="34" charset="0"/>
+                        </a:rPr>
+                        <a:t>7,9</a:t>
+                      </a:r>
+                      <a:endParaRPr lang="en-US" dirty="0">
+                        <a:latin typeface="Segoe UI Light" panose="020B0502040204020203" pitchFamily="34" charset="0"/>
+                        <a:cs typeface="Segoe UI Light" panose="020B0502040204020203" pitchFamily="34" charset="0"/>
+                      </a:endParaRPr>
+                    </a:p>
+                  </a:txBody>
+                  <a:tcPr>
+                    <a:solidFill>
+                      <a:srgbClr val="FFFFFF"/>
+                    </a:solidFill>
+                  </a:tcPr>
+                </a:tc>
+                <a:tc>
+                  <a:txBody>
+                    <a:bodyPr/>
+                    <a:lstStyle/>
+                    <a:p>
+                      <a:pPr algn="r"/>
+                      <a:r>
+                        <a:rPr lang="en-US" dirty="0" smtClean="0">
+                          <a:latin typeface="Segoe UI Light" panose="020B0502040204020203" pitchFamily="34" charset="0"/>
+                          <a:cs typeface="Segoe UI Light" panose="020B0502040204020203" pitchFamily="34" charset="0"/>
+                        </a:rPr>
+                        <a:t>10,0</a:t>
+                      </a:r>
+                      <a:endParaRPr lang="en-US" dirty="0">
+                        <a:latin typeface="Segoe UI Light" panose="020B0502040204020203" pitchFamily="34" charset="0"/>
+                        <a:cs typeface="Segoe UI Light" panose="020B0502040204020203" pitchFamily="34" charset="0"/>
+                      </a:endParaRPr>
+                    </a:p>
+                  </a:txBody>
+                  <a:tcPr>
+                    <a:solidFill>
+                      <a:srgbClr val="FFFFFF"/>
+                    </a:solidFill>
+                  </a:tcPr>
+                </a:tc>
+                <a:tc>
+                  <a:txBody>
+                    <a:bodyPr/>
+                    <a:lstStyle/>
+                    <a:p>
+                      <a:pPr algn="r"/>
+                      <a:r>
+                        <a:rPr lang="en-US" dirty="0" smtClean="0">
+                          <a:latin typeface="Segoe UI Light" panose="020B0502040204020203" pitchFamily="34" charset="0"/>
+                          <a:cs typeface="Segoe UI Light" panose="020B0502040204020203" pitchFamily="34" charset="0"/>
+                        </a:rPr>
+                        <a:t>12,1</a:t>
+                      </a:r>
+                      <a:endParaRPr lang="en-US" dirty="0">
+                        <a:latin typeface="Segoe UI Light" panose="020B0502040204020203" pitchFamily="34" charset="0"/>
+                        <a:cs typeface="Segoe UI Light" panose="020B0502040204020203" pitchFamily="34" charset="0"/>
+                      </a:endParaRPr>
+                    </a:p>
+                  </a:txBody>
+                  <a:tcPr>
+                    <a:solidFill>
+                      <a:srgbClr val="FFFFFF"/>
+                    </a:solidFill>
+                  </a:tcPr>
+                </a:tc>
+                <a:extLst>
+                  <a:ext uri="{0D108BD9-81ED-4DB2-BD59-A6C34878D82A}">
+                    <a16:rowId xmlns:a16="http://schemas.microsoft.com/office/drawing/2014/main" val="2606769965"/>
+                  </a:ext>
+                </a:extLst>
+              </a:tr>
+              <a:tr h="473748">
+                <a:tc>
+                  <a:txBody>
+                    <a:bodyPr/>
+                    <a:lstStyle/>
+                    <a:p>
+                      <a:r>
+                        <a:rPr lang="en-US" dirty="0" smtClean="0">
+                          <a:latin typeface="Segoe UI Light" panose="020B0502040204020203" pitchFamily="34" charset="0"/>
+                          <a:cs typeface="Segoe UI Light" panose="020B0502040204020203" pitchFamily="34" charset="0"/>
+                        </a:rPr>
+                        <a:t>Italy</a:t>
+                      </a:r>
+                      <a:endParaRPr lang="en-US" dirty="0">
+                        <a:latin typeface="Segoe UI Light" panose="020B0502040204020203" pitchFamily="34" charset="0"/>
+                        <a:cs typeface="Segoe UI Light" panose="020B0502040204020203" pitchFamily="34" charset="0"/>
+                      </a:endParaRPr>
+                    </a:p>
+                  </a:txBody>
+                  <a:tcPr>
+                    <a:solidFill>
+                      <a:srgbClr val="FFFFFF"/>
+                    </a:solidFill>
+                  </a:tcPr>
+                </a:tc>
+                <a:tc>
+                  <a:txBody>
+                    <a:bodyPr/>
+                    <a:lstStyle/>
+                    <a:p>
+                      <a:pPr algn="r"/>
+                      <a:r>
+                        <a:rPr lang="en-US" dirty="0" smtClean="0">
+                          <a:latin typeface="Segoe UI Light" panose="020B0502040204020203" pitchFamily="34" charset="0"/>
+                          <a:cs typeface="Segoe UI Light" panose="020B0502040204020203" pitchFamily="34" charset="0"/>
+                        </a:rPr>
+                        <a:t>8,0</a:t>
+                      </a:r>
+                      <a:endParaRPr lang="en-US" dirty="0">
+                        <a:latin typeface="Segoe UI Light" panose="020B0502040204020203" pitchFamily="34" charset="0"/>
+                        <a:cs typeface="Segoe UI Light" panose="020B0502040204020203" pitchFamily="34" charset="0"/>
+                      </a:endParaRPr>
+                    </a:p>
+                  </a:txBody>
+                  <a:tcPr>
+                    <a:solidFill>
+                      <a:srgbClr val="FFFFFF"/>
+                    </a:solidFill>
+                  </a:tcPr>
+                </a:tc>
+                <a:tc>
+                  <a:txBody>
+                    <a:bodyPr/>
+                    <a:lstStyle/>
+                    <a:p>
+                      <a:pPr algn="r"/>
+                      <a:r>
+                        <a:rPr lang="en-US" dirty="0" smtClean="0">
+                          <a:latin typeface="Segoe UI Light" panose="020B0502040204020203" pitchFamily="34" charset="0"/>
+                          <a:cs typeface="Segoe UI Light" panose="020B0502040204020203" pitchFamily="34" charset="0"/>
+                        </a:rPr>
+                        <a:t>10,0</a:t>
+                      </a:r>
+                      <a:endParaRPr lang="en-US" dirty="0">
+                        <a:latin typeface="Segoe UI Light" panose="020B0502040204020203" pitchFamily="34" charset="0"/>
+                        <a:cs typeface="Segoe UI Light" panose="020B0502040204020203" pitchFamily="34" charset="0"/>
+                      </a:endParaRPr>
+                    </a:p>
+                  </a:txBody>
+                  <a:tcPr>
+                    <a:solidFill>
+                      <a:srgbClr val="FFFFFF"/>
+                    </a:solidFill>
+                  </a:tcPr>
+                </a:tc>
+                <a:tc>
+                  <a:txBody>
+                    <a:bodyPr/>
+                    <a:lstStyle/>
+                    <a:p>
+                      <a:pPr algn="r"/>
+                      <a:r>
+                        <a:rPr lang="en-US" dirty="0" smtClean="0">
+                          <a:latin typeface="Segoe UI Light" panose="020B0502040204020203" pitchFamily="34" charset="0"/>
+                          <a:cs typeface="Segoe UI Light" panose="020B0502040204020203" pitchFamily="34" charset="0"/>
+                        </a:rPr>
+                        <a:t>12,2</a:t>
+                      </a:r>
+                      <a:endParaRPr lang="en-US" dirty="0">
+                        <a:latin typeface="Segoe UI Light" panose="020B0502040204020203" pitchFamily="34" charset="0"/>
+                        <a:cs typeface="Segoe UI Light" panose="020B0502040204020203" pitchFamily="34" charset="0"/>
+                      </a:endParaRPr>
+                    </a:p>
+                  </a:txBody>
+                  <a:tcPr>
+                    <a:solidFill>
+                      <a:srgbClr val="FFFFFF"/>
+                    </a:solidFill>
+                  </a:tcPr>
+                </a:tc>
+                <a:extLst>
+                  <a:ext uri="{0D108BD9-81ED-4DB2-BD59-A6C34878D82A}">
+                    <a16:rowId xmlns:a16="http://schemas.microsoft.com/office/drawing/2014/main" val="1231514386"/>
+                  </a:ext>
+                </a:extLst>
+              </a:tr>
+              <a:tr h="473748">
+                <a:tc>
+                  <a:txBody>
+                    <a:bodyPr/>
+                    <a:lstStyle/>
+                    <a:p>
+                      <a:r>
+                        <a:rPr lang="en-US" dirty="0" smtClean="0">
+                          <a:latin typeface="Segoe UI Light" panose="020B0502040204020203" pitchFamily="34" charset="0"/>
+                          <a:cs typeface="Segoe UI Light" panose="020B0502040204020203" pitchFamily="34" charset="0"/>
+                        </a:rPr>
+                        <a:t>Spain</a:t>
+                      </a:r>
+                      <a:endParaRPr lang="en-US" dirty="0">
+                        <a:latin typeface="Segoe UI Light" panose="020B0502040204020203" pitchFamily="34" charset="0"/>
+                        <a:cs typeface="Segoe UI Light" panose="020B0502040204020203" pitchFamily="34" charset="0"/>
+                      </a:endParaRPr>
+                    </a:p>
+                  </a:txBody>
+                  <a:tcPr>
+                    <a:solidFill>
+                      <a:srgbClr val="FFFFFF"/>
+                    </a:solidFill>
+                  </a:tcPr>
+                </a:tc>
+                <a:tc>
+                  <a:txBody>
+                    <a:bodyPr/>
+                    <a:lstStyle/>
+                    <a:p>
+                      <a:pPr algn="r"/>
+                      <a:r>
+                        <a:rPr lang="en-US" dirty="0" smtClean="0">
+                          <a:latin typeface="Segoe UI Light" panose="020B0502040204020203" pitchFamily="34" charset="0"/>
+                          <a:cs typeface="Segoe UI Light" panose="020B0502040204020203" pitchFamily="34" charset="0"/>
+                        </a:rPr>
+                        <a:t>7,8</a:t>
+                      </a:r>
+                      <a:endParaRPr lang="en-US" dirty="0">
+                        <a:latin typeface="Segoe UI Light" panose="020B0502040204020203" pitchFamily="34" charset="0"/>
+                        <a:cs typeface="Segoe UI Light" panose="020B0502040204020203" pitchFamily="34" charset="0"/>
+                      </a:endParaRPr>
+                    </a:p>
+                  </a:txBody>
+                  <a:tcPr>
+                    <a:solidFill>
+                      <a:srgbClr val="FFFFFF"/>
+                    </a:solidFill>
+                  </a:tcPr>
+                </a:tc>
+                <a:tc>
+                  <a:txBody>
+                    <a:bodyPr/>
+                    <a:lstStyle/>
+                    <a:p>
+                      <a:pPr algn="r"/>
+                      <a:r>
+                        <a:rPr lang="en-US" dirty="0" smtClean="0">
+                          <a:latin typeface="Segoe UI Light" panose="020B0502040204020203" pitchFamily="34" charset="0"/>
+                          <a:cs typeface="Segoe UI Light" panose="020B0502040204020203" pitchFamily="34" charset="0"/>
+                        </a:rPr>
+                        <a:t>9,9</a:t>
+                      </a:r>
+                      <a:endParaRPr lang="en-US" dirty="0">
+                        <a:latin typeface="Segoe UI Light" panose="020B0502040204020203" pitchFamily="34" charset="0"/>
+                        <a:cs typeface="Segoe UI Light" panose="020B0502040204020203" pitchFamily="34" charset="0"/>
+                      </a:endParaRPr>
+                    </a:p>
+                  </a:txBody>
+                  <a:tcPr>
+                    <a:solidFill>
+                      <a:srgbClr val="FFFFFF"/>
+                    </a:solidFill>
+                  </a:tcPr>
+                </a:tc>
+                <a:tc>
+                  <a:txBody>
+                    <a:bodyPr/>
+                    <a:lstStyle/>
+                    <a:p>
+                      <a:pPr algn="r"/>
+                      <a:r>
+                        <a:rPr lang="en-US" dirty="0" smtClean="0">
+                          <a:latin typeface="Segoe UI Light" panose="020B0502040204020203" pitchFamily="34" charset="0"/>
+                          <a:cs typeface="Segoe UI Light" panose="020B0502040204020203" pitchFamily="34" charset="0"/>
+                        </a:rPr>
+                        <a:t>12,0</a:t>
+                      </a:r>
+                      <a:endParaRPr lang="en-US" dirty="0">
+                        <a:latin typeface="Segoe UI Light" panose="020B0502040204020203" pitchFamily="34" charset="0"/>
+                        <a:cs typeface="Segoe UI Light" panose="020B0502040204020203" pitchFamily="34" charset="0"/>
+                      </a:endParaRPr>
+                    </a:p>
+                  </a:txBody>
+                  <a:tcPr>
+                    <a:solidFill>
+                      <a:srgbClr val="FFFFFF"/>
+                    </a:solidFill>
+                  </a:tcPr>
+                </a:tc>
+                <a:extLst>
+                  <a:ext uri="{0D108BD9-81ED-4DB2-BD59-A6C34878D82A}">
+                    <a16:rowId xmlns:a16="http://schemas.microsoft.com/office/drawing/2014/main" val="489090368"/>
+                  </a:ext>
+                </a:extLst>
+              </a:tr>
+              <a:tr h="473748">
+                <a:tc>
+                  <a:txBody>
+                    <a:bodyPr/>
+                    <a:lstStyle/>
+                    <a:p>
+                      <a:r>
+                        <a:rPr lang="en-US" b="0" dirty="0" smtClean="0">
+                          <a:latin typeface="Segoe UI Light" panose="020B0502040204020203" pitchFamily="34" charset="0"/>
+                          <a:cs typeface="Segoe UI Light" panose="020B0502040204020203" pitchFamily="34" charset="0"/>
+                        </a:rPr>
+                        <a:t>Average</a:t>
+                      </a:r>
+                      <a:endParaRPr lang="en-US" b="0" dirty="0">
+                        <a:latin typeface="Segoe UI Light" panose="020B0502040204020203" pitchFamily="34" charset="0"/>
+                        <a:cs typeface="Segoe UI Light" panose="020B0502040204020203" pitchFamily="34" charset="0"/>
+                      </a:endParaRPr>
+                    </a:p>
+                  </a:txBody>
+                  <a:tcPr>
+                    <a:solidFill>
+                      <a:srgbClr val="86A3B8"/>
+                    </a:solidFill>
+                  </a:tcPr>
+                </a:tc>
+                <a:tc>
+                  <a:txBody>
+                    <a:bodyPr/>
+                    <a:lstStyle/>
+                    <a:p>
+                      <a:pPr algn="r"/>
+                      <a:r>
+                        <a:rPr lang="en-US" dirty="0" smtClean="0">
+                          <a:latin typeface="Segoe UI Light" panose="020B0502040204020203" pitchFamily="34" charset="0"/>
+                          <a:cs typeface="Segoe UI Light" panose="020B0502040204020203" pitchFamily="34" charset="0"/>
+                        </a:rPr>
+                        <a:t>7,9</a:t>
+                      </a:r>
+                      <a:endParaRPr lang="en-US" dirty="0">
+                        <a:latin typeface="Segoe UI Light" panose="020B0502040204020203" pitchFamily="34" charset="0"/>
+                        <a:cs typeface="Segoe UI Light" panose="020B0502040204020203" pitchFamily="34" charset="0"/>
+                      </a:endParaRPr>
+                    </a:p>
+                  </a:txBody>
+                  <a:tcPr>
+                    <a:solidFill>
+                      <a:srgbClr val="86A3B8"/>
+                    </a:solidFill>
+                  </a:tcPr>
+                </a:tc>
+                <a:tc>
+                  <a:txBody>
+                    <a:bodyPr/>
+                    <a:lstStyle/>
+                    <a:p>
+                      <a:pPr algn="r"/>
+                      <a:r>
+                        <a:rPr lang="en-US" dirty="0" smtClean="0">
+                          <a:latin typeface="Segoe UI Light" panose="020B0502040204020203" pitchFamily="34" charset="0"/>
+                          <a:cs typeface="Segoe UI Light" panose="020B0502040204020203" pitchFamily="34" charset="0"/>
+                        </a:rPr>
+                        <a:t>10,0</a:t>
+                      </a:r>
+                      <a:endParaRPr lang="en-US" dirty="0">
+                        <a:latin typeface="Segoe UI Light" panose="020B0502040204020203" pitchFamily="34" charset="0"/>
+                        <a:cs typeface="Segoe UI Light" panose="020B0502040204020203" pitchFamily="34" charset="0"/>
+                      </a:endParaRPr>
+                    </a:p>
+                  </a:txBody>
+                  <a:tcPr>
+                    <a:solidFill>
+                      <a:srgbClr val="86A3B8"/>
+                    </a:solidFill>
+                  </a:tcPr>
+                </a:tc>
+                <a:tc>
+                  <a:txBody>
+                    <a:bodyPr/>
+                    <a:lstStyle/>
+                    <a:p>
+                      <a:pPr algn="r"/>
+                      <a:r>
+                        <a:rPr lang="en-US" dirty="0" smtClean="0">
+                          <a:latin typeface="Segoe UI Light" panose="020B0502040204020203" pitchFamily="34" charset="0"/>
+                          <a:cs typeface="Segoe UI Light" panose="020B0502040204020203" pitchFamily="34" charset="0"/>
+                        </a:rPr>
+                        <a:t>12,2</a:t>
+                      </a:r>
+                      <a:endParaRPr lang="en-US" dirty="0">
+                        <a:latin typeface="Segoe UI Light" panose="020B0502040204020203" pitchFamily="34" charset="0"/>
+                        <a:cs typeface="Segoe UI Light" panose="020B0502040204020203" pitchFamily="34" charset="0"/>
+                      </a:endParaRPr>
+                    </a:p>
+                  </a:txBody>
+                  <a:tcPr>
+                    <a:solidFill>
+                      <a:srgbClr val="86A3B8"/>
+                    </a:solidFill>
+                  </a:tcPr>
+                </a:tc>
+                <a:extLst>
+                  <a:ext uri="{0D108BD9-81ED-4DB2-BD59-A6C34878D82A}">
+                    <a16:rowId xmlns:a16="http://schemas.microsoft.com/office/drawing/2014/main" val="487439084"/>
+                  </a:ext>
+                </a:extLst>
+              </a:tr>
+            </a:tbl>
+          </a:graphicData>
+        </a:graphic>
+      </p:graphicFrame>
+      <p:pic>
+        <p:nvPicPr>
+          <p:cNvPr id="9" name="Grafik 8"/>
+          <p:cNvPicPr>
+            <a:picLocks noChangeAspect="1"/>
+          </p:cNvPicPr>
+          <p:nvPr/>
+        </p:nvPicPr>
+        <p:blipFill>
+          <a:blip r:embed="rId3"/>
+          <a:stretch>
+            <a:fillRect/>
+          </a:stretch>
+        </p:blipFill>
+        <p:spPr>
+          <a:xfrm>
+            <a:off x="8061000" y="1171035"/>
+            <a:ext cx="3659311" cy="2291161"/>
+          </a:xfrm>
+          <a:prstGeom prst="rect">
+            <a:avLst/>
+          </a:prstGeom>
+        </p:spPr>
+      </p:pic>
+      <p:sp>
+        <p:nvSpPr>
+          <p:cNvPr id="21" name="Fußzeilenplatzhalter 8"/>
+          <p:cNvSpPr txBox="1">
+            <a:spLocks/>
           </p:cNvSpPr>
-          <p:nvPr>
-            <p:ph type="ftr" sz="quarter" idx="3"/>
-          </p:nvPr>
-        </p:nvSpPr>
-        <p:spPr/>
-        <p:txBody>
-          <a:bodyPr/>
-          <a:lstStyle/>
+          <p:nvPr/>
+        </p:nvSpPr>
+        <p:spPr>
+          <a:xfrm>
+            <a:off x="4647827" y="1643765"/>
+            <a:ext cx="3413173" cy="246221"/>
+          </a:xfrm>
+          <a:prstGeom prst="rect">
+            <a:avLst/>
+          </a:prstGeom>
+        </p:spPr>
+        <p:txBody>
+          <a:bodyPr vert="horz" lIns="91440" tIns="45720" rIns="91440" bIns="45720" rtlCol="0" anchor="b" anchorCtr="0">
+            <a:noAutofit/>
+          </a:bodyPr>
+          <a:lstStyle>
+            <a:defPPr>
+              <a:defRPr lang="en-US"/>
+            </a:defPPr>
+            <a:lvl1pPr marL="0" algn="r" defTabSz="914400" rtl="0" eaLnBrk="1" latinLnBrk="0" hangingPunct="1">
+              <a:defRPr sz="1000" kern="1200">
+                <a:solidFill>
+                  <a:schemeClr val="tx1">
+                    <a:tint val="75000"/>
+                  </a:schemeClr>
+                </a:solidFill>
+                <a:latin typeface="Tahoma" panose="020B0604030504040204" pitchFamily="34" charset="0"/>
+                <a:ea typeface="Tahoma" panose="020B0604030504040204" pitchFamily="34" charset="0"/>
+                <a:cs typeface="Tahoma" panose="020B0604030504040204" pitchFamily="34" charset="0"/>
+              </a:defRPr>
+            </a:lvl1pPr>
+            <a:lvl2pPr marL="457200" algn="l" defTabSz="914400" rtl="0" eaLnBrk="1" latinLnBrk="0" hangingPunct="1">
+              <a:defRPr sz="1800" kern="1200">
+                <a:solidFill>
+                  <a:schemeClr val="tx1"/>
+                </a:solidFill>
+                <a:latin typeface="+mn-lt"/>
+                <a:ea typeface="+mn-ea"/>
+                <a:cs typeface="+mn-cs"/>
+              </a:defRPr>
+            </a:lvl2pPr>
+            <a:lvl3pPr marL="914400" algn="l" defTabSz="914400" rtl="0" eaLnBrk="1" latinLnBrk="0" hangingPunct="1">
+              <a:defRPr sz="1800" kern="1200">
+                <a:solidFill>
+                  <a:schemeClr val="tx1"/>
+                </a:solidFill>
+                <a:latin typeface="+mn-lt"/>
+                <a:ea typeface="+mn-ea"/>
+                <a:cs typeface="+mn-cs"/>
+              </a:defRPr>
+            </a:lvl3pPr>
+            <a:lvl4pPr marL="1371600" algn="l" defTabSz="914400" rtl="0" eaLnBrk="1" latinLnBrk="0" hangingPunct="1">
+              <a:defRPr sz="1800" kern="1200">
+                <a:solidFill>
+                  <a:schemeClr val="tx1"/>
+                </a:solidFill>
+                <a:latin typeface="+mn-lt"/>
+                <a:ea typeface="+mn-ea"/>
+                <a:cs typeface="+mn-cs"/>
+              </a:defRPr>
+            </a:lvl4pPr>
+            <a:lvl5pPr marL="1828800" algn="l" defTabSz="914400" rtl="0" eaLnBrk="1" latinLnBrk="0" hangingPunct="1">
+              <a:defRPr sz="1800" kern="1200">
+                <a:solidFill>
+                  <a:schemeClr val="tx1"/>
+                </a:solidFill>
+                <a:latin typeface="+mn-lt"/>
+                <a:ea typeface="+mn-ea"/>
+                <a:cs typeface="+mn-cs"/>
+              </a:defRPr>
+            </a:lvl5pPr>
+            <a:lvl6pPr marL="2286000" algn="l" defTabSz="914400" rtl="0" eaLnBrk="1" latinLnBrk="0" hangingPunct="1">
+              <a:defRPr sz="1800" kern="1200">
+                <a:solidFill>
+                  <a:schemeClr val="tx1"/>
+                </a:solidFill>
+                <a:latin typeface="+mn-lt"/>
+                <a:ea typeface="+mn-ea"/>
+                <a:cs typeface="+mn-cs"/>
+              </a:defRPr>
+            </a:lvl6pPr>
+            <a:lvl7pPr marL="2743200" algn="l" defTabSz="914400" rtl="0" eaLnBrk="1" latinLnBrk="0" hangingPunct="1">
+              <a:defRPr sz="1800" kern="1200">
+                <a:solidFill>
+                  <a:schemeClr val="tx1"/>
+                </a:solidFill>
+                <a:latin typeface="+mn-lt"/>
+                <a:ea typeface="+mn-ea"/>
+                <a:cs typeface="+mn-cs"/>
+              </a:defRPr>
+            </a:lvl7pPr>
+            <a:lvl8pPr marL="3200400" algn="l" defTabSz="914400" rtl="0" eaLnBrk="1" latinLnBrk="0" hangingPunct="1">
+              <a:defRPr sz="1800" kern="1200">
+                <a:solidFill>
+                  <a:schemeClr val="tx1"/>
+                </a:solidFill>
+                <a:latin typeface="+mn-lt"/>
+                <a:ea typeface="+mn-ea"/>
+                <a:cs typeface="+mn-cs"/>
+              </a:defRPr>
+            </a:lvl8pPr>
+            <a:lvl9pPr marL="3657600" algn="l" defTabSz="914400" rtl="0" eaLnBrk="1" latinLnBrk="0" hangingPunct="1">
+              <a:defRPr sz="1800" kern="1200">
+                <a:solidFill>
+                  <a:schemeClr val="tx1"/>
+                </a:solidFill>
+                <a:latin typeface="+mn-lt"/>
+                <a:ea typeface="+mn-ea"/>
+                <a:cs typeface="+mn-cs"/>
+              </a:defRPr>
+            </a:lvl9pPr>
+          </a:lstStyle>
           <a:p>
             <a:pPr algn="ctr"/>
             <a:r>
-              <a:rPr lang="en-US" dirty="0" smtClean="0"/>
-              <a:t>Results (6/6)</a:t>
-            </a:r>
-            <a:endParaRPr lang="en-GB" dirty="0"/>
+              <a:rPr lang="en-US" dirty="0" smtClean="0">
+                <a:solidFill>
+                  <a:schemeClr val="bg1">
+                    <a:lumMod val="50000"/>
+                  </a:schemeClr>
+                </a:solidFill>
+              </a:rPr>
+              <a:t>8,38 and 5.97 $ per </a:t>
+            </a:r>
+            <a:r>
+              <a:rPr lang="en-US" dirty="0" err="1" smtClean="0">
+                <a:solidFill>
+                  <a:schemeClr val="bg1">
+                    <a:lumMod val="50000"/>
+                  </a:schemeClr>
+                </a:solidFill>
+              </a:rPr>
+              <a:t>mmBTU</a:t>
+            </a:r>
+            <a:r>
+              <a:rPr lang="en-US" dirty="0" smtClean="0">
+                <a:solidFill>
+                  <a:schemeClr val="bg1">
+                    <a:lumMod val="50000"/>
+                  </a:schemeClr>
+                </a:solidFill>
+              </a:rPr>
+              <a:t> </a:t>
+            </a:r>
+            <a:r>
+              <a:rPr lang="en-US" dirty="0" smtClean="0">
+                <a:solidFill>
+                  <a:schemeClr val="bg1">
+                    <a:lumMod val="50000"/>
+                  </a:schemeClr>
+                </a:solidFill>
+              </a:rPr>
+              <a:t>in Q4 2018 and Q1 2019</a:t>
+            </a:r>
+            <a:endParaRPr lang="en-GB" dirty="0">
+              <a:solidFill>
+                <a:schemeClr val="bg1">
+                  <a:lumMod val="50000"/>
+                </a:schemeClr>
+              </a:solidFill>
+            </a:endParaRPr>
+          </a:p>
+        </p:txBody>
+      </p:sp>
+      <p:sp>
+        <p:nvSpPr>
+          <p:cNvPr id="22" name="Fußzeilenplatzhalter 8"/>
+          <p:cNvSpPr txBox="1">
+            <a:spLocks/>
+          </p:cNvSpPr>
+          <p:nvPr/>
+        </p:nvSpPr>
+        <p:spPr>
+          <a:xfrm>
+            <a:off x="8521214" y="3669281"/>
+            <a:ext cx="2935626" cy="246221"/>
+          </a:xfrm>
+          <a:prstGeom prst="rect">
+            <a:avLst/>
+          </a:prstGeom>
+        </p:spPr>
+        <p:txBody>
+          <a:bodyPr vert="horz" lIns="91440" tIns="45720" rIns="91440" bIns="45720" rtlCol="0" anchor="b" anchorCtr="0">
+            <a:noAutofit/>
+          </a:bodyPr>
+          <a:lstStyle>
+            <a:defPPr>
+              <a:defRPr lang="en-US"/>
+            </a:defPPr>
+            <a:lvl1pPr marL="0" algn="r" defTabSz="914400" rtl="0" eaLnBrk="1" latinLnBrk="0" hangingPunct="1">
+              <a:defRPr sz="1000" kern="1200">
+                <a:solidFill>
+                  <a:schemeClr val="tx1">
+                    <a:tint val="75000"/>
+                  </a:schemeClr>
+                </a:solidFill>
+                <a:latin typeface="Tahoma" panose="020B0604030504040204" pitchFamily="34" charset="0"/>
+                <a:ea typeface="Tahoma" panose="020B0604030504040204" pitchFamily="34" charset="0"/>
+                <a:cs typeface="Tahoma" panose="020B0604030504040204" pitchFamily="34" charset="0"/>
+              </a:defRPr>
+            </a:lvl1pPr>
+            <a:lvl2pPr marL="457200" algn="l" defTabSz="914400" rtl="0" eaLnBrk="1" latinLnBrk="0" hangingPunct="1">
+              <a:defRPr sz="1800" kern="1200">
+                <a:solidFill>
+                  <a:schemeClr val="tx1"/>
+                </a:solidFill>
+                <a:latin typeface="+mn-lt"/>
+                <a:ea typeface="+mn-ea"/>
+                <a:cs typeface="+mn-cs"/>
+              </a:defRPr>
+            </a:lvl2pPr>
+            <a:lvl3pPr marL="914400" algn="l" defTabSz="914400" rtl="0" eaLnBrk="1" latinLnBrk="0" hangingPunct="1">
+              <a:defRPr sz="1800" kern="1200">
+                <a:solidFill>
+                  <a:schemeClr val="tx1"/>
+                </a:solidFill>
+                <a:latin typeface="+mn-lt"/>
+                <a:ea typeface="+mn-ea"/>
+                <a:cs typeface="+mn-cs"/>
+              </a:defRPr>
+            </a:lvl3pPr>
+            <a:lvl4pPr marL="1371600" algn="l" defTabSz="914400" rtl="0" eaLnBrk="1" latinLnBrk="0" hangingPunct="1">
+              <a:defRPr sz="1800" kern="1200">
+                <a:solidFill>
+                  <a:schemeClr val="tx1"/>
+                </a:solidFill>
+                <a:latin typeface="+mn-lt"/>
+                <a:ea typeface="+mn-ea"/>
+                <a:cs typeface="+mn-cs"/>
+              </a:defRPr>
+            </a:lvl4pPr>
+            <a:lvl5pPr marL="1828800" algn="l" defTabSz="914400" rtl="0" eaLnBrk="1" latinLnBrk="0" hangingPunct="1">
+              <a:defRPr sz="1800" kern="1200">
+                <a:solidFill>
+                  <a:schemeClr val="tx1"/>
+                </a:solidFill>
+                <a:latin typeface="+mn-lt"/>
+                <a:ea typeface="+mn-ea"/>
+                <a:cs typeface="+mn-cs"/>
+              </a:defRPr>
+            </a:lvl5pPr>
+            <a:lvl6pPr marL="2286000" algn="l" defTabSz="914400" rtl="0" eaLnBrk="1" latinLnBrk="0" hangingPunct="1">
+              <a:defRPr sz="1800" kern="1200">
+                <a:solidFill>
+                  <a:schemeClr val="tx1"/>
+                </a:solidFill>
+                <a:latin typeface="+mn-lt"/>
+                <a:ea typeface="+mn-ea"/>
+                <a:cs typeface="+mn-cs"/>
+              </a:defRPr>
+            </a:lvl6pPr>
+            <a:lvl7pPr marL="2743200" algn="l" defTabSz="914400" rtl="0" eaLnBrk="1" latinLnBrk="0" hangingPunct="1">
+              <a:defRPr sz="1800" kern="1200">
+                <a:solidFill>
+                  <a:schemeClr val="tx1"/>
+                </a:solidFill>
+                <a:latin typeface="+mn-lt"/>
+                <a:ea typeface="+mn-ea"/>
+                <a:cs typeface="+mn-cs"/>
+              </a:defRPr>
+            </a:lvl7pPr>
+            <a:lvl8pPr marL="3200400" algn="l" defTabSz="914400" rtl="0" eaLnBrk="1" latinLnBrk="0" hangingPunct="1">
+              <a:defRPr sz="1800" kern="1200">
+                <a:solidFill>
+                  <a:schemeClr val="tx1"/>
+                </a:solidFill>
+                <a:latin typeface="+mn-lt"/>
+                <a:ea typeface="+mn-ea"/>
+                <a:cs typeface="+mn-cs"/>
+              </a:defRPr>
+            </a:lvl8pPr>
+            <a:lvl9pPr marL="3657600" algn="l" defTabSz="914400" rtl="0" eaLnBrk="1" latinLnBrk="0" hangingPunct="1">
+              <a:defRPr sz="1800" kern="1200">
+                <a:solidFill>
+                  <a:schemeClr val="tx1"/>
+                </a:solidFill>
+                <a:latin typeface="+mn-lt"/>
+                <a:ea typeface="+mn-ea"/>
+                <a:cs typeface="+mn-cs"/>
+              </a:defRPr>
+            </a:lvl9pPr>
+          </a:lstStyle>
+          <a:p>
+            <a:pPr algn="ctr"/>
+            <a:r>
+              <a:rPr lang="en-US" dirty="0" smtClean="0">
+                <a:solidFill>
+                  <a:schemeClr val="bg1">
+                    <a:lumMod val="50000"/>
+                  </a:schemeClr>
+                </a:solidFill>
+              </a:rPr>
+              <a:t>Fig: </a:t>
+            </a:r>
+            <a:r>
+              <a:rPr lang="en-US" dirty="0" smtClean="0">
+                <a:solidFill>
+                  <a:schemeClr val="bg1">
+                    <a:lumMod val="50000"/>
+                  </a:schemeClr>
+                </a:solidFill>
+              </a:rPr>
+              <a:t>Quarterly prices of LNG from 2012 to 2019.</a:t>
+            </a:r>
+            <a:br>
+              <a:rPr lang="en-US" dirty="0" smtClean="0">
+                <a:solidFill>
+                  <a:schemeClr val="bg1">
+                    <a:lumMod val="50000"/>
+                  </a:schemeClr>
+                </a:solidFill>
+              </a:rPr>
+            </a:br>
+            <a:r>
+              <a:rPr lang="en-US" sz="800" dirty="0" smtClean="0">
+                <a:solidFill>
+                  <a:schemeClr val="bg1">
+                    <a:lumMod val="50000"/>
+                  </a:schemeClr>
+                </a:solidFill>
+              </a:rPr>
+              <a:t>Source: Statista</a:t>
+            </a:r>
+            <a:endParaRPr lang="en-GB" sz="800" dirty="0">
+              <a:solidFill>
+                <a:schemeClr val="bg1">
+                  <a:lumMod val="50000"/>
+                </a:schemeClr>
+              </a:solidFill>
+            </a:endParaRPr>
+          </a:p>
+        </p:txBody>
+      </p:sp>
+      <p:sp>
+        <p:nvSpPr>
+          <p:cNvPr id="23" name="TextBox 4">
+            <a:extLst>
+              <a:ext uri="{FF2B5EF4-FFF2-40B4-BE49-F238E27FC236}">
+                <a16:creationId xmlns:a16="http://schemas.microsoft.com/office/drawing/2014/main" id="{5CEB32EF-ED71-4BE6-A144-799910B73E69}"/>
+              </a:ext>
+            </a:extLst>
+          </p:cNvPr>
+          <p:cNvSpPr txBox="1"/>
+          <p:nvPr/>
+        </p:nvSpPr>
+        <p:spPr>
+          <a:xfrm>
+            <a:off x="8366879" y="5134218"/>
+            <a:ext cx="3244296" cy="714697"/>
+          </a:xfrm>
+          <a:prstGeom prst="wedgeRectCallout">
+            <a:avLst>
+              <a:gd name="adj1" fmla="val -90156"/>
+              <a:gd name="adj2" fmla="val -11810"/>
+            </a:avLst>
+          </a:prstGeom>
+          <a:solidFill>
+            <a:sysClr val="window" lastClr="FFFFFF"/>
+          </a:solidFill>
+          <a:ln w="6350" cap="flat" cmpd="sng" algn="ctr">
+            <a:solidFill>
+              <a:schemeClr val="bg1">
+                <a:lumMod val="50000"/>
+              </a:schemeClr>
+            </a:solidFill>
+            <a:prstDash val="solid"/>
+            <a:miter lim="800000"/>
+          </a:ln>
+          <a:effectLst/>
+        </p:spPr>
+        <p:txBody>
+          <a:bodyPr lIns="36000" tIns="36000" rIns="36000" bIns="36000" rtlCol="0" anchor="ctr"/>
+          <a:lstStyle>
+            <a:defPPr>
+              <a:defRPr lang="en-US"/>
+            </a:defPPr>
+            <a:lvl1pPr indent="-457200" algn="ctr">
+              <a:spcAft>
+                <a:spcPts val="200"/>
+              </a:spcAft>
+              <a:buSzPct val="100000"/>
+              <a:defRPr sz="1200">
+                <a:solidFill>
+                  <a:schemeClr val="tx1">
+                    <a:lumMod val="100000"/>
+                  </a:schemeClr>
+                </a:solidFill>
+                <a:latin typeface="Arial" panose="020B0604020202020204" pitchFamily="34" charset="0"/>
+              </a:defRPr>
+            </a:lvl1pPr>
+            <a:lvl2pPr marL="180000" lvl="1" indent="-180000" algn="ctr">
+              <a:spcAft>
+                <a:spcPts val="200"/>
+              </a:spcAft>
+              <a:buClr>
+                <a:schemeClr val="bg2">
+                  <a:lumMod val="100000"/>
+                </a:schemeClr>
+              </a:buClr>
+              <a:buSzPct val="100000"/>
+              <a:buFont typeface="Wingdings 2" panose="05020102010507070707" pitchFamily="18" charset="2"/>
+              <a:buChar char=""/>
+              <a:defRPr sz="1200">
+                <a:solidFill>
+                  <a:schemeClr val="tx1">
+                    <a:lumMod val="100000"/>
+                  </a:schemeClr>
+                </a:solidFill>
+                <a:latin typeface="Arial" panose="020B0604020202020204" pitchFamily="34" charset="0"/>
+              </a:defRPr>
+            </a:lvl2pPr>
+            <a:lvl3pPr marL="360363" lvl="2" indent="-180000" algn="ctr">
+              <a:spcAft>
+                <a:spcPts val="200"/>
+              </a:spcAft>
+              <a:buClr>
+                <a:schemeClr val="bg2">
+                  <a:lumMod val="100000"/>
+                </a:schemeClr>
+              </a:buClr>
+              <a:buSzPct val="100000"/>
+              <a:buFont typeface="Wingdings" panose="05000000000000000000" pitchFamily="2" charset="2"/>
+              <a:buChar char=""/>
+              <a:defRPr sz="1200">
+                <a:solidFill>
+                  <a:schemeClr val="tx1">
+                    <a:lumMod val="100000"/>
+                  </a:schemeClr>
+                </a:solidFill>
+                <a:latin typeface="Arial" panose="020B0604020202020204" pitchFamily="34" charset="0"/>
+              </a:defRPr>
+            </a:lvl3pPr>
+            <a:lvl4pPr marL="540000" lvl="3" indent="-180000" algn="ctr">
+              <a:spcAft>
+                <a:spcPts val="200"/>
+              </a:spcAft>
+              <a:buClr>
+                <a:schemeClr val="bg2">
+                  <a:lumMod val="100000"/>
+                </a:schemeClr>
+              </a:buClr>
+              <a:buSzPct val="100000"/>
+              <a:buFont typeface="Arial" panose="020B0604020202020204" pitchFamily="34" charset="0"/>
+              <a:buChar char="–"/>
+              <a:defRPr sz="1200">
+                <a:solidFill>
+                  <a:schemeClr val="tx1">
+                    <a:lumMod val="100000"/>
+                  </a:schemeClr>
+                </a:solidFill>
+                <a:latin typeface="Arial" panose="020B0604020202020204" pitchFamily="34" charset="0"/>
+              </a:defRPr>
+            </a:lvl4pPr>
+            <a:lvl5pPr marL="720725" lvl="4" indent="-180000" algn="ctr">
+              <a:spcAft>
+                <a:spcPts val="200"/>
+              </a:spcAft>
+              <a:buClr>
+                <a:schemeClr val="bg2">
+                  <a:lumMod val="100000"/>
+                </a:schemeClr>
+              </a:buClr>
+              <a:buSzPct val="100000"/>
+              <a:buFont typeface="Arial" panose="020B0604020202020204" pitchFamily="34" charset="0"/>
+              <a:buChar char="●"/>
+              <a:defRPr sz="1200">
+                <a:solidFill>
+                  <a:schemeClr val="tx1">
+                    <a:lumMod val="100000"/>
+                  </a:schemeClr>
+                </a:solidFill>
+                <a:latin typeface="Arial" panose="020B0604020202020204" pitchFamily="34" charset="0"/>
+              </a:defRPr>
+            </a:lvl5pPr>
+            <a:lvl6pPr marL="900000" lvl="5" indent="-180000" algn="ctr">
+              <a:spcAft>
+                <a:spcPts val="200"/>
+              </a:spcAft>
+              <a:buClr>
+                <a:schemeClr val="bg2">
+                  <a:lumMod val="100000"/>
+                </a:schemeClr>
+              </a:buClr>
+              <a:buSzPct val="100000"/>
+              <a:buFont typeface="Courier New" panose="02070309020205020404" pitchFamily="49" charset="0"/>
+              <a:buChar char="o"/>
+              <a:defRPr sz="1200">
+                <a:solidFill>
+                  <a:schemeClr val="tx1">
+                    <a:lumMod val="100000"/>
+                  </a:schemeClr>
+                </a:solidFill>
+                <a:latin typeface="Arial" panose="020B0604020202020204" pitchFamily="34" charset="0"/>
+              </a:defRPr>
+            </a:lvl6pPr>
+            <a:lvl7pPr marL="900000" lvl="6" indent="-180975" algn="ctr">
+              <a:spcAft>
+                <a:spcPts val="200"/>
+              </a:spcAft>
+              <a:buClr>
+                <a:schemeClr val="bg2">
+                  <a:lumMod val="100000"/>
+                </a:schemeClr>
+              </a:buClr>
+              <a:buSzPct val="100000"/>
+              <a:buFont typeface="Courier New" panose="02070309020205020404" pitchFamily="49" charset="0"/>
+              <a:buChar char="o"/>
+              <a:defRPr sz="1200">
+                <a:solidFill>
+                  <a:schemeClr val="tx1">
+                    <a:lumMod val="100000"/>
+                  </a:schemeClr>
+                </a:solidFill>
+                <a:latin typeface="Arial" panose="020B0604020202020204" pitchFamily="34" charset="0"/>
+              </a:defRPr>
+            </a:lvl7pPr>
+            <a:lvl8pPr marL="900000" lvl="7" indent="-180975" algn="ctr">
+              <a:spcAft>
+                <a:spcPts val="200"/>
+              </a:spcAft>
+              <a:buClr>
+                <a:schemeClr val="bg2">
+                  <a:lumMod val="100000"/>
+                </a:schemeClr>
+              </a:buClr>
+              <a:buSzPct val="100000"/>
+              <a:buFont typeface="Courier New" panose="02070309020205020404" pitchFamily="49" charset="0"/>
+              <a:buChar char="o"/>
+              <a:defRPr sz="1200">
+                <a:solidFill>
+                  <a:schemeClr val="tx1">
+                    <a:lumMod val="100000"/>
+                  </a:schemeClr>
+                </a:solidFill>
+                <a:latin typeface="Arial" panose="020B0604020202020204" pitchFamily="34" charset="0"/>
+              </a:defRPr>
+            </a:lvl8pPr>
+            <a:lvl9pPr marL="900000" lvl="8" indent="-180975" algn="ctr">
+              <a:spcAft>
+                <a:spcPts val="200"/>
+              </a:spcAft>
+              <a:buClr>
+                <a:schemeClr val="bg2">
+                  <a:lumMod val="100000"/>
+                </a:schemeClr>
+              </a:buClr>
+              <a:buSzPct val="100000"/>
+              <a:buFont typeface="Courier New" panose="02070309020205020404" pitchFamily="49" charset="0"/>
+              <a:buChar char="o"/>
+              <a:defRPr sz="1200">
+                <a:solidFill>
+                  <a:schemeClr val="tx1">
+                    <a:lumMod val="100000"/>
+                  </a:schemeClr>
+                </a:solidFill>
+                <a:latin typeface="Arial" panose="020B0604020202020204" pitchFamily="34" charset="0"/>
+              </a:defRPr>
+            </a:lvl9pPr>
+          </a:lstStyle>
+          <a:p>
+            <a:pPr marL="0" lvl="1" indent="0">
+              <a:buClr>
+                <a:srgbClr val="971B2F">
+                  <a:lumMod val="100000"/>
+                </a:srgbClr>
+              </a:buClr>
+              <a:buNone/>
+            </a:pPr>
+            <a:r>
+              <a:rPr lang="en-US" sz="1600" kern="0" dirty="0" smtClean="0">
+                <a:solidFill>
+                  <a:srgbClr val="2D2926"/>
+                </a:solidFill>
+                <a:latin typeface="Segoe UI Light" panose="020B0502040204020203" pitchFamily="34" charset="0"/>
+                <a:cs typeface="Segoe UI Light" panose="020B0502040204020203" pitchFamily="34" charset="0"/>
+                <a:sym typeface=""/>
+              </a:rPr>
+              <a:t>Europe’s LNG import price in 2040: 41.6 EUR per MWh</a:t>
+            </a:r>
+            <a:endParaRPr lang="en-US" sz="1600" kern="0" dirty="0" smtClean="0">
+              <a:solidFill>
+                <a:srgbClr val="2D2926"/>
+              </a:solidFill>
+              <a:latin typeface="Segoe UI Light" panose="020B0502040204020203" pitchFamily="34" charset="0"/>
+              <a:cs typeface="Segoe UI Light" panose="020B0502040204020203" pitchFamily="34" charset="0"/>
+              <a:sym typeface=""/>
+            </a:endParaRPr>
           </a:p>
         </p:txBody>
       </p:sp>
     </p:spTree>
     <p:extLst>
       <p:ext uri="{BB962C8B-B14F-4D97-AF65-F5344CB8AC3E}">
-        <p14:creationId xmlns:p14="http://schemas.microsoft.com/office/powerpoint/2010/main" val="1239576534"/>
+        <p14:creationId xmlns:p14="http://schemas.microsoft.com/office/powerpoint/2010/main" val="2891229222"/>
       </p:ext>
     </p:extLst>
   </p:cSld>
@@ -14279,6 +16586,576 @@
       </p:sp>
       <p:sp>
         <p:nvSpPr>
+          <p:cNvPr id="4" name="Titel 3"/>
+          <p:cNvSpPr>
+            <a:spLocks noGrp="1"/>
+          </p:cNvSpPr>
+          <p:nvPr>
+            <p:ph type="title"/>
+          </p:nvPr>
+        </p:nvSpPr>
+        <p:spPr/>
+        <p:txBody>
+          <a:bodyPr/>
+          <a:lstStyle/>
+          <a:p>
+            <a:r>
+              <a:rPr lang="en-US" dirty="0" smtClean="0"/>
+              <a:t>Comparison of results with existing literature</a:t>
+            </a:r>
+            <a:endParaRPr lang="en-US" dirty="0"/>
+          </a:p>
+        </p:txBody>
+      </p:sp>
+      <p:sp>
+        <p:nvSpPr>
+          <p:cNvPr id="13" name="Fußzeilenplatzhalter 8"/>
+          <p:cNvSpPr txBox="1">
+            <a:spLocks/>
+          </p:cNvSpPr>
+          <p:nvPr/>
+        </p:nvSpPr>
+        <p:spPr>
+          <a:xfrm>
+            <a:off x="3989384" y="4127246"/>
+            <a:ext cx="4763889" cy="246221"/>
+          </a:xfrm>
+          <a:prstGeom prst="rect">
+            <a:avLst/>
+          </a:prstGeom>
+        </p:spPr>
+        <p:txBody>
+          <a:bodyPr vert="horz" lIns="91440" tIns="45720" rIns="91440" bIns="45720" rtlCol="0" anchor="b" anchorCtr="0">
+            <a:noAutofit/>
+          </a:bodyPr>
+          <a:lstStyle>
+            <a:defPPr>
+              <a:defRPr lang="en-US"/>
+            </a:defPPr>
+            <a:lvl1pPr marL="0" algn="r" defTabSz="914400" rtl="0" eaLnBrk="1" latinLnBrk="0" hangingPunct="1">
+              <a:defRPr sz="1000" kern="1200">
+                <a:solidFill>
+                  <a:schemeClr val="tx1">
+                    <a:tint val="75000"/>
+                  </a:schemeClr>
+                </a:solidFill>
+                <a:latin typeface="Tahoma" panose="020B0604030504040204" pitchFamily="34" charset="0"/>
+                <a:ea typeface="Tahoma" panose="020B0604030504040204" pitchFamily="34" charset="0"/>
+                <a:cs typeface="Tahoma" panose="020B0604030504040204" pitchFamily="34" charset="0"/>
+              </a:defRPr>
+            </a:lvl1pPr>
+            <a:lvl2pPr marL="457200" algn="l" defTabSz="914400" rtl="0" eaLnBrk="1" latinLnBrk="0" hangingPunct="1">
+              <a:defRPr sz="1800" kern="1200">
+                <a:solidFill>
+                  <a:schemeClr val="tx1"/>
+                </a:solidFill>
+                <a:latin typeface="+mn-lt"/>
+                <a:ea typeface="+mn-ea"/>
+                <a:cs typeface="+mn-cs"/>
+              </a:defRPr>
+            </a:lvl2pPr>
+            <a:lvl3pPr marL="914400" algn="l" defTabSz="914400" rtl="0" eaLnBrk="1" latinLnBrk="0" hangingPunct="1">
+              <a:defRPr sz="1800" kern="1200">
+                <a:solidFill>
+                  <a:schemeClr val="tx1"/>
+                </a:solidFill>
+                <a:latin typeface="+mn-lt"/>
+                <a:ea typeface="+mn-ea"/>
+                <a:cs typeface="+mn-cs"/>
+              </a:defRPr>
+            </a:lvl3pPr>
+            <a:lvl4pPr marL="1371600" algn="l" defTabSz="914400" rtl="0" eaLnBrk="1" latinLnBrk="0" hangingPunct="1">
+              <a:defRPr sz="1800" kern="1200">
+                <a:solidFill>
+                  <a:schemeClr val="tx1"/>
+                </a:solidFill>
+                <a:latin typeface="+mn-lt"/>
+                <a:ea typeface="+mn-ea"/>
+                <a:cs typeface="+mn-cs"/>
+              </a:defRPr>
+            </a:lvl4pPr>
+            <a:lvl5pPr marL="1828800" algn="l" defTabSz="914400" rtl="0" eaLnBrk="1" latinLnBrk="0" hangingPunct="1">
+              <a:defRPr sz="1800" kern="1200">
+                <a:solidFill>
+                  <a:schemeClr val="tx1"/>
+                </a:solidFill>
+                <a:latin typeface="+mn-lt"/>
+                <a:ea typeface="+mn-ea"/>
+                <a:cs typeface="+mn-cs"/>
+              </a:defRPr>
+            </a:lvl5pPr>
+            <a:lvl6pPr marL="2286000" algn="l" defTabSz="914400" rtl="0" eaLnBrk="1" latinLnBrk="0" hangingPunct="1">
+              <a:defRPr sz="1800" kern="1200">
+                <a:solidFill>
+                  <a:schemeClr val="tx1"/>
+                </a:solidFill>
+                <a:latin typeface="+mn-lt"/>
+                <a:ea typeface="+mn-ea"/>
+                <a:cs typeface="+mn-cs"/>
+              </a:defRPr>
+            </a:lvl6pPr>
+            <a:lvl7pPr marL="2743200" algn="l" defTabSz="914400" rtl="0" eaLnBrk="1" latinLnBrk="0" hangingPunct="1">
+              <a:defRPr sz="1800" kern="1200">
+                <a:solidFill>
+                  <a:schemeClr val="tx1"/>
+                </a:solidFill>
+                <a:latin typeface="+mn-lt"/>
+                <a:ea typeface="+mn-ea"/>
+                <a:cs typeface="+mn-cs"/>
+              </a:defRPr>
+            </a:lvl7pPr>
+            <a:lvl8pPr marL="3200400" algn="l" defTabSz="914400" rtl="0" eaLnBrk="1" latinLnBrk="0" hangingPunct="1">
+              <a:defRPr sz="1800" kern="1200">
+                <a:solidFill>
+                  <a:schemeClr val="tx1"/>
+                </a:solidFill>
+                <a:latin typeface="+mn-lt"/>
+                <a:ea typeface="+mn-ea"/>
+                <a:cs typeface="+mn-cs"/>
+              </a:defRPr>
+            </a:lvl8pPr>
+            <a:lvl9pPr marL="3657600" algn="l" defTabSz="914400" rtl="0" eaLnBrk="1" latinLnBrk="0" hangingPunct="1">
+              <a:defRPr sz="1800" kern="1200">
+                <a:solidFill>
+                  <a:schemeClr val="tx1"/>
+                </a:solidFill>
+                <a:latin typeface="+mn-lt"/>
+                <a:ea typeface="+mn-ea"/>
+                <a:cs typeface="+mn-cs"/>
+              </a:defRPr>
+            </a:lvl9pPr>
+          </a:lstStyle>
+          <a:p>
+            <a:pPr algn="ctr"/>
+            <a:r>
+              <a:rPr lang="en-US" dirty="0" smtClean="0">
+                <a:solidFill>
+                  <a:schemeClr val="bg1">
+                    <a:lumMod val="50000"/>
+                  </a:schemeClr>
+                </a:solidFill>
+              </a:rPr>
+              <a:t>Source: </a:t>
+            </a:r>
+            <a:r>
+              <a:rPr lang="en-US" dirty="0" smtClean="0">
+                <a:solidFill>
+                  <a:schemeClr val="bg1">
+                    <a:lumMod val="50000"/>
+                  </a:schemeClr>
+                </a:solidFill>
+                <a:hlinkClick r:id="rId3"/>
+              </a:rPr>
+              <a:t>Commodity Markets Outlook – Urbanization and Commodity Demand</a:t>
+            </a:r>
+            <a:endParaRPr lang="en-GB" sz="800" dirty="0">
+              <a:solidFill>
+                <a:schemeClr val="bg1">
+                  <a:lumMod val="50000"/>
+                </a:schemeClr>
+              </a:solidFill>
+            </a:endParaRPr>
+          </a:p>
+        </p:txBody>
+      </p:sp>
+      <p:pic>
+        <p:nvPicPr>
+          <p:cNvPr id="8" name="Grafik 7"/>
+          <p:cNvPicPr>
+            <a:picLocks noChangeAspect="1"/>
+          </p:cNvPicPr>
+          <p:nvPr/>
+        </p:nvPicPr>
+        <p:blipFill rotWithShape="1">
+          <a:blip r:embed="rId4"/>
+          <a:srcRect t="3380"/>
+          <a:stretch/>
+        </p:blipFill>
+        <p:spPr>
+          <a:xfrm>
+            <a:off x="1388856" y="2379410"/>
+            <a:ext cx="9964944" cy="1611120"/>
+          </a:xfrm>
+          <a:prstGeom prst="rect">
+            <a:avLst/>
+          </a:prstGeom>
+        </p:spPr>
+      </p:pic>
+      <p:sp>
+        <p:nvSpPr>
+          <p:cNvPr id="17" name="Line Callout 2 (Accent Bar) 4">
+            <a:extLst>
+              <a:ext uri="{FF2B5EF4-FFF2-40B4-BE49-F238E27FC236}">
+                <a16:creationId xmlns:a16="http://schemas.microsoft.com/office/drawing/2014/main" id="{218B7C8E-0342-4CB2-8F37-63ECAB33323C}"/>
+              </a:ext>
+            </a:extLst>
+          </p:cNvPr>
+          <p:cNvSpPr/>
+          <p:nvPr/>
+        </p:nvSpPr>
+        <p:spPr bwMode="gray">
+          <a:xfrm flipH="1">
+            <a:off x="3273971" y="4778644"/>
+            <a:ext cx="2837521" cy="943961"/>
+          </a:xfrm>
+          <a:prstGeom prst="accentCallout2">
+            <a:avLst>
+              <a:gd name="adj1" fmla="val 36833"/>
+              <a:gd name="adj2" fmla="val -5548"/>
+              <a:gd name="adj3" fmla="val 34256"/>
+              <a:gd name="adj4" fmla="val -143988"/>
+              <a:gd name="adj5" fmla="val -133700"/>
+              <a:gd name="adj6" fmla="val -169175"/>
+            </a:avLst>
+          </a:prstGeom>
+          <a:solidFill>
+            <a:schemeClr val="bg1">
+              <a:lumMod val="95000"/>
+            </a:schemeClr>
+          </a:solidFill>
+          <a:ln w="19050">
+            <a:solidFill>
+              <a:schemeClr val="tx1">
+                <a:lumMod val="95000"/>
+                <a:lumOff val="5000"/>
+              </a:schemeClr>
+            </a:solidFill>
+            <a:headEnd type="oval" w="med" len="med"/>
+            <a:tailEnd type="oval" w="med" len="med"/>
+          </a:ln>
+        </p:spPr>
+        <p:style>
+          <a:lnRef idx="2">
+            <a:schemeClr val="accent2">
+              <a:shade val="50000"/>
+            </a:schemeClr>
+          </a:lnRef>
+          <a:fillRef idx="1">
+            <a:schemeClr val="accent2"/>
+          </a:fillRef>
+          <a:effectRef idx="0">
+            <a:schemeClr val="accent2"/>
+          </a:effectRef>
+          <a:fontRef idx="minor">
+            <a:schemeClr val="lt1"/>
+          </a:fontRef>
+        </p:style>
+        <p:txBody>
+          <a:bodyPr lIns="108000" tIns="72000" rIns="108000" bIns="72000" rtlCol="0" anchor="t" anchorCtr="0"/>
+          <a:lstStyle/>
+          <a:p>
+            <a:r>
+              <a:rPr lang="en-US" sz="1600" dirty="0">
+                <a:solidFill>
+                  <a:schemeClr val="tx1"/>
+                </a:solidFill>
+                <a:latin typeface="Segoe UI Light" panose="020B0502040204020203" pitchFamily="34" charset="0"/>
+                <a:cs typeface="Segoe UI Light" panose="020B0502040204020203" pitchFamily="34" charset="0"/>
+              </a:rPr>
+              <a:t>Present results suggest higher LNG prices (</a:t>
+            </a:r>
+            <a:r>
+              <a:rPr lang="en-US" sz="1600" b="1" dirty="0">
+                <a:solidFill>
+                  <a:schemeClr val="tx1"/>
+                </a:solidFill>
+                <a:latin typeface="Segoe UI Light" panose="020B0502040204020203" pitchFamily="34" charset="0"/>
+                <a:cs typeface="Segoe UI Light" panose="020B0502040204020203" pitchFamily="34" charset="0"/>
+              </a:rPr>
+              <a:t>about </a:t>
+            </a:r>
+            <a:r>
+              <a:rPr lang="en-US" sz="1600" b="1" dirty="0" smtClean="0">
+                <a:solidFill>
+                  <a:schemeClr val="tx1"/>
+                </a:solidFill>
+                <a:latin typeface="Segoe UI Light" panose="020B0502040204020203" pitchFamily="34" charset="0"/>
+                <a:cs typeface="Segoe UI Light" panose="020B0502040204020203" pitchFamily="34" charset="0"/>
+              </a:rPr>
+              <a:t>double</a:t>
+            </a:r>
+            <a:r>
+              <a:rPr lang="en-US" sz="1600" dirty="0" smtClean="0">
+                <a:solidFill>
+                  <a:schemeClr val="tx1"/>
+                </a:solidFill>
+                <a:latin typeface="Segoe UI Light" panose="020B0502040204020203" pitchFamily="34" charset="0"/>
+                <a:cs typeface="Segoe UI Light" panose="020B0502040204020203" pitchFamily="34" charset="0"/>
+              </a:rPr>
+              <a:t>) </a:t>
+            </a:r>
+            <a:br>
+              <a:rPr lang="en-US" sz="1600" dirty="0" smtClean="0">
+                <a:solidFill>
+                  <a:schemeClr val="tx1"/>
+                </a:solidFill>
+                <a:latin typeface="Segoe UI Light" panose="020B0502040204020203" pitchFamily="34" charset="0"/>
+                <a:cs typeface="Segoe UI Light" panose="020B0502040204020203" pitchFamily="34" charset="0"/>
+              </a:rPr>
+            </a:br>
+            <a:r>
+              <a:rPr lang="en-US" sz="1600" dirty="0" smtClean="0">
+                <a:solidFill>
+                  <a:schemeClr val="tx1"/>
+                </a:solidFill>
+                <a:latin typeface="Segoe UI Light" panose="020B0502040204020203" pitchFamily="34" charset="0"/>
+                <a:cs typeface="Segoe UI Light" panose="020B0502040204020203" pitchFamily="34" charset="0"/>
+              </a:rPr>
+              <a:t>than </a:t>
+            </a:r>
+            <a:r>
+              <a:rPr lang="en-US" sz="1600" dirty="0">
+                <a:solidFill>
+                  <a:schemeClr val="tx1"/>
+                </a:solidFill>
+                <a:latin typeface="Segoe UI Light" panose="020B0502040204020203" pitchFamily="34" charset="0"/>
+                <a:cs typeface="Segoe UI Light" panose="020B0502040204020203" pitchFamily="34" charset="0"/>
+              </a:rPr>
+              <a:t>in existing </a:t>
+            </a:r>
+            <a:r>
+              <a:rPr lang="en-US" sz="1600" dirty="0" smtClean="0">
+                <a:solidFill>
+                  <a:schemeClr val="tx1"/>
+                </a:solidFill>
+                <a:latin typeface="Segoe UI Light" panose="020B0502040204020203" pitchFamily="34" charset="0"/>
+                <a:cs typeface="Segoe UI Light" panose="020B0502040204020203" pitchFamily="34" charset="0"/>
+              </a:rPr>
+              <a:t>literature</a:t>
+            </a:r>
+            <a:endParaRPr lang="en-US" sz="1600" dirty="0">
+              <a:solidFill>
+                <a:schemeClr val="tx1"/>
+              </a:solidFill>
+              <a:latin typeface="Segoe UI Light" panose="020B0502040204020203" pitchFamily="34" charset="0"/>
+              <a:cs typeface="Segoe UI Light" panose="020B0502040204020203" pitchFamily="34" charset="0"/>
+            </a:endParaRPr>
+          </a:p>
+        </p:txBody>
+      </p:sp>
+      <p:sp>
+        <p:nvSpPr>
+          <p:cNvPr id="18" name="Fußzeilenplatzhalter 8"/>
+          <p:cNvSpPr txBox="1">
+            <a:spLocks/>
+          </p:cNvSpPr>
+          <p:nvPr/>
+        </p:nvSpPr>
+        <p:spPr>
+          <a:xfrm>
+            <a:off x="6686460" y="4843665"/>
+            <a:ext cx="3413173" cy="246221"/>
+          </a:xfrm>
+          <a:prstGeom prst="rect">
+            <a:avLst/>
+          </a:prstGeom>
+        </p:spPr>
+        <p:txBody>
+          <a:bodyPr vert="horz" lIns="91440" tIns="45720" rIns="91440" bIns="45720" rtlCol="0" anchor="b" anchorCtr="0">
+            <a:noAutofit/>
+          </a:bodyPr>
+          <a:lstStyle>
+            <a:defPPr>
+              <a:defRPr lang="en-US"/>
+            </a:defPPr>
+            <a:lvl1pPr marL="0" algn="r" defTabSz="914400" rtl="0" eaLnBrk="1" latinLnBrk="0" hangingPunct="1">
+              <a:defRPr sz="1000" kern="1200">
+                <a:solidFill>
+                  <a:schemeClr val="tx1">
+                    <a:tint val="75000"/>
+                  </a:schemeClr>
+                </a:solidFill>
+                <a:latin typeface="Tahoma" panose="020B0604030504040204" pitchFamily="34" charset="0"/>
+                <a:ea typeface="Tahoma" panose="020B0604030504040204" pitchFamily="34" charset="0"/>
+                <a:cs typeface="Tahoma" panose="020B0604030504040204" pitchFamily="34" charset="0"/>
+              </a:defRPr>
+            </a:lvl1pPr>
+            <a:lvl2pPr marL="457200" algn="l" defTabSz="914400" rtl="0" eaLnBrk="1" latinLnBrk="0" hangingPunct="1">
+              <a:defRPr sz="1800" kern="1200">
+                <a:solidFill>
+                  <a:schemeClr val="tx1"/>
+                </a:solidFill>
+                <a:latin typeface="+mn-lt"/>
+                <a:ea typeface="+mn-ea"/>
+                <a:cs typeface="+mn-cs"/>
+              </a:defRPr>
+            </a:lvl2pPr>
+            <a:lvl3pPr marL="914400" algn="l" defTabSz="914400" rtl="0" eaLnBrk="1" latinLnBrk="0" hangingPunct="1">
+              <a:defRPr sz="1800" kern="1200">
+                <a:solidFill>
+                  <a:schemeClr val="tx1"/>
+                </a:solidFill>
+                <a:latin typeface="+mn-lt"/>
+                <a:ea typeface="+mn-ea"/>
+                <a:cs typeface="+mn-cs"/>
+              </a:defRPr>
+            </a:lvl3pPr>
+            <a:lvl4pPr marL="1371600" algn="l" defTabSz="914400" rtl="0" eaLnBrk="1" latinLnBrk="0" hangingPunct="1">
+              <a:defRPr sz="1800" kern="1200">
+                <a:solidFill>
+                  <a:schemeClr val="tx1"/>
+                </a:solidFill>
+                <a:latin typeface="+mn-lt"/>
+                <a:ea typeface="+mn-ea"/>
+                <a:cs typeface="+mn-cs"/>
+              </a:defRPr>
+            </a:lvl4pPr>
+            <a:lvl5pPr marL="1828800" algn="l" defTabSz="914400" rtl="0" eaLnBrk="1" latinLnBrk="0" hangingPunct="1">
+              <a:defRPr sz="1800" kern="1200">
+                <a:solidFill>
+                  <a:schemeClr val="tx1"/>
+                </a:solidFill>
+                <a:latin typeface="+mn-lt"/>
+                <a:ea typeface="+mn-ea"/>
+                <a:cs typeface="+mn-cs"/>
+              </a:defRPr>
+            </a:lvl5pPr>
+            <a:lvl6pPr marL="2286000" algn="l" defTabSz="914400" rtl="0" eaLnBrk="1" latinLnBrk="0" hangingPunct="1">
+              <a:defRPr sz="1800" kern="1200">
+                <a:solidFill>
+                  <a:schemeClr val="tx1"/>
+                </a:solidFill>
+                <a:latin typeface="+mn-lt"/>
+                <a:ea typeface="+mn-ea"/>
+                <a:cs typeface="+mn-cs"/>
+              </a:defRPr>
+            </a:lvl6pPr>
+            <a:lvl7pPr marL="2743200" algn="l" defTabSz="914400" rtl="0" eaLnBrk="1" latinLnBrk="0" hangingPunct="1">
+              <a:defRPr sz="1800" kern="1200">
+                <a:solidFill>
+                  <a:schemeClr val="tx1"/>
+                </a:solidFill>
+                <a:latin typeface="+mn-lt"/>
+                <a:ea typeface="+mn-ea"/>
+                <a:cs typeface="+mn-cs"/>
+              </a:defRPr>
+            </a:lvl7pPr>
+            <a:lvl8pPr marL="3200400" algn="l" defTabSz="914400" rtl="0" eaLnBrk="1" latinLnBrk="0" hangingPunct="1">
+              <a:defRPr sz="1800" kern="1200">
+                <a:solidFill>
+                  <a:schemeClr val="tx1"/>
+                </a:solidFill>
+                <a:latin typeface="+mn-lt"/>
+                <a:ea typeface="+mn-ea"/>
+                <a:cs typeface="+mn-cs"/>
+              </a:defRPr>
+            </a:lvl8pPr>
+            <a:lvl9pPr marL="3657600" algn="l" defTabSz="914400" rtl="0" eaLnBrk="1" latinLnBrk="0" hangingPunct="1">
+              <a:defRPr sz="1800" kern="1200">
+                <a:solidFill>
+                  <a:schemeClr val="tx1"/>
+                </a:solidFill>
+                <a:latin typeface="+mn-lt"/>
+                <a:ea typeface="+mn-ea"/>
+                <a:cs typeface="+mn-cs"/>
+              </a:defRPr>
+            </a:lvl9pPr>
+          </a:lstStyle>
+          <a:p>
+            <a:pPr algn="ctr"/>
+            <a:r>
+              <a:rPr lang="en-US" dirty="0" smtClean="0">
+                <a:solidFill>
+                  <a:schemeClr val="bg1">
+                    <a:lumMod val="50000"/>
+                  </a:schemeClr>
+                </a:solidFill>
+              </a:rPr>
+              <a:t>12,2 $ per </a:t>
+            </a:r>
+            <a:r>
+              <a:rPr lang="en-US" dirty="0" err="1" smtClean="0">
+                <a:solidFill>
+                  <a:schemeClr val="bg1">
+                    <a:lumMod val="50000"/>
+                  </a:schemeClr>
+                </a:solidFill>
+              </a:rPr>
+              <a:t>mmBTU</a:t>
+            </a:r>
+            <a:r>
+              <a:rPr lang="en-US" dirty="0" smtClean="0">
+                <a:solidFill>
+                  <a:schemeClr val="bg1">
+                    <a:lumMod val="50000"/>
+                  </a:schemeClr>
+                </a:solidFill>
+              </a:rPr>
+              <a:t> in 2040</a:t>
+            </a:r>
+            <a:endParaRPr lang="en-GB" dirty="0">
+              <a:solidFill>
+                <a:schemeClr val="bg1">
+                  <a:lumMod val="50000"/>
+                </a:schemeClr>
+              </a:solidFill>
+            </a:endParaRPr>
+          </a:p>
+        </p:txBody>
+      </p:sp>
+    </p:spTree>
+    <p:extLst>
+      <p:ext uri="{BB962C8B-B14F-4D97-AF65-F5344CB8AC3E}">
+        <p14:creationId xmlns:p14="http://schemas.microsoft.com/office/powerpoint/2010/main" val="1591232402"/>
+      </p:ext>
+    </p:extLst>
+  </p:cSld>
+  <p:clrMapOvr>
+    <a:masterClrMapping/>
+  </p:clrMapOvr>
+  <p:timing>
+    <p:tnLst>
+      <p:par>
+        <p:cTn id="1" dur="indefinite" restart="never" nodeType="tmRoot"/>
+      </p:par>
+    </p:tnLst>
+  </p:timing>
+</p:sld>
+</file>
+
+<file path=ppt/slides/slide15.xml><?xml version="1.0" encoding="utf-8"?>
+<p:sld xmlns:a="http://schemas.openxmlformats.org/drawingml/2006/main" xmlns:r="http://schemas.openxmlformats.org/officeDocument/2006/relationships" xmlns:p="http://schemas.openxmlformats.org/presentationml/2006/main">
+  <p:cSld>
+    <p:spTree>
+      <p:nvGrpSpPr>
+        <p:cNvPr id="1" name=""/>
+        <p:cNvGrpSpPr/>
+        <p:nvPr/>
+      </p:nvGrpSpPr>
+      <p:grpSpPr>
+        <a:xfrm>
+          <a:off x="0" y="0"/>
+          <a:ext cx="0" cy="0"/>
+          <a:chOff x="0" y="0"/>
+          <a:chExt cx="0" cy="0"/>
+        </a:xfrm>
+      </p:grpSpPr>
+      <p:sp>
+        <p:nvSpPr>
+          <p:cNvPr id="2" name="Foliennummernplatzhalter 1"/>
+          <p:cNvSpPr>
+            <a:spLocks noGrp="1"/>
+          </p:cNvSpPr>
+          <p:nvPr>
+            <p:ph type="sldNum" sz="quarter" idx="11"/>
+          </p:nvPr>
+        </p:nvSpPr>
+        <p:spPr/>
+        <p:txBody>
+          <a:bodyPr/>
+          <a:lstStyle/>
+          <a:p>
+            <a:fld id="{838B0777-827F-8D42-90B1-61394C340E65}" type="slidenum">
+              <a:rPr lang="en-US" smtClean="0"/>
+              <a:pPr/>
+              <a:t>15</a:t>
+            </a:fld>
+            <a:endParaRPr lang="en-US" dirty="0"/>
+          </a:p>
+        </p:txBody>
+      </p:sp>
+      <p:sp>
+        <p:nvSpPr>
           <p:cNvPr id="3" name="Inhaltsplatzhalter 2"/>
           <p:cNvSpPr>
             <a:spLocks noGrp="1"/>
@@ -14295,7 +17172,7 @@
         </p:spPr>
         <p:txBody>
           <a:bodyPr>
-            <a:normAutofit lnSpcReduction="10000"/>
+            <a:normAutofit/>
           </a:bodyPr>
           <a:lstStyle/>
           <a:p>
@@ -14351,183 +17228,6 @@
               </a:rPr>
               <a:t>toward 2050.</a:t>
             </a:r>
-          </a:p>
-          <a:p>
-            <a:pPr marL="342900" indent="-342900">
-              <a:buFont typeface="Wingdings" panose="05000000000000000000" pitchFamily="2" charset="2"/>
-              <a:buChar char="§"/>
-            </a:pPr>
-            <a:r>
-              <a:rPr lang="en-US" dirty="0">
-                <a:sym typeface="Wingdings" panose="05000000000000000000" pitchFamily="2" charset="2"/>
-              </a:rPr>
-              <a:t>The results </a:t>
-            </a:r>
-            <a:r>
-              <a:rPr lang="en-US" dirty="0" smtClean="0">
-                <a:sym typeface="Wingdings" panose="05000000000000000000" pitchFamily="2" charset="2"/>
-              </a:rPr>
-              <a:t>demonstrate </a:t>
-            </a:r>
-            <a:r>
-              <a:rPr lang="en-US" dirty="0">
-                <a:sym typeface="Wingdings" panose="05000000000000000000" pitchFamily="2" charset="2"/>
-              </a:rPr>
-              <a:t>that particularly densely populated areas are still beneficial supply </a:t>
-            </a:r>
-            <a:r>
-              <a:rPr lang="en-US" dirty="0" smtClean="0">
-                <a:sym typeface="Wingdings" panose="05000000000000000000" pitchFamily="2" charset="2"/>
-              </a:rPr>
-              <a:t>areas for </a:t>
-            </a:r>
-            <a:r>
-              <a:rPr lang="en-US" dirty="0">
-                <a:sym typeface="Wingdings" panose="05000000000000000000" pitchFamily="2" charset="2"/>
-              </a:rPr>
-              <a:t>district heating networks and offer adequate heat densities</a:t>
-            </a:r>
-            <a:r>
-              <a:rPr lang="en-US" dirty="0" smtClean="0">
-                <a:sym typeface="Wingdings" panose="05000000000000000000" pitchFamily="2" charset="2"/>
-              </a:rPr>
-              <a:t>.</a:t>
-            </a:r>
-          </a:p>
-          <a:p>
-            <a:pPr marL="342900" indent="-342900">
-              <a:buFont typeface="Wingdings" panose="05000000000000000000" pitchFamily="2" charset="2"/>
-              <a:buChar char="§"/>
-            </a:pPr>
-            <a:r>
-              <a:rPr lang="en-US" dirty="0" smtClean="0">
-                <a:sym typeface="Wingdings" panose="05000000000000000000" pitchFamily="2" charset="2"/>
-              </a:rPr>
-              <a:t>Nevertheless, most </a:t>
-            </a:r>
-            <a:r>
-              <a:rPr lang="en-US" dirty="0">
-                <a:sym typeface="Wingdings" panose="05000000000000000000" pitchFamily="2" charset="2"/>
-              </a:rPr>
-              <a:t>district heating networks in 2050 (seven of eight) will not reach the </a:t>
-            </a:r>
-            <a:r>
-              <a:rPr lang="en-US" dirty="0" smtClean="0">
-                <a:sym typeface="Wingdings" panose="05000000000000000000" pitchFamily="2" charset="2"/>
-              </a:rPr>
-              <a:t>heat density </a:t>
-            </a:r>
-            <a:r>
-              <a:rPr lang="en-US" dirty="0">
-                <a:sym typeface="Wingdings" panose="05000000000000000000" pitchFamily="2" charset="2"/>
-              </a:rPr>
-              <a:t>benchmarks of today’s networks and have a significant heat density gap.</a:t>
-            </a:r>
-          </a:p>
-          <a:p>
-            <a:pPr marL="342900" indent="-342900">
-              <a:buFont typeface="Wingdings" panose="05000000000000000000" pitchFamily="2" charset="2"/>
-              <a:buChar char="§"/>
-            </a:pPr>
-            <a:r>
-              <a:rPr lang="en-US" dirty="0">
-                <a:sym typeface="Wingdings" panose="05000000000000000000" pitchFamily="2" charset="2"/>
-              </a:rPr>
-              <a:t>However, considering the increasing importance of local renewable heat </a:t>
-            </a:r>
-            <a:r>
-              <a:rPr lang="en-US" dirty="0" smtClean="0">
-                <a:sym typeface="Wingdings" panose="05000000000000000000" pitchFamily="2" charset="2"/>
-              </a:rPr>
-              <a:t>sources feeding </a:t>
-            </a:r>
-            <a:r>
-              <a:rPr lang="en-US" dirty="0">
-                <a:sym typeface="Wingdings" panose="05000000000000000000" pitchFamily="2" charset="2"/>
-              </a:rPr>
-              <a:t>into district heating networks, we assume that these centralized </a:t>
-            </a:r>
-            <a:r>
-              <a:rPr lang="en-US" dirty="0" smtClean="0">
-                <a:sym typeface="Wingdings" panose="05000000000000000000" pitchFamily="2" charset="2"/>
-              </a:rPr>
-              <a:t>networks </a:t>
-            </a:r>
-            <a:r>
-              <a:rPr lang="en-US" dirty="0">
-                <a:sym typeface="Wingdings" panose="05000000000000000000" pitchFamily="2" charset="2"/>
-              </a:rPr>
-              <a:t>will become required in the future and crucial in the decarbonization </a:t>
-            </a:r>
-            <a:r>
-              <a:rPr lang="en-US" dirty="0" smtClean="0">
-                <a:sym typeface="Wingdings" panose="05000000000000000000" pitchFamily="2" charset="2"/>
-              </a:rPr>
-              <a:t>of the </a:t>
-            </a:r>
-            <a:r>
-              <a:rPr lang="en-US" dirty="0">
-                <a:sym typeface="Wingdings" panose="05000000000000000000" pitchFamily="2" charset="2"/>
-              </a:rPr>
-              <a:t>heating sector</a:t>
-            </a:r>
-            <a:r>
-              <a:rPr lang="en-US" dirty="0" smtClean="0">
-                <a:sym typeface="Wingdings" panose="05000000000000000000" pitchFamily="2" charset="2"/>
-              </a:rPr>
-              <a:t>.</a:t>
-            </a:r>
-          </a:p>
-          <a:p>
-            <a:pPr marL="342900" indent="-342900">
-              <a:buFont typeface="Wingdings" panose="05000000000000000000" pitchFamily="2" charset="2"/>
-              <a:buChar char="§"/>
-            </a:pPr>
-            <a:r>
-              <a:rPr lang="en-US" dirty="0">
-                <a:sym typeface="Wingdings" panose="05000000000000000000" pitchFamily="2" charset="2"/>
-              </a:rPr>
-              <a:t>We anticipate our work as a starting point for discussing the role of </a:t>
-            </a:r>
-            <a:r>
-              <a:rPr lang="en-US" dirty="0" smtClean="0">
-                <a:sym typeface="Wingdings" panose="05000000000000000000" pitchFamily="2" charset="2"/>
-              </a:rPr>
-              <a:t>centralized heat </a:t>
-            </a:r>
-            <a:r>
-              <a:rPr lang="en-US" dirty="0">
-                <a:sym typeface="Wingdings" panose="05000000000000000000" pitchFamily="2" charset="2"/>
-              </a:rPr>
-              <a:t>network infrastructure for enabling large-scale, highly efficient and </a:t>
-            </a:r>
-            <a:r>
-              <a:rPr lang="en-US" dirty="0" smtClean="0">
-                <a:sym typeface="Wingdings" panose="05000000000000000000" pitchFamily="2" charset="2"/>
-              </a:rPr>
-              <a:t>local integration </a:t>
-            </a:r>
-            <a:r>
-              <a:rPr lang="en-US" dirty="0">
-                <a:sym typeface="Wingdings" panose="05000000000000000000" pitchFamily="2" charset="2"/>
-              </a:rPr>
-              <a:t>of renewable heat sources such as biomass/waste, hydrogen, </a:t>
-            </a:r>
-            <a:r>
-              <a:rPr lang="en-US" dirty="0" smtClean="0">
-                <a:sym typeface="Wingdings" panose="05000000000000000000" pitchFamily="2" charset="2"/>
-              </a:rPr>
-              <a:t>ground-sourced </a:t>
-            </a:r>
-            <a:r>
-              <a:rPr lang="en-US" dirty="0">
-                <a:sym typeface="Wingdings" panose="05000000000000000000" pitchFamily="2" charset="2"/>
-              </a:rPr>
-              <a:t>heat pumps, or geothermal units.</a:t>
-            </a:r>
-            <a:endParaRPr lang="en-US" dirty="0" smtClean="0">
-              <a:sym typeface="Wingdings" panose="05000000000000000000" pitchFamily="2" charset="2"/>
-            </a:endParaRPr>
           </a:p>
           <a:p>
             <a:pPr marL="342900" indent="-342900">
@@ -14562,7 +17262,7 @@
           <a:p>
             <a:r>
               <a:rPr lang="en-US" dirty="0" smtClean="0"/>
-              <a:t>Conclusions</a:t>
+              <a:t>Key-Takeaways</a:t>
             </a:r>
             <a:endParaRPr lang="en-US" dirty="0"/>
           </a:p>
@@ -18975,23 +21675,6 @@
               </a:rPr>
               <a:t> Even Price </a:t>
             </a:r>
-            <a:r>
-              <a:rPr kumimoji="0" lang="en-US" sz="1600" b="0" i="0" u="none" strike="noStrike" kern="0" cap="none" spc="0" normalizeH="0" noProof="0" dirty="0" smtClean="0">
-                <a:ln>
-                  <a:noFill/>
-                </a:ln>
-                <a:solidFill>
-                  <a:srgbClr val="2D2926"/>
-                </a:solidFill>
-                <a:effectLst/>
-                <a:uLnTx/>
-                <a:uFillTx/>
-                <a:latin typeface="Segoe UI Light" panose="020B0502040204020203" pitchFamily="34" charset="0"/>
-                <a:cs typeface="Segoe UI Light" panose="020B0502040204020203" pitchFamily="34" charset="0"/>
-                <a:sym typeface=""/>
-              </a:rPr>
-              <a:t/>
-            </a:r>
             <a:br>
               <a:rPr kumimoji="0" lang="en-US" sz="1600" b="0" i="0" u="none" strike="noStrike" kern="0" cap="none" spc="0" normalizeH="0" noProof="0" dirty="0" smtClean="0">
                 <a:ln>
@@ -19023,24 +21706,7 @@
                 <a:cs typeface="Segoe UI Light" panose="020B0502040204020203" pitchFamily="34" charset="0"/>
                 <a:sym typeface=""/>
               </a:rPr>
-              <a:t>= </a:t>
-            </a:r>
-            <a:r>
-              <a:rPr kumimoji="0" lang="en-US" sz="1600" b="0" i="0" u="none" strike="noStrike" kern="0" cap="none" spc="0" normalizeH="0" noProof="0" dirty="0" smtClean="0">
-                <a:ln>
-                  <a:noFill/>
-                </a:ln>
-                <a:solidFill>
-                  <a:srgbClr val="2D2926"/>
-                </a:solidFill>
-                <a:effectLst/>
-                <a:uLnTx/>
-                <a:uFillTx/>
-                <a:latin typeface="Segoe UI Light" panose="020B0502040204020203" pitchFamily="34" charset="0"/>
-                <a:cs typeface="Segoe UI Light" panose="020B0502040204020203" pitchFamily="34" charset="0"/>
-                <a:sym typeface=""/>
-              </a:rPr>
-              <a:t>feed gas </a:t>
+              <a:t>= feed gas </a:t>
             </a:r>
             <a:br>
               <a:rPr kumimoji="0" lang="en-US" sz="1600" b="0" i="0" u="none" strike="noStrike" kern="0" cap="none" spc="0" normalizeH="0" noProof="0" dirty="0" smtClean="0">
@@ -19577,7 +22243,6 @@
               <a:rPr lang="en-US" sz="2000" dirty="0"/>
               <a:t>(validation of the model)</a:t>
             </a:r>
-            <a:endParaRPr lang="en-US" sz="2000" dirty="0"/>
           </a:p>
         </p:txBody>
       </p:sp>
@@ -19612,17 +22277,7 @@
                   </a:schemeClr>
                 </a:solidFill>
               </a:rPr>
-              <a:t>Fig: </a:t>
-            </a:r>
-            <a:r>
-              <a:rPr lang="en-US" dirty="0" smtClean="0">
-                <a:solidFill>
-                  <a:schemeClr val="bg1">
-                    <a:lumMod val="50000"/>
-                  </a:schemeClr>
-                </a:solidFill>
-              </a:rPr>
-              <a:t>Determined LNG flows</a:t>
+              <a:t>Fig: Determined LNG flows</a:t>
             </a:r>
             <a:endParaRPr lang="en-GB" dirty="0">
               <a:solidFill>
@@ -19716,7 +22371,6 @@
           <a:bodyPr lIns="108000" tIns="72000" rIns="108000" bIns="72000" rtlCol="0" anchor="t" anchorCtr="0"/>
           <a:lstStyle/>
           <a:p>
-            <a:pPr/>
             <a:r>
               <a:rPr lang="en-US" sz="1050" dirty="0" smtClean="0">
                 <a:solidFill>
@@ -19725,17 +22379,7 @@
                 <a:latin typeface="Segoe UI Light" panose="020B0502040204020203" pitchFamily="34" charset="0"/>
                 <a:cs typeface="Segoe UI Light" panose="020B0502040204020203" pitchFamily="34" charset="0"/>
               </a:rPr>
-              <a:t>Japan, China and South Korea are mainly supplied by Australia</a:t>
-            </a:r>
-            <a:r>
-              <a:rPr lang="en-US" sz="1050" dirty="0" smtClean="0">
-                <a:solidFill>
-                  <a:schemeClr val="tx1"/>
-                </a:solidFill>
-                <a:latin typeface="Segoe UI Light" panose="020B0502040204020203" pitchFamily="34" charset="0"/>
-                <a:cs typeface="Segoe UI Light" panose="020B0502040204020203" pitchFamily="34" charset="0"/>
-              </a:rPr>
-              <a:t>, Indonesia and Malaysia</a:t>
+              <a:t>Japan, China and South Korea are mainly supplied by Australia, Indonesia and Malaysia</a:t>
             </a:r>
             <a:br>
               <a:rPr lang="en-US" sz="1050" dirty="0" smtClean="0">
@@ -19857,7 +22501,6 @@
           <a:bodyPr lIns="108000" tIns="72000" rIns="108000" bIns="72000" rtlCol="0" anchor="t" anchorCtr="0"/>
           <a:lstStyle/>
           <a:p>
-            <a:pPr/>
             <a:r>
               <a:rPr lang="en-US" sz="1050" dirty="0" smtClean="0">
                 <a:solidFill>
@@ -19956,7 +22599,6 @@
           <a:bodyPr lIns="108000" tIns="72000" rIns="108000" bIns="72000" rtlCol="0" anchor="t" anchorCtr="0"/>
           <a:lstStyle/>
           <a:p>
-            <a:pPr/>
             <a:r>
               <a:rPr lang="en-US" sz="1050" b="1" dirty="0" smtClean="0">
                 <a:solidFill>
@@ -19975,37 +22617,7 @@
                 <a:latin typeface="Segoe UI Light" panose="020B0502040204020203" pitchFamily="34" charset="0"/>
                 <a:cs typeface="Segoe UI Light" panose="020B0502040204020203" pitchFamily="34" charset="0"/>
               </a:rPr>
-              <a:t> (1) </a:t>
-            </a:r>
-            <a:r>
-              <a:rPr lang="en-US" sz="1050" dirty="0" smtClean="0">
-                <a:solidFill>
-                  <a:schemeClr val="tx1"/>
-                </a:solidFill>
-                <a:latin typeface="Segoe UI Light" panose="020B0502040204020203" pitchFamily="34" charset="0"/>
-                <a:cs typeface="Segoe UI Light" panose="020B0502040204020203" pitchFamily="34" charset="0"/>
-              </a:rPr>
-              <a:t>largest LNG exporter; (2) l</a:t>
-            </a:r>
-            <a:r>
-              <a:rPr lang="en-US" sz="1050" dirty="0" smtClean="0">
-                <a:solidFill>
-                  <a:schemeClr val="tx1"/>
-                </a:solidFill>
-                <a:latin typeface="Segoe UI Light" panose="020B0502040204020203" pitchFamily="34" charset="0"/>
-                <a:cs typeface="Segoe UI Light" panose="020B0502040204020203" pitchFamily="34" charset="0"/>
-              </a:rPr>
-              <a:t>owest “Break Even Price”; (3) mainly serving</a:t>
-            </a:r>
-            <a:r>
-              <a:rPr lang="en-US" sz="1050" dirty="0" smtClean="0">
-                <a:solidFill>
-                  <a:schemeClr val="tx1"/>
-                </a:solidFill>
-                <a:latin typeface="Segoe UI Light" panose="020B0502040204020203" pitchFamily="34" charset="0"/>
-                <a:cs typeface="Segoe UI Light" panose="020B0502040204020203" pitchFamily="34" charset="0"/>
-              </a:rPr>
-              <a:t> the Asian market</a:t>
+              <a:t> (1) largest LNG exporter; (2) lowest “Break Even Price”; (3) mainly serving the Asian market</a:t>
             </a:r>
             <a:endParaRPr lang="en-US" sz="1050" dirty="0">
               <a:solidFill>
@@ -21150,6 +23762,65 @@
 </file>
 
 <file path=customXml/item1.xml><?xml version="1.0" encoding="utf-8"?>
+<?mso-contentType ?>
+<FormTemplates xmlns="http://schemas.microsoft.com/sharepoint/v3/contenttype/forms">
+  <Display>DocumentLibraryForm</Display>
+  <Edit>DocumentLibraryForm</Edit>
+  <New>DocumentLibraryForm</New>
+</FormTemplates>
+</file>
+
+<file path=customXml/item2.xml><?xml version="1.0" encoding="utf-8"?>
+<?mso-contentType ?>
+<spe:Receivers xmlns:spe="http://schemas.microsoft.com/sharepoint/events">
+  <Receiver>
+    <Name>Document ID Generator</Name>
+    <Synchronization>Synchronous</Synchronization>
+    <Type>10001</Type>
+    <SequenceNumber>1000</SequenceNumber>
+    <Url/>
+    <Assembly>Microsoft.Office.DocumentManagement, Version=16.0.0.0, Culture=neutral, PublicKeyToken=71e9bce111e9429c</Assembly>
+    <Class>Microsoft.Office.DocumentManagement.Internal.DocIdHandler</Class>
+    <Data/>
+    <Filter/>
+  </Receiver>
+  <Receiver>
+    <Name>Document ID Generator</Name>
+    <Synchronization>Synchronous</Synchronization>
+    <Type>10002</Type>
+    <SequenceNumber>1001</SequenceNumber>
+    <Url/>
+    <Assembly>Microsoft.Office.DocumentManagement, Version=16.0.0.0, Culture=neutral, PublicKeyToken=71e9bce111e9429c</Assembly>
+    <Class>Microsoft.Office.DocumentManagement.Internal.DocIdHandler</Class>
+    <Data/>
+    <Filter/>
+  </Receiver>
+  <Receiver>
+    <Name>Document ID Generator</Name>
+    <Synchronization>Synchronous</Synchronization>
+    <Type>10004</Type>
+    <SequenceNumber>1002</SequenceNumber>
+    <Url/>
+    <Assembly>Microsoft.Office.DocumentManagement, Version=16.0.0.0, Culture=neutral, PublicKeyToken=71e9bce111e9429c</Assembly>
+    <Class>Microsoft.Office.DocumentManagement.Internal.DocIdHandler</Class>
+    <Data/>
+    <Filter/>
+  </Receiver>
+  <Receiver>
+    <Name>Document ID Generator</Name>
+    <Synchronization>Synchronous</Synchronization>
+    <Type>10006</Type>
+    <SequenceNumber>1003</SequenceNumber>
+    <Url/>
+    <Assembly>Microsoft.Office.DocumentManagement, Version=16.0.0.0, Culture=neutral, PublicKeyToken=71e9bce111e9429c</Assembly>
+    <Class>Microsoft.Office.DocumentManagement.Internal.DocIdHandler</Class>
+    <Data/>
+    <Filter/>
+  </Receiver>
+</spe:Receivers>
+</file>
+
+<file path=customXml/item3.xml><?xml version="1.0" encoding="utf-8"?>
 <ct:contentTypeSchema xmlns:ct="http://schemas.microsoft.com/office/2006/metadata/contentType" xmlns:ma="http://schemas.microsoft.com/office/2006/metadata/properties/metaAttributes" ct:_="" ma:_="" ma:contentTypeName="Document" ma:contentTypeID="0x010100709E5D021178B04082DE841A61810ABC" ma:contentTypeVersion="6" ma:contentTypeDescription="Create a new document." ma:contentTypeScope="" ma:versionID="bf37d4ac1dddfc53a56261334840b7df">
   <xsd:schema xmlns:xsd="http://www.w3.org/2001/XMLSchema" xmlns:xs="http://www.w3.org/2001/XMLSchema" xmlns:p="http://schemas.microsoft.com/office/2006/metadata/properties" xmlns:ns2="0689c177-5e19-464b-8532-40aa8fde3a94" xmlns:ns3="06814371-4dd9-40ea-9cc7-40b39613c6ae" xmlns:ns4="749ef8e9-4186-4c55-b2d4-b1c3f2fa9400" targetNamespace="http://schemas.microsoft.com/office/2006/metadata/properties" ma:root="true" ma:fieldsID="382a45c066b9cd32e8d486b5ba424e80" ns2:_="" ns3:_="" ns4:_="">
     <xsd:import namespace="0689c177-5e19-464b-8532-40aa8fde3a94"/>
@@ -21356,65 +24027,6 @@
 </ct:contentTypeSchema>
 </file>
 
-<file path=customXml/item2.xml><?xml version="1.0" encoding="utf-8"?>
-<?mso-contentType ?>
-<spe:Receivers xmlns:spe="http://schemas.microsoft.com/sharepoint/events">
-  <Receiver>
-    <Name>Document ID Generator</Name>
-    <Synchronization>Synchronous</Synchronization>
-    <Type>10001</Type>
-    <SequenceNumber>1000</SequenceNumber>
-    <Url/>
-    <Assembly>Microsoft.Office.DocumentManagement, Version=16.0.0.0, Culture=neutral, PublicKeyToken=71e9bce111e9429c</Assembly>
-    <Class>Microsoft.Office.DocumentManagement.Internal.DocIdHandler</Class>
-    <Data/>
-    <Filter/>
-  </Receiver>
-  <Receiver>
-    <Name>Document ID Generator</Name>
-    <Synchronization>Synchronous</Synchronization>
-    <Type>10002</Type>
-    <SequenceNumber>1001</SequenceNumber>
-    <Url/>
-    <Assembly>Microsoft.Office.DocumentManagement, Version=16.0.0.0, Culture=neutral, PublicKeyToken=71e9bce111e9429c</Assembly>
-    <Class>Microsoft.Office.DocumentManagement.Internal.DocIdHandler</Class>
-    <Data/>
-    <Filter/>
-  </Receiver>
-  <Receiver>
-    <Name>Document ID Generator</Name>
-    <Synchronization>Synchronous</Synchronization>
-    <Type>10004</Type>
-    <SequenceNumber>1002</SequenceNumber>
-    <Url/>
-    <Assembly>Microsoft.Office.DocumentManagement, Version=16.0.0.0, Culture=neutral, PublicKeyToken=71e9bce111e9429c</Assembly>
-    <Class>Microsoft.Office.DocumentManagement.Internal.DocIdHandler</Class>
-    <Data/>
-    <Filter/>
-  </Receiver>
-  <Receiver>
-    <Name>Document ID Generator</Name>
-    <Synchronization>Synchronous</Synchronization>
-    <Type>10006</Type>
-    <SequenceNumber>1003</SequenceNumber>
-    <Url/>
-    <Assembly>Microsoft.Office.DocumentManagement, Version=16.0.0.0, Culture=neutral, PublicKeyToken=71e9bce111e9429c</Assembly>
-    <Class>Microsoft.Office.DocumentManagement.Internal.DocIdHandler</Class>
-    <Data/>
-    <Filter/>
-  </Receiver>
-</spe:Receivers>
-</file>
-
-<file path=customXml/item3.xml><?xml version="1.0" encoding="utf-8"?>
-<?mso-contentType ?>
-<FormTemplates xmlns="http://schemas.microsoft.com/sharepoint/v3/contenttype/forms">
-  <Display>DocumentLibraryForm</Display>
-  <Edit>DocumentLibraryForm</Edit>
-  <New>DocumentLibraryForm</New>
-</FormTemplates>
-</file>
-
 <file path=customXml/item4.xml><?xml version="1.0" encoding="utf-8"?>
 <p:properties xmlns:p="http://schemas.microsoft.com/office/2006/metadata/properties" xmlns:xsi="http://www.w3.org/2001/XMLSchema-instance" xmlns:pc="http://schemas.microsoft.com/office/infopath/2007/PartnerControls">
   <documentManagement>
@@ -21428,6 +24040,22 @@
 </file>
 
 <file path=customXml/itemProps1.xml><?xml version="1.0" encoding="utf-8"?>
+<ds:datastoreItem xmlns:ds="http://schemas.openxmlformats.org/officeDocument/2006/customXml" ds:itemID="{6E794EA7-8E28-4624-885F-9EF05194D2E6}">
+  <ds:schemaRefs>
+    <ds:schemaRef ds:uri="http://schemas.microsoft.com/sharepoint/v3/contenttype/forms"/>
+  </ds:schemaRefs>
+</ds:datastoreItem>
+</file>
+
+<file path=customXml/itemProps2.xml><?xml version="1.0" encoding="utf-8"?>
+<ds:datastoreItem xmlns:ds="http://schemas.openxmlformats.org/officeDocument/2006/customXml" ds:itemID="{B0542633-460B-4F10-AED0-D9CC98DDA495}">
+  <ds:schemaRefs>
+    <ds:schemaRef ds:uri="http://schemas.microsoft.com/sharepoint/events"/>
+  </ds:schemaRefs>
+</ds:datastoreItem>
+</file>
+
+<file path=customXml/itemProps3.xml><?xml version="1.0" encoding="utf-8"?>
 <ds:datastoreItem xmlns:ds="http://schemas.openxmlformats.org/officeDocument/2006/customXml" ds:itemID="{FE961F14-CA64-4A5B-8D0E-270958149F57}">
   <ds:schemaRefs>
     <ds:schemaRef ds:uri="http://schemas.microsoft.com/office/2006/metadata/contentType"/>
@@ -21443,22 +24071,6 @@
     <ds:schemaRef ds:uri="http://purl.org/dc/elements/1.1/"/>
     <ds:schemaRef ds:uri="http://purl.org/dc/terms/"/>
     <ds:schemaRef ds:uri="http://schemas.microsoft.com/internal/obd"/>
-  </ds:schemaRefs>
-</ds:datastoreItem>
-</file>
-
-<file path=customXml/itemProps2.xml><?xml version="1.0" encoding="utf-8"?>
-<ds:datastoreItem xmlns:ds="http://schemas.openxmlformats.org/officeDocument/2006/customXml" ds:itemID="{B0542633-460B-4F10-AED0-D9CC98DDA495}">
-  <ds:schemaRefs>
-    <ds:schemaRef ds:uri="http://schemas.microsoft.com/sharepoint/events"/>
-  </ds:schemaRefs>
-</ds:datastoreItem>
-</file>
-
-<file path=customXml/itemProps3.xml><?xml version="1.0" encoding="utf-8"?>
-<ds:datastoreItem xmlns:ds="http://schemas.openxmlformats.org/officeDocument/2006/customXml" ds:itemID="{6E794EA7-8E28-4624-885F-9EF05194D2E6}">
-  <ds:schemaRefs>
-    <ds:schemaRef ds:uri="http://schemas.microsoft.com/sharepoint/v3/contenttype/forms"/>
   </ds:schemaRefs>
 </ds:datastoreItem>
 </file>

</xml_diff>

<commit_message>
add final iewt presentation
</commit_message>
<xml_diff>
--- a/presentation/230214_IEWT.pptx
+++ b/presentation/230214_IEWT.pptx
@@ -249,7 +249,7 @@
           <a:p>
             <a:fld id="{8362D56F-4014-E440-B414-1949875DC54A}" type="datetimeFigureOut">
               <a:rPr lang="en-US" smtClean="0"/>
-              <a:t>2/14/2023</a:t>
+              <a:t>2/15/2023</a:t>
             </a:fld>
             <a:endParaRPr lang="en-US"/>
           </a:p>
@@ -426,7 +426,7 @@
           <a:p>
             <a:fld id="{1EAC332E-8893-FE4E-9A25-93BB30EFA0DA}" type="datetimeFigureOut">
               <a:rPr lang="en-US" smtClean="0"/>
-              <a:t>2/14/2023</a:t>
+              <a:t>2/15/2023</a:t>
             </a:fld>
             <a:endParaRPr lang="en-US"/>
           </a:p>
@@ -11307,8 +11307,8 @@
         </p:nvSpPr>
         <p:spPr bwMode="auto">
           <a:xfrm>
-            <a:off x="456497" y="3959168"/>
-            <a:ext cx="9951760" cy="1008719"/>
+            <a:off x="456496" y="3959168"/>
+            <a:ext cx="11473836" cy="1008719"/>
           </a:xfrm>
           <a:prstGeom prst="rect">
             <a:avLst/>
@@ -13811,17 +13811,7 @@
                   </a:schemeClr>
                 </a:solidFill>
               </a:rPr>
-              <a:t>Fig: Weighted DES prices of importers until </a:t>
-            </a:r>
-            <a:r>
-              <a:rPr lang="en-US" dirty="0" smtClean="0">
-                <a:solidFill>
-                  <a:schemeClr val="bg1">
-                    <a:lumMod val="50000"/>
-                  </a:schemeClr>
-                </a:solidFill>
-              </a:rPr>
-              <a:t>2040 in $ per </a:t>
+              <a:t>Fig: Weighted DES prices of importers until 2040 in $ per </a:t>
             </a:r>
             <a:r>
               <a:rPr lang="en-US" dirty="0" err="1" smtClean="0">
@@ -14050,7 +14040,15 @@
                   <a:schemeClr val="tx2"/>
                 </a:solidFill>
               </a:rPr>
-              <a:t>+ 148%</a:t>
+              <a:t>+ </a:t>
+            </a:r>
+            <a:r>
+              <a:rPr lang="en-US" dirty="0" smtClean="0">
+                <a:solidFill>
+                  <a:schemeClr val="tx2"/>
+                </a:solidFill>
+              </a:rPr>
+              <a:t>150%</a:t>
             </a:r>
             <a:endParaRPr lang="en-US" dirty="0">
               <a:solidFill>
@@ -14881,27 +14879,7 @@
                   </a:schemeClr>
                 </a:solidFill>
               </a:rPr>
-              <a:t>Fig: </a:t>
-            </a:r>
-            <a:r>
-              <a:rPr lang="en-US" dirty="0" smtClean="0">
-                <a:solidFill>
-                  <a:schemeClr val="bg1">
-                    <a:lumMod val="50000"/>
-                  </a:schemeClr>
-                </a:solidFill>
-              </a:rPr>
-              <a:t>Shadow price </a:t>
-            </a:r>
-            <a:r>
-              <a:rPr lang="en-US" dirty="0" smtClean="0">
-                <a:solidFill>
-                  <a:schemeClr val="bg1">
-                    <a:lumMod val="50000"/>
-                  </a:schemeClr>
-                </a:solidFill>
-              </a:rPr>
-              <a:t>in $ per </a:t>
+              <a:t>Fig: Shadow price in $ per </a:t>
             </a:r>
             <a:r>
               <a:rPr lang="en-US" dirty="0" err="1" smtClean="0">
@@ -15072,15 +15050,7 @@
           <a:p>
             <a:r>
               <a:rPr lang="en-US" dirty="0" smtClean="0"/>
-              <a:t>Europe’s </a:t>
-            </a:r>
-            <a:r>
-              <a:rPr lang="en-US" dirty="0" smtClean="0"/>
-              <a:t>LNG </a:t>
-            </a:r>
-            <a:r>
-              <a:rPr lang="en-US" dirty="0" smtClean="0"/>
-              <a:t>prices until 2040</a:t>
+              <a:t>Europe’s LNG prices until 2040</a:t>
             </a:r>
             <a:endParaRPr lang="en-US" dirty="0"/>
           </a:p>
@@ -16075,17 +16045,7 @@
                   </a:schemeClr>
                 </a:solidFill>
               </a:rPr>
-              <a:t> </a:t>
-            </a:r>
-            <a:r>
-              <a:rPr lang="en-US" dirty="0" smtClean="0">
-                <a:solidFill>
-                  <a:schemeClr val="bg1">
-                    <a:lumMod val="50000"/>
-                  </a:schemeClr>
-                </a:solidFill>
-              </a:rPr>
-              <a:t>in Q4 2018 and Q1 2019</a:t>
+              <a:t> in Q4 2018 and Q1 2019</a:t>
             </a:r>
             <a:endParaRPr lang="en-GB" dirty="0">
               <a:solidFill>
@@ -16225,17 +16185,7 @@
                   </a:schemeClr>
                 </a:solidFill>
               </a:rPr>
-              <a:t>Fig: </a:t>
-            </a:r>
-            <a:r>
-              <a:rPr lang="en-US" dirty="0" smtClean="0">
-                <a:solidFill>
-                  <a:schemeClr val="bg1">
-                    <a:lumMod val="50000"/>
-                  </a:schemeClr>
-                </a:solidFill>
-              </a:rPr>
-              <a:t>Quarterly prices of LNG from 2012 to 2019.</a:t>
+              <a:t>Fig: Quarterly prices of LNG from 2012 to 2019.</a:t>
             </a:r>
             <a:br>
               <a:rPr lang="en-US" dirty="0" smtClean="0">
@@ -16510,16 +16460,30 @@
                 <a:cs typeface="Segoe UI Light" panose="020B0502040204020203" pitchFamily="34" charset="0"/>
                 <a:sym typeface=""/>
               </a:rPr>
-              <a:t>Europe’s LNG import price in 2040: 41.6 EUR per MWh</a:t>
-            </a:r>
-            <a:endParaRPr lang="en-US" sz="1600" kern="0" dirty="0" smtClean="0">
-              <a:solidFill>
-                <a:srgbClr val="2D2926"/>
-              </a:solidFill>
-              <a:latin typeface="Segoe UI Light" panose="020B0502040204020203" pitchFamily="34" charset="0"/>
-              <a:cs typeface="Segoe UI Light" panose="020B0502040204020203" pitchFamily="34" charset="0"/>
-              <a:sym typeface=""/>
-            </a:endParaRPr>
+              <a:t>Europe’s LNG import price in 2040: </a:t>
+            </a:r>
+            <a:r>
+              <a:rPr lang="en-US" sz="1600" kern="0" dirty="0" smtClean="0">
+                <a:solidFill>
+                  <a:srgbClr val="2D2926"/>
+                </a:solidFill>
+                <a:latin typeface="Segoe UI Light" panose="020B0502040204020203" pitchFamily="34" charset="0"/>
+                <a:cs typeface="Segoe UI Light" panose="020B0502040204020203" pitchFamily="34" charset="0"/>
+                <a:sym typeface=""/>
+              </a:rPr>
+              <a:t>41.6 </a:t>
+            </a:r>
+            <a:r>
+              <a:rPr lang="en-US" sz="1600" kern="0" dirty="0" smtClean="0">
+                <a:solidFill>
+                  <a:srgbClr val="2D2926"/>
+                </a:solidFill>
+                <a:latin typeface="Segoe UI Light" panose="020B0502040204020203" pitchFamily="34" charset="0"/>
+                <a:cs typeface="Segoe UI Light" panose="020B0502040204020203" pitchFamily="34" charset="0"/>
+                <a:sym typeface=""/>
+              </a:rPr>
+              <a:t>EUR per MWh</a:t>
+            </a:r>
           </a:p>
         </p:txBody>
       </p:sp>
@@ -16601,7 +16565,11 @@
           <a:p>
             <a:r>
               <a:rPr lang="en-US" dirty="0" smtClean="0"/>
-              <a:t>Comparison of results with existing literature</a:t>
+              <a:t>Comparison of results with </a:t>
+            </a:r>
+            <a:r>
+              <a:rPr lang="en-US" dirty="0" smtClean="0"/>
+              <a:t>previous studies</a:t>
             </a:r>
             <a:endParaRPr lang="en-US" dirty="0"/>
           </a:p>
@@ -17176,57 +17144,80 @@
           </a:bodyPr>
           <a:lstStyle/>
           <a:p>
+            <a:pPr>
+              <a:spcBef>
+                <a:spcPts val="2400"/>
+              </a:spcBef>
+            </a:pPr>
+            <a:r>
+              <a:rPr lang="en-US" dirty="0" smtClean="0">
+                <a:sym typeface="Wingdings" panose="05000000000000000000" pitchFamily="2" charset="2"/>
+              </a:rPr>
+              <a:t>Significant increase in the consumption of LNG expected up to 2040 due to the comparatively short start-up time and flexible use in energy systems</a:t>
+            </a:r>
+          </a:p>
+          <a:p>
+            <a:pPr>
+              <a:spcBef>
+                <a:spcPts val="3000"/>
+              </a:spcBef>
+            </a:pPr>
+            <a:r>
+              <a:rPr lang="en-US" dirty="0" smtClean="0">
+                <a:sym typeface="Wingdings" panose="05000000000000000000" pitchFamily="2" charset="2"/>
+              </a:rPr>
+              <a:t>The trends in the geographical distribution of LNG prices remain the same in 2040 compared to historical values</a:t>
+            </a:r>
+          </a:p>
+          <a:p>
+            <a:pPr>
+              <a:spcBef>
+                <a:spcPts val="3000"/>
+              </a:spcBef>
+            </a:pPr>
+            <a:r>
+              <a:rPr lang="en-US" dirty="0" smtClean="0">
+                <a:sym typeface="Wingdings" panose="05000000000000000000" pitchFamily="2" charset="2"/>
+              </a:rPr>
+              <a:t>In Europe, the present results indicate a rise in LNG prices to around 12,2 $ per </a:t>
+            </a:r>
+            <a:r>
+              <a:rPr lang="en-US" dirty="0" err="1" smtClean="0">
+                <a:sym typeface="Wingdings" panose="05000000000000000000" pitchFamily="2" charset="2"/>
+              </a:rPr>
+              <a:t>mmBTU</a:t>
+            </a:r>
+            <a:r>
+              <a:rPr lang="en-US" dirty="0" smtClean="0">
+                <a:sym typeface="Wingdings" panose="05000000000000000000" pitchFamily="2" charset="2"/>
+              </a:rPr>
+              <a:t> by 2040</a:t>
+            </a:r>
+          </a:p>
+          <a:p>
             <a:pPr marL="342900" indent="-342900">
+              <a:spcBef>
+                <a:spcPts val="3000"/>
+              </a:spcBef>
               <a:buFont typeface="Wingdings" panose="05000000000000000000" pitchFamily="2" charset="2"/>
               <a:buChar char="§"/>
             </a:pPr>
             <a:r>
-              <a:rPr lang="en-US" dirty="0">
-                <a:sym typeface="Wingdings" panose="05000000000000000000" pitchFamily="2" charset="2"/>
-              </a:rPr>
-              <a:t>We found that the prioritized perspective of efficiency and local utilization </a:t>
-            </a:r>
-            <a:r>
               <a:rPr lang="en-US" dirty="0" smtClean="0">
                 <a:sym typeface="Wingdings" panose="05000000000000000000" pitchFamily="2" charset="2"/>
               </a:rPr>
-              <a:t>of renewable </a:t>
-            </a:r>
-            <a:r>
-              <a:rPr lang="en-US" dirty="0">
-                <a:sym typeface="Wingdings" panose="05000000000000000000" pitchFamily="2" charset="2"/>
-              </a:rPr>
-              <a:t>heat sources implies </a:t>
-            </a:r>
-            <a:r>
+              <a:t>Potential increase in export capacity of individual countries leads to the need for mid- and </a:t>
+            </a:r>
+            <a:br>
               <a:rPr lang="en-US" dirty="0" smtClean="0">
                 <a:sym typeface="Wingdings" panose="05000000000000000000" pitchFamily="2" charset="2"/>
               </a:rPr>
-              <a:t>substantial </a:t>
-            </a:r>
-            <a:r>
-              <a:rPr lang="en-US" dirty="0">
-                <a:sym typeface="Wingdings" panose="05000000000000000000" pitchFamily="2" charset="2"/>
-              </a:rPr>
-              <a:t>changes for the further </a:t>
-            </a:r>
+            </a:br>
             <a:r>
               <a:rPr lang="en-US" dirty="0" smtClean="0">
                 <a:sym typeface="Wingdings" panose="05000000000000000000" pitchFamily="2" charset="2"/>
               </a:rPr>
-              <a:t>development of </a:t>
-            </a:r>
-            <a:r>
-              <a:rPr lang="en-US" dirty="0">
-                <a:sym typeface="Wingdings" panose="05000000000000000000" pitchFamily="2" charset="2"/>
-              </a:rPr>
-              <a:t>district heating networks in the decarbonized Austrian heat supply </a:t>
-            </a:r>
-            <a:r>
-              <a:rPr lang="en-US" dirty="0" smtClean="0">
-                <a:sym typeface="Wingdings" panose="05000000000000000000" pitchFamily="2" charset="2"/>
-              </a:rPr>
-              <a:t>toward 2050.</a:t>
+              <a:t>long-term supply contracts for marginal exporters (e.g., USA in 2040)</a:t>
             </a:r>
           </a:p>
           <a:p>
@@ -17235,11 +17226,6 @@
               <a:buChar char="§"/>
             </a:pPr>
             <a:endParaRPr lang="en-US" dirty="0" smtClean="0">
-              <a:solidFill>
-                <a:schemeClr val="bg1">
-                  <a:lumMod val="50000"/>
-                </a:schemeClr>
-              </a:solidFill>
               <a:sym typeface="Wingdings" panose="05000000000000000000" pitchFamily="2" charset="2"/>
             </a:endParaRPr>
           </a:p>

</xml_diff>

<commit_message>
add presentation of #iewt#
</commit_message>
<xml_diff>
--- a/presentation/230214_IEWT.pptx
+++ b/presentation/230214_IEWT.pptx
@@ -249,7 +249,7 @@
           <a:p>
             <a:fld id="{8362D56F-4014-E440-B414-1949875DC54A}" type="datetimeFigureOut">
               <a:rPr lang="en-US" smtClean="0"/>
-              <a:t>2/15/2023</a:t>
+              <a:t>3/13/2023</a:t>
             </a:fld>
             <a:endParaRPr lang="en-US"/>
           </a:p>
@@ -426,7 +426,7 @@
           <a:p>
             <a:fld id="{1EAC332E-8893-FE4E-9A25-93BB30EFA0DA}" type="datetimeFigureOut">
               <a:rPr lang="en-US" smtClean="0"/>
-              <a:t>2/15/2023</a:t>
+              <a:t>3/13/2023</a:t>
             </a:fld>
             <a:endParaRPr lang="en-US"/>
           </a:p>
@@ -14040,15 +14040,7 @@
                   <a:schemeClr val="tx2"/>
                 </a:solidFill>
               </a:rPr>
-              <a:t>+ </a:t>
-            </a:r>
-            <a:r>
-              <a:rPr lang="en-US" dirty="0" smtClean="0">
-                <a:solidFill>
-                  <a:schemeClr val="tx2"/>
-                </a:solidFill>
-              </a:rPr>
-              <a:t>150%</a:t>
+              <a:t>+ 150%</a:t>
             </a:r>
             <a:endParaRPr lang="en-US" dirty="0">
               <a:solidFill>
@@ -16460,29 +16452,7 @@
                 <a:cs typeface="Segoe UI Light" panose="020B0502040204020203" pitchFamily="34" charset="0"/>
                 <a:sym typeface=""/>
               </a:rPr>
-              <a:t>Europe’s LNG import price in 2040: </a:t>
-            </a:r>
-            <a:r>
-              <a:rPr lang="en-US" sz="1600" kern="0" dirty="0" smtClean="0">
-                <a:solidFill>
-                  <a:srgbClr val="2D2926"/>
-                </a:solidFill>
-                <a:latin typeface="Segoe UI Light" panose="020B0502040204020203" pitchFamily="34" charset="0"/>
-                <a:cs typeface="Segoe UI Light" panose="020B0502040204020203" pitchFamily="34" charset="0"/>
-                <a:sym typeface=""/>
-              </a:rPr>
-              <a:t>41.6 </a:t>
-            </a:r>
-            <a:r>
-              <a:rPr lang="en-US" sz="1600" kern="0" dirty="0" smtClean="0">
-                <a:solidFill>
-                  <a:srgbClr val="2D2926"/>
-                </a:solidFill>
-                <a:latin typeface="Segoe UI Light" panose="020B0502040204020203" pitchFamily="34" charset="0"/>
-                <a:cs typeface="Segoe UI Light" panose="020B0502040204020203" pitchFamily="34" charset="0"/>
-                <a:sym typeface=""/>
-              </a:rPr>
-              <a:t>EUR per MWh</a:t>
+              <a:t>Europe’s LNG import price in 2040: 41.6 EUR per MWh</a:t>
             </a:r>
           </a:p>
         </p:txBody>
@@ -16565,11 +16535,7 @@
           <a:p>
             <a:r>
               <a:rPr lang="en-US" dirty="0" smtClean="0"/>
-              <a:t>Comparison of results with </a:t>
-            </a:r>
-            <a:r>
-              <a:rPr lang="en-US" dirty="0" smtClean="0"/>
-              <a:t>previous studies</a:t>
+              <a:t>Comparison of results with previous studies</a:t>
             </a:r>
             <a:endParaRPr lang="en-US" dirty="0"/>
           </a:p>
@@ -23748,65 +23714,6 @@
 </file>
 
 <file path=customXml/item1.xml><?xml version="1.0" encoding="utf-8"?>
-<?mso-contentType ?>
-<FormTemplates xmlns="http://schemas.microsoft.com/sharepoint/v3/contenttype/forms">
-  <Display>DocumentLibraryForm</Display>
-  <Edit>DocumentLibraryForm</Edit>
-  <New>DocumentLibraryForm</New>
-</FormTemplates>
-</file>
-
-<file path=customXml/item2.xml><?xml version="1.0" encoding="utf-8"?>
-<?mso-contentType ?>
-<spe:Receivers xmlns:spe="http://schemas.microsoft.com/sharepoint/events">
-  <Receiver>
-    <Name>Document ID Generator</Name>
-    <Synchronization>Synchronous</Synchronization>
-    <Type>10001</Type>
-    <SequenceNumber>1000</SequenceNumber>
-    <Url/>
-    <Assembly>Microsoft.Office.DocumentManagement, Version=16.0.0.0, Culture=neutral, PublicKeyToken=71e9bce111e9429c</Assembly>
-    <Class>Microsoft.Office.DocumentManagement.Internal.DocIdHandler</Class>
-    <Data/>
-    <Filter/>
-  </Receiver>
-  <Receiver>
-    <Name>Document ID Generator</Name>
-    <Synchronization>Synchronous</Synchronization>
-    <Type>10002</Type>
-    <SequenceNumber>1001</SequenceNumber>
-    <Url/>
-    <Assembly>Microsoft.Office.DocumentManagement, Version=16.0.0.0, Culture=neutral, PublicKeyToken=71e9bce111e9429c</Assembly>
-    <Class>Microsoft.Office.DocumentManagement.Internal.DocIdHandler</Class>
-    <Data/>
-    <Filter/>
-  </Receiver>
-  <Receiver>
-    <Name>Document ID Generator</Name>
-    <Synchronization>Synchronous</Synchronization>
-    <Type>10004</Type>
-    <SequenceNumber>1002</SequenceNumber>
-    <Url/>
-    <Assembly>Microsoft.Office.DocumentManagement, Version=16.0.0.0, Culture=neutral, PublicKeyToken=71e9bce111e9429c</Assembly>
-    <Class>Microsoft.Office.DocumentManagement.Internal.DocIdHandler</Class>
-    <Data/>
-    <Filter/>
-  </Receiver>
-  <Receiver>
-    <Name>Document ID Generator</Name>
-    <Synchronization>Synchronous</Synchronization>
-    <Type>10006</Type>
-    <SequenceNumber>1003</SequenceNumber>
-    <Url/>
-    <Assembly>Microsoft.Office.DocumentManagement, Version=16.0.0.0, Culture=neutral, PublicKeyToken=71e9bce111e9429c</Assembly>
-    <Class>Microsoft.Office.DocumentManagement.Internal.DocIdHandler</Class>
-    <Data/>
-    <Filter/>
-  </Receiver>
-</spe:Receivers>
-</file>
-
-<file path=customXml/item3.xml><?xml version="1.0" encoding="utf-8"?>
 <ct:contentTypeSchema xmlns:ct="http://schemas.microsoft.com/office/2006/metadata/contentType" xmlns:ma="http://schemas.microsoft.com/office/2006/metadata/properties/metaAttributes" ct:_="" ma:_="" ma:contentTypeName="Document" ma:contentTypeID="0x010100709E5D021178B04082DE841A61810ABC" ma:contentTypeVersion="6" ma:contentTypeDescription="Create a new document." ma:contentTypeScope="" ma:versionID="bf37d4ac1dddfc53a56261334840b7df">
   <xsd:schema xmlns:xsd="http://www.w3.org/2001/XMLSchema" xmlns:xs="http://www.w3.org/2001/XMLSchema" xmlns:p="http://schemas.microsoft.com/office/2006/metadata/properties" xmlns:ns2="0689c177-5e19-464b-8532-40aa8fde3a94" xmlns:ns3="06814371-4dd9-40ea-9cc7-40b39613c6ae" xmlns:ns4="749ef8e9-4186-4c55-b2d4-b1c3f2fa9400" targetNamespace="http://schemas.microsoft.com/office/2006/metadata/properties" ma:root="true" ma:fieldsID="382a45c066b9cd32e8d486b5ba424e80" ns2:_="" ns3:_="" ns4:_="">
     <xsd:import namespace="0689c177-5e19-464b-8532-40aa8fde3a94"/>
@@ -24013,6 +23920,65 @@
 </ct:contentTypeSchema>
 </file>
 
+<file path=customXml/item2.xml><?xml version="1.0" encoding="utf-8"?>
+<?mso-contentType ?>
+<spe:Receivers xmlns:spe="http://schemas.microsoft.com/sharepoint/events">
+  <Receiver>
+    <Name>Document ID Generator</Name>
+    <Synchronization>Synchronous</Synchronization>
+    <Type>10001</Type>
+    <SequenceNumber>1000</SequenceNumber>
+    <Url/>
+    <Assembly>Microsoft.Office.DocumentManagement, Version=16.0.0.0, Culture=neutral, PublicKeyToken=71e9bce111e9429c</Assembly>
+    <Class>Microsoft.Office.DocumentManagement.Internal.DocIdHandler</Class>
+    <Data/>
+    <Filter/>
+  </Receiver>
+  <Receiver>
+    <Name>Document ID Generator</Name>
+    <Synchronization>Synchronous</Synchronization>
+    <Type>10002</Type>
+    <SequenceNumber>1001</SequenceNumber>
+    <Url/>
+    <Assembly>Microsoft.Office.DocumentManagement, Version=16.0.0.0, Culture=neutral, PublicKeyToken=71e9bce111e9429c</Assembly>
+    <Class>Microsoft.Office.DocumentManagement.Internal.DocIdHandler</Class>
+    <Data/>
+    <Filter/>
+  </Receiver>
+  <Receiver>
+    <Name>Document ID Generator</Name>
+    <Synchronization>Synchronous</Synchronization>
+    <Type>10004</Type>
+    <SequenceNumber>1002</SequenceNumber>
+    <Url/>
+    <Assembly>Microsoft.Office.DocumentManagement, Version=16.0.0.0, Culture=neutral, PublicKeyToken=71e9bce111e9429c</Assembly>
+    <Class>Microsoft.Office.DocumentManagement.Internal.DocIdHandler</Class>
+    <Data/>
+    <Filter/>
+  </Receiver>
+  <Receiver>
+    <Name>Document ID Generator</Name>
+    <Synchronization>Synchronous</Synchronization>
+    <Type>10006</Type>
+    <SequenceNumber>1003</SequenceNumber>
+    <Url/>
+    <Assembly>Microsoft.Office.DocumentManagement, Version=16.0.0.0, Culture=neutral, PublicKeyToken=71e9bce111e9429c</Assembly>
+    <Class>Microsoft.Office.DocumentManagement.Internal.DocIdHandler</Class>
+    <Data/>
+    <Filter/>
+  </Receiver>
+</spe:Receivers>
+</file>
+
+<file path=customXml/item3.xml><?xml version="1.0" encoding="utf-8"?>
+<?mso-contentType ?>
+<FormTemplates xmlns="http://schemas.microsoft.com/sharepoint/v3/contenttype/forms">
+  <Display>DocumentLibraryForm</Display>
+  <Edit>DocumentLibraryForm</Edit>
+  <New>DocumentLibraryForm</New>
+</FormTemplates>
+</file>
+
 <file path=customXml/item4.xml><?xml version="1.0" encoding="utf-8"?>
 <p:properties xmlns:p="http://schemas.microsoft.com/office/2006/metadata/properties" xmlns:xsi="http://www.w3.org/2001/XMLSchema-instance" xmlns:pc="http://schemas.microsoft.com/office/infopath/2007/PartnerControls">
   <documentManagement>
@@ -24026,22 +23992,6 @@
 </file>
 
 <file path=customXml/itemProps1.xml><?xml version="1.0" encoding="utf-8"?>
-<ds:datastoreItem xmlns:ds="http://schemas.openxmlformats.org/officeDocument/2006/customXml" ds:itemID="{6E794EA7-8E28-4624-885F-9EF05194D2E6}">
-  <ds:schemaRefs>
-    <ds:schemaRef ds:uri="http://schemas.microsoft.com/sharepoint/v3/contenttype/forms"/>
-  </ds:schemaRefs>
-</ds:datastoreItem>
-</file>
-
-<file path=customXml/itemProps2.xml><?xml version="1.0" encoding="utf-8"?>
-<ds:datastoreItem xmlns:ds="http://schemas.openxmlformats.org/officeDocument/2006/customXml" ds:itemID="{B0542633-460B-4F10-AED0-D9CC98DDA495}">
-  <ds:schemaRefs>
-    <ds:schemaRef ds:uri="http://schemas.microsoft.com/sharepoint/events"/>
-  </ds:schemaRefs>
-</ds:datastoreItem>
-</file>
-
-<file path=customXml/itemProps3.xml><?xml version="1.0" encoding="utf-8"?>
 <ds:datastoreItem xmlns:ds="http://schemas.openxmlformats.org/officeDocument/2006/customXml" ds:itemID="{FE961F14-CA64-4A5B-8D0E-270958149F57}">
   <ds:schemaRefs>
     <ds:schemaRef ds:uri="http://schemas.microsoft.com/office/2006/metadata/contentType"/>
@@ -24057,6 +24007,22 @@
     <ds:schemaRef ds:uri="http://purl.org/dc/elements/1.1/"/>
     <ds:schemaRef ds:uri="http://purl.org/dc/terms/"/>
     <ds:schemaRef ds:uri="http://schemas.microsoft.com/internal/obd"/>
+  </ds:schemaRefs>
+</ds:datastoreItem>
+</file>
+
+<file path=customXml/itemProps2.xml><?xml version="1.0" encoding="utf-8"?>
+<ds:datastoreItem xmlns:ds="http://schemas.openxmlformats.org/officeDocument/2006/customXml" ds:itemID="{B0542633-460B-4F10-AED0-D9CC98DDA495}">
+  <ds:schemaRefs>
+    <ds:schemaRef ds:uri="http://schemas.microsoft.com/sharepoint/events"/>
+  </ds:schemaRefs>
+</ds:datastoreItem>
+</file>
+
+<file path=customXml/itemProps3.xml><?xml version="1.0" encoding="utf-8"?>
+<ds:datastoreItem xmlns:ds="http://schemas.openxmlformats.org/officeDocument/2006/customXml" ds:itemID="{6E794EA7-8E28-4624-885F-9EF05194D2E6}">
+  <ds:schemaRefs>
+    <ds:schemaRef ds:uri="http://schemas.microsoft.com/sharepoint/v3/contenttype/forms"/>
   </ds:schemaRefs>
 </ds:datastoreItem>
 </file>

</xml_diff>

<commit_message>
update dissemination and presentations
</commit_message>
<xml_diff>
--- a/presentation/230214_IEWT.pptx
+++ b/presentation/230214_IEWT.pptx
@@ -249,7 +249,7 @@
           <a:p>
             <a:fld id="{8362D56F-4014-E440-B414-1949875DC54A}" type="datetimeFigureOut">
               <a:rPr lang="en-US" smtClean="0"/>
-              <a:t>3/13/2023</a:t>
+              <a:t>6/7/2023</a:t>
             </a:fld>
             <a:endParaRPr lang="en-US"/>
           </a:p>
@@ -426,7 +426,7 @@
           <a:p>
             <a:fld id="{1EAC332E-8893-FE4E-9A25-93BB30EFA0DA}" type="datetimeFigureOut">
               <a:rPr lang="en-US" smtClean="0"/>
-              <a:t>3/13/2023</a:t>
+              <a:t>6/7/2023</a:t>
             </a:fld>
             <a:endParaRPr lang="en-US"/>
           </a:p>
@@ -23714,6 +23714,65 @@
 </file>
 
 <file path=customXml/item1.xml><?xml version="1.0" encoding="utf-8"?>
+<?mso-contentType ?>
+<FormTemplates xmlns="http://schemas.microsoft.com/sharepoint/v3/contenttype/forms">
+  <Display>DocumentLibraryForm</Display>
+  <Edit>DocumentLibraryForm</Edit>
+  <New>DocumentLibraryForm</New>
+</FormTemplates>
+</file>
+
+<file path=customXml/item2.xml><?xml version="1.0" encoding="utf-8"?>
+<?mso-contentType ?>
+<spe:Receivers xmlns:spe="http://schemas.microsoft.com/sharepoint/events">
+  <Receiver>
+    <Name>Document ID Generator</Name>
+    <Synchronization>Synchronous</Synchronization>
+    <Type>10001</Type>
+    <SequenceNumber>1000</SequenceNumber>
+    <Url/>
+    <Assembly>Microsoft.Office.DocumentManagement, Version=16.0.0.0, Culture=neutral, PublicKeyToken=71e9bce111e9429c</Assembly>
+    <Class>Microsoft.Office.DocumentManagement.Internal.DocIdHandler</Class>
+    <Data/>
+    <Filter/>
+  </Receiver>
+  <Receiver>
+    <Name>Document ID Generator</Name>
+    <Synchronization>Synchronous</Synchronization>
+    <Type>10002</Type>
+    <SequenceNumber>1001</SequenceNumber>
+    <Url/>
+    <Assembly>Microsoft.Office.DocumentManagement, Version=16.0.0.0, Culture=neutral, PublicKeyToken=71e9bce111e9429c</Assembly>
+    <Class>Microsoft.Office.DocumentManagement.Internal.DocIdHandler</Class>
+    <Data/>
+    <Filter/>
+  </Receiver>
+  <Receiver>
+    <Name>Document ID Generator</Name>
+    <Synchronization>Synchronous</Synchronization>
+    <Type>10004</Type>
+    <SequenceNumber>1002</SequenceNumber>
+    <Url/>
+    <Assembly>Microsoft.Office.DocumentManagement, Version=16.0.0.0, Culture=neutral, PublicKeyToken=71e9bce111e9429c</Assembly>
+    <Class>Microsoft.Office.DocumentManagement.Internal.DocIdHandler</Class>
+    <Data/>
+    <Filter/>
+  </Receiver>
+  <Receiver>
+    <Name>Document ID Generator</Name>
+    <Synchronization>Synchronous</Synchronization>
+    <Type>10006</Type>
+    <SequenceNumber>1003</SequenceNumber>
+    <Url/>
+    <Assembly>Microsoft.Office.DocumentManagement, Version=16.0.0.0, Culture=neutral, PublicKeyToken=71e9bce111e9429c</Assembly>
+    <Class>Microsoft.Office.DocumentManagement.Internal.DocIdHandler</Class>
+    <Data/>
+    <Filter/>
+  </Receiver>
+</spe:Receivers>
+</file>
+
+<file path=customXml/item3.xml><?xml version="1.0" encoding="utf-8"?>
 <ct:contentTypeSchema xmlns:ct="http://schemas.microsoft.com/office/2006/metadata/contentType" xmlns:ma="http://schemas.microsoft.com/office/2006/metadata/properties/metaAttributes" ct:_="" ma:_="" ma:contentTypeName="Document" ma:contentTypeID="0x010100709E5D021178B04082DE841A61810ABC" ma:contentTypeVersion="6" ma:contentTypeDescription="Create a new document." ma:contentTypeScope="" ma:versionID="bf37d4ac1dddfc53a56261334840b7df">
   <xsd:schema xmlns:xsd="http://www.w3.org/2001/XMLSchema" xmlns:xs="http://www.w3.org/2001/XMLSchema" xmlns:p="http://schemas.microsoft.com/office/2006/metadata/properties" xmlns:ns2="0689c177-5e19-464b-8532-40aa8fde3a94" xmlns:ns3="06814371-4dd9-40ea-9cc7-40b39613c6ae" xmlns:ns4="749ef8e9-4186-4c55-b2d4-b1c3f2fa9400" targetNamespace="http://schemas.microsoft.com/office/2006/metadata/properties" ma:root="true" ma:fieldsID="382a45c066b9cd32e8d486b5ba424e80" ns2:_="" ns3:_="" ns4:_="">
     <xsd:import namespace="0689c177-5e19-464b-8532-40aa8fde3a94"/>
@@ -23920,65 +23979,6 @@
 </ct:contentTypeSchema>
 </file>
 
-<file path=customXml/item2.xml><?xml version="1.0" encoding="utf-8"?>
-<?mso-contentType ?>
-<spe:Receivers xmlns:spe="http://schemas.microsoft.com/sharepoint/events">
-  <Receiver>
-    <Name>Document ID Generator</Name>
-    <Synchronization>Synchronous</Synchronization>
-    <Type>10001</Type>
-    <SequenceNumber>1000</SequenceNumber>
-    <Url/>
-    <Assembly>Microsoft.Office.DocumentManagement, Version=16.0.0.0, Culture=neutral, PublicKeyToken=71e9bce111e9429c</Assembly>
-    <Class>Microsoft.Office.DocumentManagement.Internal.DocIdHandler</Class>
-    <Data/>
-    <Filter/>
-  </Receiver>
-  <Receiver>
-    <Name>Document ID Generator</Name>
-    <Synchronization>Synchronous</Synchronization>
-    <Type>10002</Type>
-    <SequenceNumber>1001</SequenceNumber>
-    <Url/>
-    <Assembly>Microsoft.Office.DocumentManagement, Version=16.0.0.0, Culture=neutral, PublicKeyToken=71e9bce111e9429c</Assembly>
-    <Class>Microsoft.Office.DocumentManagement.Internal.DocIdHandler</Class>
-    <Data/>
-    <Filter/>
-  </Receiver>
-  <Receiver>
-    <Name>Document ID Generator</Name>
-    <Synchronization>Synchronous</Synchronization>
-    <Type>10004</Type>
-    <SequenceNumber>1002</SequenceNumber>
-    <Url/>
-    <Assembly>Microsoft.Office.DocumentManagement, Version=16.0.0.0, Culture=neutral, PublicKeyToken=71e9bce111e9429c</Assembly>
-    <Class>Microsoft.Office.DocumentManagement.Internal.DocIdHandler</Class>
-    <Data/>
-    <Filter/>
-  </Receiver>
-  <Receiver>
-    <Name>Document ID Generator</Name>
-    <Synchronization>Synchronous</Synchronization>
-    <Type>10006</Type>
-    <SequenceNumber>1003</SequenceNumber>
-    <Url/>
-    <Assembly>Microsoft.Office.DocumentManagement, Version=16.0.0.0, Culture=neutral, PublicKeyToken=71e9bce111e9429c</Assembly>
-    <Class>Microsoft.Office.DocumentManagement.Internal.DocIdHandler</Class>
-    <Data/>
-    <Filter/>
-  </Receiver>
-</spe:Receivers>
-</file>
-
-<file path=customXml/item3.xml><?xml version="1.0" encoding="utf-8"?>
-<?mso-contentType ?>
-<FormTemplates xmlns="http://schemas.microsoft.com/sharepoint/v3/contenttype/forms">
-  <Display>DocumentLibraryForm</Display>
-  <Edit>DocumentLibraryForm</Edit>
-  <New>DocumentLibraryForm</New>
-</FormTemplates>
-</file>
-
 <file path=customXml/item4.xml><?xml version="1.0" encoding="utf-8"?>
 <p:properties xmlns:p="http://schemas.microsoft.com/office/2006/metadata/properties" xmlns:xsi="http://www.w3.org/2001/XMLSchema-instance" xmlns:pc="http://schemas.microsoft.com/office/infopath/2007/PartnerControls">
   <documentManagement>
@@ -23992,6 +23992,22 @@
 </file>
 
 <file path=customXml/itemProps1.xml><?xml version="1.0" encoding="utf-8"?>
+<ds:datastoreItem xmlns:ds="http://schemas.openxmlformats.org/officeDocument/2006/customXml" ds:itemID="{6E794EA7-8E28-4624-885F-9EF05194D2E6}">
+  <ds:schemaRefs>
+    <ds:schemaRef ds:uri="http://schemas.microsoft.com/sharepoint/v3/contenttype/forms"/>
+  </ds:schemaRefs>
+</ds:datastoreItem>
+</file>
+
+<file path=customXml/itemProps2.xml><?xml version="1.0" encoding="utf-8"?>
+<ds:datastoreItem xmlns:ds="http://schemas.openxmlformats.org/officeDocument/2006/customXml" ds:itemID="{B0542633-460B-4F10-AED0-D9CC98DDA495}">
+  <ds:schemaRefs>
+    <ds:schemaRef ds:uri="http://schemas.microsoft.com/sharepoint/events"/>
+  </ds:schemaRefs>
+</ds:datastoreItem>
+</file>
+
+<file path=customXml/itemProps3.xml><?xml version="1.0" encoding="utf-8"?>
 <ds:datastoreItem xmlns:ds="http://schemas.openxmlformats.org/officeDocument/2006/customXml" ds:itemID="{FE961F14-CA64-4A5B-8D0E-270958149F57}">
   <ds:schemaRefs>
     <ds:schemaRef ds:uri="http://schemas.microsoft.com/office/2006/metadata/contentType"/>
@@ -24007,22 +24023,6 @@
     <ds:schemaRef ds:uri="http://purl.org/dc/elements/1.1/"/>
     <ds:schemaRef ds:uri="http://purl.org/dc/terms/"/>
     <ds:schemaRef ds:uri="http://schemas.microsoft.com/internal/obd"/>
-  </ds:schemaRefs>
-</ds:datastoreItem>
-</file>
-
-<file path=customXml/itemProps2.xml><?xml version="1.0" encoding="utf-8"?>
-<ds:datastoreItem xmlns:ds="http://schemas.openxmlformats.org/officeDocument/2006/customXml" ds:itemID="{B0542633-460B-4F10-AED0-D9CC98DDA495}">
-  <ds:schemaRefs>
-    <ds:schemaRef ds:uri="http://schemas.microsoft.com/sharepoint/events"/>
-  </ds:schemaRefs>
-</ds:datastoreItem>
-</file>
-
-<file path=customXml/itemProps3.xml><?xml version="1.0" encoding="utf-8"?>
-<ds:datastoreItem xmlns:ds="http://schemas.openxmlformats.org/officeDocument/2006/customXml" ds:itemID="{6E794EA7-8E28-4624-885F-9EF05194D2E6}">
-  <ds:schemaRefs>
-    <ds:schemaRef ds:uri="http://schemas.microsoft.com/sharepoint/v3/contenttype/forms"/>
   </ds:schemaRefs>
 </ds:datastoreItem>
 </file>

</xml_diff>